<commit_message>
More demo + presentation work.
</commit_message>
<xml_diff>
--- a/_notes/Presentation.pptx
+++ b/_notes/Presentation.pptx
@@ -5,20 +5,28 @@
     <p:sldMasterId id="2147483648" r:id="rId1"/>
   </p:sldMasterIdLst>
   <p:notesMasterIdLst>
-    <p:notesMasterId r:id="rId5"/>
+    <p:notesMasterId r:id="rId13"/>
   </p:notesMasterIdLst>
   <p:handoutMasterIdLst>
-    <p:handoutMasterId r:id="rId6"/>
+    <p:handoutMasterId r:id="rId14"/>
   </p:handoutMasterIdLst>
   <p:sldIdLst>
     <p:sldId id="256" r:id="rId2"/>
-    <p:sldId id="257" r:id="rId3"/>
-    <p:sldId id="258" r:id="rId4"/>
+    <p:sldId id="264" r:id="rId3"/>
+    <p:sldId id="257" r:id="rId4"/>
+    <p:sldId id="265" r:id="rId5"/>
+    <p:sldId id="266" r:id="rId6"/>
+    <p:sldId id="260" r:id="rId7"/>
+    <p:sldId id="259" r:id="rId8"/>
+    <p:sldId id="261" r:id="rId9"/>
+    <p:sldId id="263" r:id="rId10"/>
+    <p:sldId id="262" r:id="rId11"/>
+    <p:sldId id="258" r:id="rId12"/>
   </p:sldIdLst>
   <p:sldSz cx="12192000" cy="6858000"/>
   <p:notesSz cx="6797675" cy="9926638"/>
   <p:custDataLst>
-    <p:tags r:id="rId7"/>
+    <p:tags r:id="rId15"/>
   </p:custDataLst>
   <p:defaultTextStyle>
     <a:defPPr>
@@ -2219,7 +2227,7 @@
           <a:graphicData uri="http://schemas.openxmlformats.org/presentationml/2006/ole">
             <mc:AlternateContent xmlns:mc="http://schemas.openxmlformats.org/markup-compatibility/2006">
               <mc:Choice xmlns:v="urn:schemas-microsoft-com:vml" Requires="v">
-                <p:oleObj spid="_x0000_s1097" name="think-cell Slide" r:id="rId11" imgW="473" imgH="473" progId="TCLayout.ActiveDocument.1">
+                <p:oleObj spid="_x0000_s1112" name="think-cell Slide" r:id="rId11" imgW="473" imgH="473" progId="TCLayout.ActiveDocument.1">
                   <p:embed/>
                 </p:oleObj>
               </mc:Choice>
@@ -2968,6 +2976,196 @@
 </p:sld>
 </file>
 
+<file path=ppt/slides/slide10.xml><?xml version="1.0" encoding="utf-8"?>
+<p:sld xmlns:a="http://schemas.openxmlformats.org/drawingml/2006/main" xmlns:r="http://schemas.openxmlformats.org/officeDocument/2006/relationships" xmlns:p="http://schemas.openxmlformats.org/presentationml/2006/main">
+  <p:cSld>
+    <p:spTree>
+      <p:nvGrpSpPr>
+        <p:cNvPr id="1" name=""/>
+        <p:cNvGrpSpPr/>
+        <p:nvPr/>
+      </p:nvGrpSpPr>
+      <p:grpSpPr>
+        <a:xfrm>
+          <a:off x="0" y="0"/>
+          <a:ext cx="0" cy="0"/>
+          <a:chOff x="0" y="0"/>
+          <a:chExt cx="0" cy="0"/>
+        </a:xfrm>
+      </p:grpSpPr>
+      <p:sp>
+        <p:nvSpPr>
+          <p:cNvPr id="2" name="Title 1"/>
+          <p:cNvSpPr>
+            <a:spLocks noGrp="1"/>
+          </p:cNvSpPr>
+          <p:nvPr>
+            <p:ph type="title"/>
+          </p:nvPr>
+        </p:nvSpPr>
+        <p:spPr/>
+        <p:txBody>
+          <a:bodyPr/>
+          <a:lstStyle/>
+          <a:p>
+            <a:r>
+              <a:rPr lang="da-DK" dirty="0"/>
+              <a:t>Part 2</a:t>
+            </a:r>
+          </a:p>
+        </p:txBody>
+      </p:sp>
+      <p:sp>
+        <p:nvSpPr>
+          <p:cNvPr id="3" name="Content Placeholder 2"/>
+          <p:cNvSpPr>
+            <a:spLocks noGrp="1"/>
+          </p:cNvSpPr>
+          <p:nvPr>
+            <p:ph idx="1"/>
+          </p:nvPr>
+        </p:nvSpPr>
+        <p:spPr/>
+        <p:txBody>
+          <a:bodyPr/>
+          <a:lstStyle/>
+          <a:p>
+            <a:endParaRPr lang="da-DK"/>
+          </a:p>
+        </p:txBody>
+      </p:sp>
+      <p:sp>
+        <p:nvSpPr>
+          <p:cNvPr id="4" name="Slide Number Placeholder 3"/>
+          <p:cNvSpPr>
+            <a:spLocks noGrp="1"/>
+          </p:cNvSpPr>
+          <p:nvPr>
+            <p:ph type="sldNum" sz="quarter" idx="12"/>
+          </p:nvPr>
+        </p:nvSpPr>
+        <p:spPr/>
+        <p:txBody>
+          <a:bodyPr/>
+          <a:lstStyle/>
+          <a:p>
+            <a:fld id="{0B0DDA44-FDCB-445C-9AC0-37FB199E677B}" type="slidenum">
+              <a:rPr lang="en-US" smtClean="0"/>
+              <a:pPr/>
+              <a:t>10</a:t>
+            </a:fld>
+            <a:endParaRPr lang="en-US" dirty="0"/>
+          </a:p>
+        </p:txBody>
+      </p:sp>
+    </p:spTree>
+    <p:extLst>
+      <p:ext uri="{BB962C8B-B14F-4D97-AF65-F5344CB8AC3E}">
+        <p14:creationId xmlns:p14="http://schemas.microsoft.com/office/powerpoint/2010/main" val="2946895448"/>
+      </p:ext>
+    </p:extLst>
+  </p:cSld>
+  <p:clrMapOvr>
+    <a:masterClrMapping/>
+  </p:clrMapOvr>
+</p:sld>
+</file>
+
+<file path=ppt/slides/slide11.xml><?xml version="1.0" encoding="utf-8"?>
+<p:sld xmlns:a="http://schemas.openxmlformats.org/drawingml/2006/main" xmlns:r="http://schemas.openxmlformats.org/officeDocument/2006/relationships" xmlns:p="http://schemas.openxmlformats.org/presentationml/2006/main">
+  <p:cSld>
+    <p:spTree>
+      <p:nvGrpSpPr>
+        <p:cNvPr id="1" name=""/>
+        <p:cNvGrpSpPr/>
+        <p:nvPr/>
+      </p:nvGrpSpPr>
+      <p:grpSpPr>
+        <a:xfrm>
+          <a:off x="0" y="0"/>
+          <a:ext cx="0" cy="0"/>
+          <a:chOff x="0" y="0"/>
+          <a:chExt cx="0" cy="0"/>
+        </a:xfrm>
+      </p:grpSpPr>
+      <p:sp>
+        <p:nvSpPr>
+          <p:cNvPr id="2" name="Title 1"/>
+          <p:cNvSpPr>
+            <a:spLocks noGrp="1"/>
+          </p:cNvSpPr>
+          <p:nvPr>
+            <p:ph type="title"/>
+          </p:nvPr>
+        </p:nvSpPr>
+        <p:spPr/>
+        <p:txBody>
+          <a:bodyPr/>
+          <a:lstStyle/>
+          <a:p>
+            <a:r>
+              <a:rPr lang="da-DK" dirty="0"/>
+              <a:t>ASP.NET Core</a:t>
+            </a:r>
+          </a:p>
+        </p:txBody>
+      </p:sp>
+      <p:sp>
+        <p:nvSpPr>
+          <p:cNvPr id="3" name="Content Placeholder 2"/>
+          <p:cNvSpPr>
+            <a:spLocks noGrp="1"/>
+          </p:cNvSpPr>
+          <p:nvPr>
+            <p:ph idx="1"/>
+          </p:nvPr>
+        </p:nvSpPr>
+        <p:spPr/>
+        <p:txBody>
+          <a:bodyPr/>
+          <a:lstStyle/>
+          <a:p>
+            <a:endParaRPr lang="da-DK"/>
+          </a:p>
+        </p:txBody>
+      </p:sp>
+      <p:sp>
+        <p:nvSpPr>
+          <p:cNvPr id="4" name="Slide Number Placeholder 3"/>
+          <p:cNvSpPr>
+            <a:spLocks noGrp="1"/>
+          </p:cNvSpPr>
+          <p:nvPr>
+            <p:ph type="sldNum" sz="quarter" idx="12"/>
+          </p:nvPr>
+        </p:nvSpPr>
+        <p:spPr/>
+        <p:txBody>
+          <a:bodyPr/>
+          <a:lstStyle/>
+          <a:p>
+            <a:fld id="{0B0DDA44-FDCB-445C-9AC0-37FB199E677B}" type="slidenum">
+              <a:rPr lang="en-US" smtClean="0"/>
+              <a:pPr/>
+              <a:t>11</a:t>
+            </a:fld>
+            <a:endParaRPr lang="en-US" dirty="0"/>
+          </a:p>
+        </p:txBody>
+      </p:sp>
+    </p:spTree>
+    <p:extLst>
+      <p:ext uri="{BB962C8B-B14F-4D97-AF65-F5344CB8AC3E}">
+        <p14:creationId xmlns:p14="http://schemas.microsoft.com/office/powerpoint/2010/main" val="3242514119"/>
+      </p:ext>
+    </p:extLst>
+  </p:cSld>
+  <p:clrMapOvr>
+    <a:masterClrMapping/>
+  </p:clrMapOvr>
+</p:sld>
+</file>
+
 <file path=ppt/slides/slide2.xml><?xml version="1.0" encoding="utf-8"?>
 <p:sld xmlns:a="http://schemas.openxmlformats.org/drawingml/2006/main" xmlns:r="http://schemas.openxmlformats.org/officeDocument/2006/relationships" xmlns:p="http://schemas.openxmlformats.org/presentationml/2006/main">
   <p:cSld>
@@ -3001,8 +3199,8 @@
           <a:lstStyle/>
           <a:p>
             <a:r>
-              <a:rPr lang="en-GB" dirty="0"/>
-              <a:t>Agenda</a:t>
+              <a:rPr lang="da-DK" dirty="0"/>
+              <a:t>Me</a:t>
             </a:r>
           </a:p>
         </p:txBody>
@@ -3022,75 +3220,7 @@
           <a:bodyPr/>
           <a:lstStyle/>
           <a:p>
-            <a:r>
-              <a:rPr lang="en-GB" dirty="0"/>
-              <a:t>Intro</a:t>
-            </a:r>
-          </a:p>
-          <a:p>
-            <a:endParaRPr lang="en-GB" dirty="0"/>
-          </a:p>
-          <a:p>
-            <a:r>
-              <a:rPr lang="en-GB" dirty="0"/>
-              <a:t>Part I</a:t>
-            </a:r>
-          </a:p>
-          <a:p>
-            <a:pPr lvl="1"/>
-            <a:r>
-              <a:rPr lang="en-GB" dirty="0"/>
-              <a:t>React</a:t>
-            </a:r>
-          </a:p>
-          <a:p>
-            <a:pPr lvl="1"/>
-            <a:r>
-              <a:rPr lang="en-GB" dirty="0" err="1"/>
-              <a:t>TypeScript</a:t>
-            </a:r>
-            <a:endParaRPr lang="en-GB" dirty="0"/>
-          </a:p>
-          <a:p>
-            <a:pPr lvl="1"/>
-            <a:r>
-              <a:rPr lang="en-GB" dirty="0" err="1"/>
-              <a:t>Webpack</a:t>
-            </a:r>
-            <a:endParaRPr lang="en-GB" dirty="0"/>
-          </a:p>
-          <a:p>
-            <a:pPr lvl="1"/>
-            <a:endParaRPr lang="en-GB" dirty="0"/>
-          </a:p>
-          <a:p>
-            <a:r>
-              <a:rPr lang="en-GB" dirty="0"/>
-              <a:t>Part II</a:t>
-            </a:r>
-          </a:p>
-          <a:p>
-            <a:pPr lvl="1"/>
-            <a:r>
-              <a:rPr lang="en-GB" dirty="0"/>
-              <a:t>Visual Studio</a:t>
-            </a:r>
-          </a:p>
-          <a:p>
-            <a:pPr lvl="1"/>
-            <a:endParaRPr lang="en-GB" dirty="0"/>
-          </a:p>
-          <a:p>
-            <a:pPr lvl="1"/>
-            <a:endParaRPr lang="en-GB" dirty="0"/>
-          </a:p>
-          <a:p>
-            <a:pPr lvl="1"/>
-            <a:endParaRPr lang="en-GB" dirty="0"/>
-          </a:p>
-          <a:p>
-            <a:pPr lvl="1"/>
-            <a:endParaRPr lang="en-GB" dirty="0"/>
+            <a:endParaRPr lang="da-DK" dirty="0"/>
           </a:p>
         </p:txBody>
       </p:sp>
@@ -3119,12 +3249,9 @@
         </p:txBody>
       </p:sp>
     </p:spTree>
-    <p:custDataLst>
-      <p:tags r:id="rId1"/>
-    </p:custDataLst>
     <p:extLst>
       <p:ext uri="{BB962C8B-B14F-4D97-AF65-F5344CB8AC3E}">
-        <p14:creationId xmlns:p14="http://schemas.microsoft.com/office/powerpoint/2010/main" val="4085506166"/>
+        <p14:creationId xmlns:p14="http://schemas.microsoft.com/office/powerpoint/2010/main" val="72391307"/>
       </p:ext>
     </p:extLst>
   </p:cSld>
@@ -3167,8 +3294,8 @@
           <a:lstStyle/>
           <a:p>
             <a:r>
-              <a:rPr lang="da-DK" dirty="0"/>
-              <a:t>ASP.NET Core</a:t>
+              <a:rPr lang="en-GB" dirty="0"/>
+              <a:t>Agenda</a:t>
             </a:r>
           </a:p>
         </p:txBody>
@@ -3188,7 +3315,86 @@
           <a:bodyPr/>
           <a:lstStyle/>
           <a:p>
-            <a:endParaRPr lang="da-DK"/>
+            <a:r>
+              <a:rPr lang="en-GB" dirty="0"/>
+              <a:t>Intro</a:t>
+            </a:r>
+          </a:p>
+          <a:p>
+            <a:pPr lvl="1"/>
+            <a:r>
+              <a:rPr lang="en-GB" dirty="0" err="1"/>
+              <a:t>Templafy</a:t>
+            </a:r>
+            <a:r>
+              <a:rPr lang="en-GB" dirty="0"/>
+              <a:t> story</a:t>
+            </a:r>
+          </a:p>
+          <a:p>
+            <a:endParaRPr lang="en-GB" dirty="0"/>
+          </a:p>
+          <a:p>
+            <a:r>
+              <a:rPr lang="en-GB" dirty="0"/>
+              <a:t>Part 1</a:t>
+            </a:r>
+          </a:p>
+          <a:p>
+            <a:pPr lvl="1"/>
+            <a:r>
+              <a:rPr lang="en-GB" dirty="0"/>
+              <a:t>React</a:t>
+            </a:r>
+          </a:p>
+          <a:p>
+            <a:pPr lvl="1"/>
+            <a:r>
+              <a:rPr lang="en-GB" dirty="0" err="1"/>
+              <a:t>TypeScript</a:t>
+            </a:r>
+            <a:endParaRPr lang="en-GB" dirty="0"/>
+          </a:p>
+          <a:p>
+            <a:pPr lvl="1"/>
+            <a:r>
+              <a:rPr lang="en-GB" dirty="0" err="1"/>
+              <a:t>Webpack</a:t>
+            </a:r>
+            <a:endParaRPr lang="en-GB" dirty="0"/>
+          </a:p>
+          <a:p>
+            <a:pPr lvl="1"/>
+            <a:endParaRPr lang="en-GB" dirty="0"/>
+          </a:p>
+          <a:p>
+            <a:r>
+              <a:rPr lang="en-GB" dirty="0"/>
+              <a:t>Part 2</a:t>
+            </a:r>
+          </a:p>
+          <a:p>
+            <a:pPr lvl="1"/>
+            <a:r>
+              <a:rPr lang="en-GB" dirty="0"/>
+              <a:t>Visual Studio</a:t>
+            </a:r>
+          </a:p>
+          <a:p>
+            <a:pPr lvl="1"/>
+            <a:endParaRPr lang="en-GB" dirty="0"/>
+          </a:p>
+          <a:p>
+            <a:pPr lvl="1"/>
+            <a:endParaRPr lang="en-GB" dirty="0"/>
+          </a:p>
+          <a:p>
+            <a:pPr lvl="1"/>
+            <a:endParaRPr lang="en-GB" dirty="0"/>
+          </a:p>
+          <a:p>
+            <a:pPr lvl="1"/>
+            <a:endParaRPr lang="en-GB" dirty="0"/>
           </a:p>
         </p:txBody>
       </p:sp>
@@ -3217,9 +3423,619 @@
         </p:txBody>
       </p:sp>
     </p:spTree>
+    <p:custDataLst>
+      <p:tags r:id="rId1"/>
+    </p:custDataLst>
     <p:extLst>
       <p:ext uri="{BB962C8B-B14F-4D97-AF65-F5344CB8AC3E}">
-        <p14:creationId xmlns:p14="http://schemas.microsoft.com/office/powerpoint/2010/main" val="3242514119"/>
+        <p14:creationId xmlns:p14="http://schemas.microsoft.com/office/powerpoint/2010/main" val="4085506166"/>
+      </p:ext>
+    </p:extLst>
+  </p:cSld>
+  <p:clrMapOvr>
+    <a:masterClrMapping/>
+  </p:clrMapOvr>
+</p:sld>
+</file>
+
+<file path=ppt/slides/slide4.xml><?xml version="1.0" encoding="utf-8"?>
+<p:sld xmlns:a="http://schemas.openxmlformats.org/drawingml/2006/main" xmlns:r="http://schemas.openxmlformats.org/officeDocument/2006/relationships" xmlns:p="http://schemas.openxmlformats.org/presentationml/2006/main">
+  <p:cSld>
+    <p:spTree>
+      <p:nvGrpSpPr>
+        <p:cNvPr id="1" name=""/>
+        <p:cNvGrpSpPr/>
+        <p:nvPr/>
+      </p:nvGrpSpPr>
+      <p:grpSpPr>
+        <a:xfrm>
+          <a:off x="0" y="0"/>
+          <a:ext cx="0" cy="0"/>
+          <a:chOff x="0" y="0"/>
+          <a:chExt cx="0" cy="0"/>
+        </a:xfrm>
+      </p:grpSpPr>
+      <p:sp>
+        <p:nvSpPr>
+          <p:cNvPr id="2" name="Title 1"/>
+          <p:cNvSpPr>
+            <a:spLocks noGrp="1"/>
+          </p:cNvSpPr>
+          <p:nvPr>
+            <p:ph type="title"/>
+          </p:nvPr>
+        </p:nvSpPr>
+        <p:spPr/>
+        <p:txBody>
+          <a:bodyPr/>
+          <a:lstStyle/>
+          <a:p>
+            <a:r>
+              <a:rPr lang="da-DK" dirty="0"/>
+              <a:t>Goals</a:t>
+            </a:r>
+          </a:p>
+        </p:txBody>
+      </p:sp>
+      <p:sp>
+        <p:nvSpPr>
+          <p:cNvPr id="3" name="Content Placeholder 2"/>
+          <p:cNvSpPr>
+            <a:spLocks noGrp="1"/>
+          </p:cNvSpPr>
+          <p:nvPr>
+            <p:ph idx="1"/>
+          </p:nvPr>
+        </p:nvSpPr>
+        <p:spPr/>
+        <p:txBody>
+          <a:bodyPr/>
+          <a:lstStyle/>
+          <a:p>
+            <a:r>
+              <a:rPr lang="da-DK" dirty="0"/>
+              <a:t>Basic understanding of React, Webpack and TypeScript</a:t>
+            </a:r>
+          </a:p>
+          <a:p>
+            <a:endParaRPr lang="da-DK" dirty="0"/>
+          </a:p>
+          <a:p>
+            <a:pPr marL="0" indent="0">
+              <a:buNone/>
+            </a:pPr>
+            <a:endParaRPr lang="da-DK" dirty="0"/>
+          </a:p>
+        </p:txBody>
+      </p:sp>
+      <p:sp>
+        <p:nvSpPr>
+          <p:cNvPr id="4" name="Slide Number Placeholder 3"/>
+          <p:cNvSpPr>
+            <a:spLocks noGrp="1"/>
+          </p:cNvSpPr>
+          <p:nvPr>
+            <p:ph type="sldNum" sz="quarter" idx="12"/>
+          </p:nvPr>
+        </p:nvSpPr>
+        <p:spPr/>
+        <p:txBody>
+          <a:bodyPr/>
+          <a:lstStyle/>
+          <a:p>
+            <a:fld id="{0B0DDA44-FDCB-445C-9AC0-37FB199E677B}" type="slidenum">
+              <a:rPr lang="en-US" smtClean="0"/>
+              <a:pPr/>
+              <a:t>4</a:t>
+            </a:fld>
+            <a:endParaRPr lang="en-US" dirty="0"/>
+          </a:p>
+        </p:txBody>
+      </p:sp>
+    </p:spTree>
+    <p:extLst>
+      <p:ext uri="{BB962C8B-B14F-4D97-AF65-F5344CB8AC3E}">
+        <p14:creationId xmlns:p14="http://schemas.microsoft.com/office/powerpoint/2010/main" val="3704972693"/>
+      </p:ext>
+    </p:extLst>
+  </p:cSld>
+  <p:clrMapOvr>
+    <a:masterClrMapping/>
+  </p:clrMapOvr>
+</p:sld>
+</file>
+
+<file path=ppt/slides/slide5.xml><?xml version="1.0" encoding="utf-8"?>
+<p:sld xmlns:a="http://schemas.openxmlformats.org/drawingml/2006/main" xmlns:r="http://schemas.openxmlformats.org/officeDocument/2006/relationships" xmlns:p="http://schemas.openxmlformats.org/presentationml/2006/main">
+  <p:cSld>
+    <p:spTree>
+      <p:nvGrpSpPr>
+        <p:cNvPr id="1" name=""/>
+        <p:cNvGrpSpPr/>
+        <p:nvPr/>
+      </p:nvGrpSpPr>
+      <p:grpSpPr>
+        <a:xfrm>
+          <a:off x="0" y="0"/>
+          <a:ext cx="0" cy="0"/>
+          <a:chOff x="0" y="0"/>
+          <a:chExt cx="0" cy="0"/>
+        </a:xfrm>
+      </p:grpSpPr>
+      <p:sp>
+        <p:nvSpPr>
+          <p:cNvPr id="2" name="Title 1"/>
+          <p:cNvSpPr>
+            <a:spLocks noGrp="1"/>
+          </p:cNvSpPr>
+          <p:nvPr>
+            <p:ph type="title"/>
+          </p:nvPr>
+        </p:nvSpPr>
+        <p:spPr/>
+        <p:txBody>
+          <a:bodyPr/>
+          <a:lstStyle/>
+          <a:p>
+            <a:r>
+              <a:rPr lang="da-DK" dirty="0"/>
+              <a:t>Approach</a:t>
+            </a:r>
+          </a:p>
+        </p:txBody>
+      </p:sp>
+      <p:sp>
+        <p:nvSpPr>
+          <p:cNvPr id="3" name="Content Placeholder 2"/>
+          <p:cNvSpPr>
+            <a:spLocks noGrp="1"/>
+          </p:cNvSpPr>
+          <p:nvPr>
+            <p:ph idx="1"/>
+          </p:nvPr>
+        </p:nvSpPr>
+        <p:spPr/>
+        <p:txBody>
+          <a:bodyPr/>
+          <a:lstStyle/>
+          <a:p>
+            <a:r>
+              <a:rPr lang="da-DK" dirty="0"/>
+              <a:t>Show how everything works from the ground up</a:t>
+            </a:r>
+          </a:p>
+          <a:p>
+            <a:r>
+              <a:rPr lang="da-DK" dirty="0"/>
+              <a:t>Each library in isolation to understand them</a:t>
+            </a:r>
+          </a:p>
+          <a:p>
+            <a:r>
+              <a:rPr lang="da-DK"/>
+              <a:t>Common boilerplates usually have 100+ lines of configuration and 20+ npm packages</a:t>
+            </a:r>
+            <a:endParaRPr lang="da-DK" dirty="0"/>
+          </a:p>
+        </p:txBody>
+      </p:sp>
+      <p:sp>
+        <p:nvSpPr>
+          <p:cNvPr id="4" name="Slide Number Placeholder 3"/>
+          <p:cNvSpPr>
+            <a:spLocks noGrp="1"/>
+          </p:cNvSpPr>
+          <p:nvPr>
+            <p:ph type="sldNum" sz="quarter" idx="12"/>
+          </p:nvPr>
+        </p:nvSpPr>
+        <p:spPr/>
+        <p:txBody>
+          <a:bodyPr/>
+          <a:lstStyle/>
+          <a:p>
+            <a:fld id="{0B0DDA44-FDCB-445C-9AC0-37FB199E677B}" type="slidenum">
+              <a:rPr lang="en-US" smtClean="0"/>
+              <a:pPr/>
+              <a:t>5</a:t>
+            </a:fld>
+            <a:endParaRPr lang="en-US" dirty="0"/>
+          </a:p>
+        </p:txBody>
+      </p:sp>
+    </p:spTree>
+    <p:extLst>
+      <p:ext uri="{BB962C8B-B14F-4D97-AF65-F5344CB8AC3E}">
+        <p14:creationId xmlns:p14="http://schemas.microsoft.com/office/powerpoint/2010/main" val="1861659024"/>
+      </p:ext>
+    </p:extLst>
+  </p:cSld>
+  <p:clrMapOvr>
+    <a:masterClrMapping/>
+  </p:clrMapOvr>
+</p:sld>
+</file>
+
+<file path=ppt/slides/slide6.xml><?xml version="1.0" encoding="utf-8"?>
+<p:sld xmlns:a="http://schemas.openxmlformats.org/drawingml/2006/main" xmlns:r="http://schemas.openxmlformats.org/officeDocument/2006/relationships" xmlns:p="http://schemas.openxmlformats.org/presentationml/2006/main">
+  <p:cSld>
+    <p:spTree>
+      <p:nvGrpSpPr>
+        <p:cNvPr id="1" name=""/>
+        <p:cNvGrpSpPr/>
+        <p:nvPr/>
+      </p:nvGrpSpPr>
+      <p:grpSpPr>
+        <a:xfrm>
+          <a:off x="0" y="0"/>
+          <a:ext cx="0" cy="0"/>
+          <a:chOff x="0" y="0"/>
+          <a:chExt cx="0" cy="0"/>
+        </a:xfrm>
+      </p:grpSpPr>
+      <p:sp>
+        <p:nvSpPr>
+          <p:cNvPr id="2" name="Title 1"/>
+          <p:cNvSpPr>
+            <a:spLocks noGrp="1"/>
+          </p:cNvSpPr>
+          <p:nvPr>
+            <p:ph type="title"/>
+          </p:nvPr>
+        </p:nvSpPr>
+        <p:spPr/>
+        <p:txBody>
+          <a:bodyPr/>
+          <a:lstStyle/>
+          <a:p>
+            <a:r>
+              <a:rPr lang="da-DK" dirty="0"/>
+              <a:t>Templafy</a:t>
+            </a:r>
+          </a:p>
+        </p:txBody>
+      </p:sp>
+      <p:sp>
+        <p:nvSpPr>
+          <p:cNvPr id="3" name="Content Placeholder 2"/>
+          <p:cNvSpPr>
+            <a:spLocks noGrp="1"/>
+          </p:cNvSpPr>
+          <p:nvPr>
+            <p:ph idx="1"/>
+          </p:nvPr>
+        </p:nvSpPr>
+        <p:spPr/>
+        <p:txBody>
+          <a:bodyPr/>
+          <a:lstStyle/>
+          <a:p>
+            <a:endParaRPr lang="da-DK" dirty="0"/>
+          </a:p>
+        </p:txBody>
+      </p:sp>
+      <p:sp>
+        <p:nvSpPr>
+          <p:cNvPr id="4" name="Slide Number Placeholder 3"/>
+          <p:cNvSpPr>
+            <a:spLocks noGrp="1"/>
+          </p:cNvSpPr>
+          <p:nvPr>
+            <p:ph type="sldNum" sz="quarter" idx="12"/>
+          </p:nvPr>
+        </p:nvSpPr>
+        <p:spPr/>
+        <p:txBody>
+          <a:bodyPr/>
+          <a:lstStyle/>
+          <a:p>
+            <a:fld id="{0B0DDA44-FDCB-445C-9AC0-37FB199E677B}" type="slidenum">
+              <a:rPr lang="en-US" smtClean="0"/>
+              <a:pPr/>
+              <a:t>6</a:t>
+            </a:fld>
+            <a:endParaRPr lang="en-US" dirty="0"/>
+          </a:p>
+        </p:txBody>
+      </p:sp>
+    </p:spTree>
+    <p:extLst>
+      <p:ext uri="{BB962C8B-B14F-4D97-AF65-F5344CB8AC3E}">
+        <p14:creationId xmlns:p14="http://schemas.microsoft.com/office/powerpoint/2010/main" val="3510273371"/>
+      </p:ext>
+    </p:extLst>
+  </p:cSld>
+  <p:clrMapOvr>
+    <a:masterClrMapping/>
+  </p:clrMapOvr>
+</p:sld>
+</file>
+
+<file path=ppt/slides/slide7.xml><?xml version="1.0" encoding="utf-8"?>
+<p:sld xmlns:a="http://schemas.openxmlformats.org/drawingml/2006/main" xmlns:r="http://schemas.openxmlformats.org/officeDocument/2006/relationships" xmlns:p="http://schemas.openxmlformats.org/presentationml/2006/main">
+  <p:cSld>
+    <p:spTree>
+      <p:nvGrpSpPr>
+        <p:cNvPr id="1" name=""/>
+        <p:cNvGrpSpPr/>
+        <p:nvPr/>
+      </p:nvGrpSpPr>
+      <p:grpSpPr>
+        <a:xfrm>
+          <a:off x="0" y="0"/>
+          <a:ext cx="0" cy="0"/>
+          <a:chOff x="0" y="0"/>
+          <a:chExt cx="0" cy="0"/>
+        </a:xfrm>
+      </p:grpSpPr>
+      <p:sp>
+        <p:nvSpPr>
+          <p:cNvPr id="2" name="Title 1"/>
+          <p:cNvSpPr>
+            <a:spLocks noGrp="1"/>
+          </p:cNvSpPr>
+          <p:nvPr>
+            <p:ph type="title"/>
+          </p:nvPr>
+        </p:nvSpPr>
+        <p:spPr/>
+        <p:txBody>
+          <a:bodyPr/>
+          <a:lstStyle/>
+          <a:p>
+            <a:r>
+              <a:rPr lang="da-DK" dirty="0"/>
+              <a:t>Templafy Migration Story</a:t>
+            </a:r>
+          </a:p>
+        </p:txBody>
+      </p:sp>
+      <p:sp>
+        <p:nvSpPr>
+          <p:cNvPr id="3" name="Content Placeholder 2"/>
+          <p:cNvSpPr>
+            <a:spLocks noGrp="1"/>
+          </p:cNvSpPr>
+          <p:nvPr>
+            <p:ph idx="1"/>
+          </p:nvPr>
+        </p:nvSpPr>
+        <p:spPr/>
+        <p:txBody>
+          <a:bodyPr/>
+          <a:lstStyle/>
+          <a:p>
+            <a:r>
+              <a:rPr lang="da-DK" dirty="0"/>
+              <a:t>Migration from Knockout.js to React</a:t>
+            </a:r>
+          </a:p>
+          <a:p>
+            <a:endParaRPr lang="da-DK" dirty="0"/>
+          </a:p>
+          <a:p>
+            <a:endParaRPr lang="da-DK" dirty="0"/>
+          </a:p>
+        </p:txBody>
+      </p:sp>
+      <p:sp>
+        <p:nvSpPr>
+          <p:cNvPr id="4" name="Slide Number Placeholder 3"/>
+          <p:cNvSpPr>
+            <a:spLocks noGrp="1"/>
+          </p:cNvSpPr>
+          <p:nvPr>
+            <p:ph type="sldNum" sz="quarter" idx="12"/>
+          </p:nvPr>
+        </p:nvSpPr>
+        <p:spPr/>
+        <p:txBody>
+          <a:bodyPr/>
+          <a:lstStyle/>
+          <a:p>
+            <a:fld id="{0B0DDA44-FDCB-445C-9AC0-37FB199E677B}" type="slidenum">
+              <a:rPr lang="en-US" smtClean="0"/>
+              <a:pPr/>
+              <a:t>7</a:t>
+            </a:fld>
+            <a:endParaRPr lang="en-US" dirty="0"/>
+          </a:p>
+        </p:txBody>
+      </p:sp>
+    </p:spTree>
+    <p:extLst>
+      <p:ext uri="{BB962C8B-B14F-4D97-AF65-F5344CB8AC3E}">
+        <p14:creationId xmlns:p14="http://schemas.microsoft.com/office/powerpoint/2010/main" val="397152675"/>
+      </p:ext>
+    </p:extLst>
+  </p:cSld>
+  <p:clrMapOvr>
+    <a:masterClrMapping/>
+  </p:clrMapOvr>
+</p:sld>
+</file>
+
+<file path=ppt/slides/slide8.xml><?xml version="1.0" encoding="utf-8"?>
+<p:sld xmlns:a="http://schemas.openxmlformats.org/drawingml/2006/main" xmlns:r="http://schemas.openxmlformats.org/officeDocument/2006/relationships" xmlns:p="http://schemas.openxmlformats.org/presentationml/2006/main">
+  <p:cSld>
+    <p:spTree>
+      <p:nvGrpSpPr>
+        <p:cNvPr id="1" name=""/>
+        <p:cNvGrpSpPr/>
+        <p:nvPr/>
+      </p:nvGrpSpPr>
+      <p:grpSpPr>
+        <a:xfrm>
+          <a:off x="0" y="0"/>
+          <a:ext cx="0" cy="0"/>
+          <a:chOff x="0" y="0"/>
+          <a:chExt cx="0" cy="0"/>
+        </a:xfrm>
+      </p:grpSpPr>
+      <p:sp>
+        <p:nvSpPr>
+          <p:cNvPr id="2" name="Title 1"/>
+          <p:cNvSpPr>
+            <a:spLocks noGrp="1"/>
+          </p:cNvSpPr>
+          <p:nvPr>
+            <p:ph type="title"/>
+          </p:nvPr>
+        </p:nvSpPr>
+        <p:spPr/>
+        <p:txBody>
+          <a:bodyPr/>
+          <a:lstStyle/>
+          <a:p>
+            <a:r>
+              <a:rPr lang="da-DK" dirty="0"/>
+              <a:t>Part 1</a:t>
+            </a:r>
+          </a:p>
+        </p:txBody>
+      </p:sp>
+      <p:sp>
+        <p:nvSpPr>
+          <p:cNvPr id="3" name="Content Placeholder 2"/>
+          <p:cNvSpPr>
+            <a:spLocks noGrp="1"/>
+          </p:cNvSpPr>
+          <p:nvPr>
+            <p:ph idx="1"/>
+          </p:nvPr>
+        </p:nvSpPr>
+        <p:spPr/>
+        <p:txBody>
+          <a:bodyPr/>
+          <a:lstStyle/>
+          <a:p>
+            <a:endParaRPr lang="da-DK"/>
+          </a:p>
+        </p:txBody>
+      </p:sp>
+      <p:sp>
+        <p:nvSpPr>
+          <p:cNvPr id="4" name="Slide Number Placeholder 3"/>
+          <p:cNvSpPr>
+            <a:spLocks noGrp="1"/>
+          </p:cNvSpPr>
+          <p:nvPr>
+            <p:ph type="sldNum" sz="quarter" idx="12"/>
+          </p:nvPr>
+        </p:nvSpPr>
+        <p:spPr/>
+        <p:txBody>
+          <a:bodyPr/>
+          <a:lstStyle/>
+          <a:p>
+            <a:fld id="{0B0DDA44-FDCB-445C-9AC0-37FB199E677B}" type="slidenum">
+              <a:rPr lang="en-US" smtClean="0"/>
+              <a:pPr/>
+              <a:t>8</a:t>
+            </a:fld>
+            <a:endParaRPr lang="en-US" dirty="0"/>
+          </a:p>
+        </p:txBody>
+      </p:sp>
+    </p:spTree>
+    <p:extLst>
+      <p:ext uri="{BB962C8B-B14F-4D97-AF65-F5344CB8AC3E}">
+        <p14:creationId xmlns:p14="http://schemas.microsoft.com/office/powerpoint/2010/main" val="2693261336"/>
+      </p:ext>
+    </p:extLst>
+  </p:cSld>
+  <p:clrMapOvr>
+    <a:masterClrMapping/>
+  </p:clrMapOvr>
+</p:sld>
+</file>
+
+<file path=ppt/slides/slide9.xml><?xml version="1.0" encoding="utf-8"?>
+<p:sld xmlns:a="http://schemas.openxmlformats.org/drawingml/2006/main" xmlns:r="http://schemas.openxmlformats.org/officeDocument/2006/relationships" xmlns:p="http://schemas.openxmlformats.org/presentationml/2006/main">
+  <p:cSld>
+    <p:spTree>
+      <p:nvGrpSpPr>
+        <p:cNvPr id="1" name=""/>
+        <p:cNvGrpSpPr/>
+        <p:nvPr/>
+      </p:nvGrpSpPr>
+      <p:grpSpPr>
+        <a:xfrm>
+          <a:off x="0" y="0"/>
+          <a:ext cx="0" cy="0"/>
+          <a:chOff x="0" y="0"/>
+          <a:chExt cx="0" cy="0"/>
+        </a:xfrm>
+      </p:grpSpPr>
+      <p:sp>
+        <p:nvSpPr>
+          <p:cNvPr id="2" name="Title 1"/>
+          <p:cNvSpPr>
+            <a:spLocks noGrp="1"/>
+          </p:cNvSpPr>
+          <p:nvPr>
+            <p:ph type="title"/>
+          </p:nvPr>
+        </p:nvSpPr>
+        <p:spPr/>
+        <p:txBody>
+          <a:bodyPr/>
+          <a:lstStyle/>
+          <a:p>
+            <a:r>
+              <a:rPr lang="da-DK" dirty="0"/>
+              <a:t>React Component Lifecycle</a:t>
+            </a:r>
+          </a:p>
+        </p:txBody>
+      </p:sp>
+      <p:sp>
+        <p:nvSpPr>
+          <p:cNvPr id="3" name="Content Placeholder 2"/>
+          <p:cNvSpPr>
+            <a:spLocks noGrp="1"/>
+          </p:cNvSpPr>
+          <p:nvPr>
+            <p:ph idx="1"/>
+          </p:nvPr>
+        </p:nvSpPr>
+        <p:spPr/>
+        <p:txBody>
+          <a:bodyPr/>
+          <a:lstStyle/>
+          <a:p>
+            <a:endParaRPr lang="da-DK" dirty="0"/>
+          </a:p>
+        </p:txBody>
+      </p:sp>
+      <p:sp>
+        <p:nvSpPr>
+          <p:cNvPr id="4" name="Slide Number Placeholder 3"/>
+          <p:cNvSpPr>
+            <a:spLocks noGrp="1"/>
+          </p:cNvSpPr>
+          <p:nvPr>
+            <p:ph type="sldNum" sz="quarter" idx="12"/>
+          </p:nvPr>
+        </p:nvSpPr>
+        <p:spPr/>
+        <p:txBody>
+          <a:bodyPr/>
+          <a:lstStyle/>
+          <a:p>
+            <a:fld id="{0B0DDA44-FDCB-445C-9AC0-37FB199E677B}" type="slidenum">
+              <a:rPr lang="en-US" smtClean="0"/>
+              <a:pPr/>
+              <a:t>9</a:t>
+            </a:fld>
+            <a:endParaRPr lang="en-US" dirty="0"/>
+          </a:p>
+        </p:txBody>
+      </p:sp>
+    </p:spTree>
+    <p:extLst>
+      <p:ext uri="{BB962C8B-B14F-4D97-AF65-F5344CB8AC3E}">
+        <p14:creationId xmlns:p14="http://schemas.microsoft.com/office/powerpoint/2010/main" val="1309177343"/>
       </p:ext>
     </p:extLst>
   </p:cSld>

</xml_diff>

<commit_message>
Added logos. More work on presentation.
</commit_message>
<xml_diff>
--- a/_notes/Presentation.pptx
+++ b/_notes/Presentation.pptx
@@ -5,28 +5,31 @@
     <p:sldMasterId id="2147483648" r:id="rId1"/>
   </p:sldMasterIdLst>
   <p:notesMasterIdLst>
-    <p:notesMasterId r:id="rId13"/>
+    <p:notesMasterId r:id="rId16"/>
   </p:notesMasterIdLst>
   <p:handoutMasterIdLst>
-    <p:handoutMasterId r:id="rId14"/>
+    <p:handoutMasterId r:id="rId17"/>
   </p:handoutMasterIdLst>
   <p:sldIdLst>
     <p:sldId id="256" r:id="rId2"/>
     <p:sldId id="264" r:id="rId3"/>
     <p:sldId id="257" r:id="rId4"/>
-    <p:sldId id="265" r:id="rId5"/>
+    <p:sldId id="267" r:id="rId5"/>
     <p:sldId id="266" r:id="rId6"/>
     <p:sldId id="260" r:id="rId7"/>
     <p:sldId id="259" r:id="rId8"/>
-    <p:sldId id="261" r:id="rId9"/>
-    <p:sldId id="263" r:id="rId10"/>
-    <p:sldId id="262" r:id="rId11"/>
-    <p:sldId id="258" r:id="rId12"/>
+    <p:sldId id="265" r:id="rId9"/>
+    <p:sldId id="270" r:id="rId10"/>
+    <p:sldId id="268" r:id="rId11"/>
+    <p:sldId id="269" r:id="rId12"/>
+    <p:sldId id="263" r:id="rId13"/>
+    <p:sldId id="258" r:id="rId14"/>
+    <p:sldId id="271" r:id="rId15"/>
   </p:sldIdLst>
   <p:sldSz cx="12192000" cy="6858000"/>
   <p:notesSz cx="6797675" cy="9926638"/>
   <p:custDataLst>
-    <p:tags r:id="rId15"/>
+    <p:tags r:id="rId18"/>
   </p:custDataLst>
   <p:defaultTextStyle>
     <a:defPPr>
@@ -125,7 +128,7 @@
   </p:defaultTextStyle>
   <p:extLst>
     <p:ext uri="{EFAFB233-063F-42B5-8137-9DF3F51BA10A}">
-      <p15:sldGuideLst xmlns:p15="http://schemas.microsoft.com/office/powerpoint/2012/main"/>
+      <p15:sldGuideLst xmlns:p15="http://schemas.microsoft.com/office/powerpoint/2012/main" xmlns=""/>
     </p:ext>
   </p:extLst>
 </p:presentation>
@@ -218,7 +221,7 @@
                 <a:latin typeface="Arial" panose="020B0604020202020204" pitchFamily="34" charset="0"/>
               </a:rPr>
               <a:pPr/>
-              <a:t>2/23/2017</a:t>
+              <a:t>2/27/2017</a:t>
             </a:fld>
             <a:endParaRPr lang="en-US" dirty="0">
               <a:latin typeface="Arial" panose="020B0604020202020204" pitchFamily="34" charset="0"/>
@@ -397,7 +400,7 @@
             <a:fld id="{24063557-F382-450A-AFD2-DBDF34A23BF0}" type="datetimeFigureOut">
               <a:rPr lang="en-US"/>
               <a:pPr/>
-              <a:t>2/23/2017</a:t>
+              <a:t>2/27/2017</a:t>
             </a:fld>
             <a:endParaRPr lang="en-US" dirty="0"/>
           </a:p>
@@ -906,7 +909,7 @@
           <a:p>
             <a:fld id="{7A57692F-3CBA-4355-8A55-3D1B2312D0DE}" type="datetime1">
               <a:rPr lang="en-GB" smtClean="0"/>
-              <a:t>23/02/2017</a:t>
+              <a:t>27/02/2017</a:t>
             </a:fld>
             <a:endParaRPr lang="en-US" dirty="0"/>
           </a:p>
@@ -1186,7 +1189,7 @@
           <a:p>
             <a:fld id="{B4A1A81C-3A2B-4225-BBCB-B5EEA77564DE}" type="datetime1">
               <a:rPr lang="en-GB" smtClean="0"/>
-              <a:t>23/02/2017</a:t>
+              <a:t>27/02/2017</a:t>
             </a:fld>
             <a:endParaRPr lang="en-US" dirty="0"/>
           </a:p>
@@ -1297,7 +1300,7 @@
           <a:p>
             <a:fld id="{1C778B45-47DF-45E1-89C8-21A4AAE5193A}" type="datetime1">
               <a:rPr lang="en-GB" smtClean="0"/>
-              <a:t>23/02/2017</a:t>
+              <a:t>27/02/2017</a:t>
             </a:fld>
             <a:endParaRPr lang="en-US" dirty="0"/>
           </a:p>
@@ -1440,7 +1443,7 @@
           <a:p>
             <a:fld id="{B28390F5-47C7-4B4F-B500-E9F9053405DD}" type="datetime1">
               <a:rPr lang="en-GB" smtClean="0"/>
-              <a:t>23/02/2017</a:t>
+              <a:t>27/02/2017</a:t>
             </a:fld>
             <a:endParaRPr lang="en-US" dirty="0"/>
           </a:p>
@@ -1670,7 +1673,7 @@
           <a:p>
             <a:fld id="{EAA636A3-88D2-4DAD-BA2B-1456EFB0EA1A}" type="datetime1">
               <a:rPr lang="en-GB" smtClean="0"/>
-              <a:t>23/02/2017</a:t>
+              <a:t>27/02/2017</a:t>
             </a:fld>
             <a:endParaRPr lang="en-GB"/>
           </a:p>
@@ -1813,7 +1816,7 @@
           <a:p>
             <a:fld id="{07BD2638-165F-459F-9AC9-17734AB1218F}" type="datetime1">
               <a:rPr lang="en-GB" smtClean="0"/>
-              <a:t>23/02/2017</a:t>
+              <a:t>27/02/2017</a:t>
             </a:fld>
             <a:endParaRPr lang="en-GB"/>
           </a:p>
@@ -2114,7 +2117,7 @@
           <a:p>
             <a:fld id="{2DA4D049-087C-4FCD-8FBA-8677853A664C}" type="datetime1">
               <a:rPr lang="en-GB" smtClean="0"/>
-              <a:t>23/02/2017</a:t>
+              <a:t>27/02/2017</a:t>
             </a:fld>
             <a:endParaRPr lang="da-DK" dirty="0"/>
           </a:p>
@@ -2227,7 +2230,7 @@
           <a:graphicData uri="http://schemas.openxmlformats.org/presentationml/2006/ole">
             <mc:AlternateContent xmlns:mc="http://schemas.openxmlformats.org/markup-compatibility/2006">
               <mc:Choice xmlns:v="urn:schemas-microsoft-com:vml" Requires="v">
-                <p:oleObj spid="_x0000_s1112" name="think-cell Slide" r:id="rId11" imgW="473" imgH="473" progId="TCLayout.ActiveDocument.1">
+                <p:oleObj spid="_x0000_s1132" name="think-cell Slide" r:id="rId11" imgW="473" imgH="473" progId="TCLayout.ActiveDocument.1">
                   <p:embed/>
                 </p:oleObj>
               </mc:Choice>
@@ -2576,7 +2579,7 @@
           <a:p>
             <a:fld id="{460F4891-E81A-49DA-A060-8B93BF9F824E}" type="datetime1">
               <a:rPr lang="en-GB" smtClean="0"/>
-              <a:t>23/02/2017</a:t>
+              <a:t>27/02/2017</a:t>
             </a:fld>
             <a:endParaRPr lang="da-DK"/>
           </a:p>
@@ -2852,7 +2855,7 @@
   </p:txStyles>
   <p:extLst mod="1">
     <p:ext uri="{27BBF7A9-308A-43DC-89C8-2F10F3537804}">
-      <p15:sldGuideLst xmlns:p15="http://schemas.microsoft.com/office/powerpoint/2012/main">
+      <p15:sldGuideLst xmlns:p15="http://schemas.microsoft.com/office/powerpoint/2012/main" xmlns="">
         <p15:guide id="1" pos="384" userDrawn="1">
           <p15:clr>
             <a:srgbClr val="F26B43"/>
@@ -3009,9 +3012,10 @@
           <a:lstStyle/>
           <a:p>
             <a:r>
-              <a:rPr lang="da-DK" dirty="0"/>
-              <a:t>Part 2</a:t>
-            </a:r>
+              <a:rPr lang="da-DK" dirty="0" smtClean="0"/>
+              <a:t>React</a:t>
+            </a:r>
+            <a:endParaRPr lang="da-DK" dirty="0"/>
           </a:p>
         </p:txBody>
       </p:sp>
@@ -3030,7 +3034,19 @@
           <a:bodyPr/>
           <a:lstStyle/>
           <a:p>
-            <a:endParaRPr lang="da-DK"/>
+            <a:r>
+              <a:rPr lang="en-US" dirty="0"/>
+              <a:t>Function from data to </a:t>
+            </a:r>
+            <a:r>
+              <a:rPr lang="en-US" dirty="0" err="1"/>
+              <a:t>ui</a:t>
+            </a:r>
+            <a:r>
+              <a:rPr lang="en-US" dirty="0"/>
+              <a:t> description</a:t>
+            </a:r>
+            <a:endParaRPr lang="da-DK" dirty="0"/>
           </a:p>
         </p:txBody>
       </p:sp>
@@ -3061,7 +3077,7 @@
     </p:spTree>
     <p:extLst>
       <p:ext uri="{BB962C8B-B14F-4D97-AF65-F5344CB8AC3E}">
-        <p14:creationId xmlns:p14="http://schemas.microsoft.com/office/powerpoint/2010/main" val="2946895448"/>
+        <p14:creationId xmlns:p14="http://schemas.microsoft.com/office/powerpoint/2010/main" val="3157903745"/>
       </p:ext>
     </p:extLst>
   </p:cSld>
@@ -3104,9 +3120,10 @@
           <a:lstStyle/>
           <a:p>
             <a:r>
-              <a:rPr lang="da-DK" dirty="0"/>
-              <a:t>ASP.NET Core</a:t>
-            </a:r>
+              <a:rPr lang="da-DK" dirty="0" smtClean="0"/>
+              <a:t>Why not Angular 2</a:t>
+            </a:r>
+            <a:endParaRPr lang="da-DK" dirty="0"/>
           </a:p>
         </p:txBody>
       </p:sp>
@@ -3125,7 +3142,44 @@
           <a:bodyPr/>
           <a:lstStyle/>
           <a:p>
-            <a:endParaRPr lang="da-DK"/>
+            <a:r>
+              <a:rPr lang="da-DK" dirty="0" smtClean="0"/>
+              <a:t>Angular 2 was released in September 2016</a:t>
+            </a:r>
+          </a:p>
+          <a:p>
+            <a:endParaRPr lang="da-DK" dirty="0" smtClean="0"/>
+          </a:p>
+          <a:p>
+            <a:r>
+              <a:rPr lang="da-DK" dirty="0" smtClean="0"/>
+              <a:t>Big changes during beta and RC of Angular</a:t>
+            </a:r>
+          </a:p>
+          <a:p>
+            <a:pPr lvl="1"/>
+            <a:r>
+              <a:rPr lang="da-DK" dirty="0" smtClean="0"/>
+              <a:t>Fragmentation on Stack Overflow</a:t>
+            </a:r>
+          </a:p>
+          <a:p>
+            <a:endParaRPr lang="da-DK" dirty="0" smtClean="0"/>
+          </a:p>
+          <a:p>
+            <a:r>
+              <a:rPr lang="da-DK" dirty="0" smtClean="0"/>
+              <a:t>JSX + TypeScript vs custom template language</a:t>
+            </a:r>
+          </a:p>
+          <a:p>
+            <a:endParaRPr lang="da-DK" dirty="0" smtClean="0"/>
+          </a:p>
+          <a:p>
+            <a:endParaRPr lang="da-DK" dirty="0" smtClean="0"/>
+          </a:p>
+          <a:p>
+            <a:endParaRPr lang="da-DK" dirty="0"/>
           </a:p>
         </p:txBody>
       </p:sp>
@@ -3156,7 +3210,304 @@
     </p:spTree>
     <p:extLst>
       <p:ext uri="{BB962C8B-B14F-4D97-AF65-F5344CB8AC3E}">
+        <p14:creationId xmlns:p14="http://schemas.microsoft.com/office/powerpoint/2010/main" val="73486684"/>
+      </p:ext>
+    </p:extLst>
+  </p:cSld>
+  <p:clrMapOvr>
+    <a:masterClrMapping/>
+  </p:clrMapOvr>
+</p:sld>
+</file>
+
+<file path=ppt/slides/slide12.xml><?xml version="1.0" encoding="utf-8"?>
+<p:sld xmlns:a="http://schemas.openxmlformats.org/drawingml/2006/main" xmlns:r="http://schemas.openxmlformats.org/officeDocument/2006/relationships" xmlns:p="http://schemas.openxmlformats.org/presentationml/2006/main">
+  <p:cSld>
+    <p:spTree>
+      <p:nvGrpSpPr>
+        <p:cNvPr id="1" name=""/>
+        <p:cNvGrpSpPr/>
+        <p:nvPr/>
+      </p:nvGrpSpPr>
+      <p:grpSpPr>
+        <a:xfrm>
+          <a:off x="0" y="0"/>
+          <a:ext cx="0" cy="0"/>
+          <a:chOff x="0" y="0"/>
+          <a:chExt cx="0" cy="0"/>
+        </a:xfrm>
+      </p:grpSpPr>
+      <p:sp>
+        <p:nvSpPr>
+          <p:cNvPr id="2" name="Title 1"/>
+          <p:cNvSpPr>
+            <a:spLocks noGrp="1"/>
+          </p:cNvSpPr>
+          <p:nvPr>
+            <p:ph type="title"/>
+          </p:nvPr>
+        </p:nvSpPr>
+        <p:spPr/>
+        <p:txBody>
+          <a:bodyPr/>
+          <a:lstStyle/>
+          <a:p>
+            <a:r>
+              <a:rPr lang="da-DK" dirty="0"/>
+              <a:t>React Component Lifecycle</a:t>
+            </a:r>
+          </a:p>
+        </p:txBody>
+      </p:sp>
+      <p:sp>
+        <p:nvSpPr>
+          <p:cNvPr id="3" name="Content Placeholder 2"/>
+          <p:cNvSpPr>
+            <a:spLocks noGrp="1"/>
+          </p:cNvSpPr>
+          <p:nvPr>
+            <p:ph idx="1"/>
+          </p:nvPr>
+        </p:nvSpPr>
+        <p:spPr/>
+        <p:txBody>
+          <a:bodyPr/>
+          <a:lstStyle/>
+          <a:p>
+            <a:endParaRPr lang="da-DK" dirty="0"/>
+          </a:p>
+        </p:txBody>
+      </p:sp>
+      <p:sp>
+        <p:nvSpPr>
+          <p:cNvPr id="4" name="Slide Number Placeholder 3"/>
+          <p:cNvSpPr>
+            <a:spLocks noGrp="1"/>
+          </p:cNvSpPr>
+          <p:nvPr>
+            <p:ph type="sldNum" sz="quarter" idx="12"/>
+          </p:nvPr>
+        </p:nvSpPr>
+        <p:spPr/>
+        <p:txBody>
+          <a:bodyPr/>
+          <a:lstStyle/>
+          <a:p>
+            <a:fld id="{0B0DDA44-FDCB-445C-9AC0-37FB199E677B}" type="slidenum">
+              <a:rPr lang="en-US" smtClean="0"/>
+              <a:pPr/>
+              <a:t>12</a:t>
+            </a:fld>
+            <a:endParaRPr lang="en-US" dirty="0"/>
+          </a:p>
+        </p:txBody>
+      </p:sp>
+    </p:spTree>
+    <p:extLst>
+      <p:ext uri="{BB962C8B-B14F-4D97-AF65-F5344CB8AC3E}">
+        <p14:creationId xmlns:p14="http://schemas.microsoft.com/office/powerpoint/2010/main" val="1309177343"/>
+      </p:ext>
+    </p:extLst>
+  </p:cSld>
+  <p:clrMapOvr>
+    <a:masterClrMapping/>
+  </p:clrMapOvr>
+</p:sld>
+</file>
+
+<file path=ppt/slides/slide13.xml><?xml version="1.0" encoding="utf-8"?>
+<p:sld xmlns:a="http://schemas.openxmlformats.org/drawingml/2006/main" xmlns:r="http://schemas.openxmlformats.org/officeDocument/2006/relationships" xmlns:p="http://schemas.openxmlformats.org/presentationml/2006/main">
+  <p:cSld>
+    <p:spTree>
+      <p:nvGrpSpPr>
+        <p:cNvPr id="1" name=""/>
+        <p:cNvGrpSpPr/>
+        <p:nvPr/>
+      </p:nvGrpSpPr>
+      <p:grpSpPr>
+        <a:xfrm>
+          <a:off x="0" y="0"/>
+          <a:ext cx="0" cy="0"/>
+          <a:chOff x="0" y="0"/>
+          <a:chExt cx="0" cy="0"/>
+        </a:xfrm>
+      </p:grpSpPr>
+      <p:sp>
+        <p:nvSpPr>
+          <p:cNvPr id="2" name="Title 1"/>
+          <p:cNvSpPr>
+            <a:spLocks noGrp="1"/>
+          </p:cNvSpPr>
+          <p:nvPr>
+            <p:ph type="title"/>
+          </p:nvPr>
+        </p:nvSpPr>
+        <p:spPr/>
+        <p:txBody>
+          <a:bodyPr/>
+          <a:lstStyle/>
+          <a:p>
+            <a:r>
+              <a:rPr lang="da-DK" dirty="0"/>
+              <a:t>ASP.NET Core</a:t>
+            </a:r>
+          </a:p>
+        </p:txBody>
+      </p:sp>
+      <p:sp>
+        <p:nvSpPr>
+          <p:cNvPr id="3" name="Content Placeholder 2"/>
+          <p:cNvSpPr>
+            <a:spLocks noGrp="1"/>
+          </p:cNvSpPr>
+          <p:nvPr>
+            <p:ph idx="1"/>
+          </p:nvPr>
+        </p:nvSpPr>
+        <p:spPr/>
+        <p:txBody>
+          <a:bodyPr/>
+          <a:lstStyle/>
+          <a:p>
+            <a:endParaRPr lang="da-DK"/>
+          </a:p>
+        </p:txBody>
+      </p:sp>
+      <p:sp>
+        <p:nvSpPr>
+          <p:cNvPr id="4" name="Slide Number Placeholder 3"/>
+          <p:cNvSpPr>
+            <a:spLocks noGrp="1"/>
+          </p:cNvSpPr>
+          <p:nvPr>
+            <p:ph type="sldNum" sz="quarter" idx="12"/>
+          </p:nvPr>
+        </p:nvSpPr>
+        <p:spPr/>
+        <p:txBody>
+          <a:bodyPr/>
+          <a:lstStyle/>
+          <a:p>
+            <a:fld id="{0B0DDA44-FDCB-445C-9AC0-37FB199E677B}" type="slidenum">
+              <a:rPr lang="en-US" smtClean="0"/>
+              <a:pPr/>
+              <a:t>13</a:t>
+            </a:fld>
+            <a:endParaRPr lang="en-US" dirty="0"/>
+          </a:p>
+        </p:txBody>
+      </p:sp>
+    </p:spTree>
+    <p:extLst>
+      <p:ext uri="{BB962C8B-B14F-4D97-AF65-F5344CB8AC3E}">
         <p14:creationId xmlns:p14="http://schemas.microsoft.com/office/powerpoint/2010/main" val="3242514119"/>
+      </p:ext>
+    </p:extLst>
+  </p:cSld>
+  <p:clrMapOvr>
+    <a:masterClrMapping/>
+  </p:clrMapOvr>
+</p:sld>
+</file>
+
+<file path=ppt/slides/slide14.xml><?xml version="1.0" encoding="utf-8"?>
+<p:sld xmlns:a="http://schemas.openxmlformats.org/drawingml/2006/main" xmlns:r="http://schemas.openxmlformats.org/officeDocument/2006/relationships" xmlns:p="http://schemas.openxmlformats.org/presentationml/2006/main">
+  <p:cSld>
+    <p:spTree>
+      <p:nvGrpSpPr>
+        <p:cNvPr id="1" name=""/>
+        <p:cNvGrpSpPr/>
+        <p:nvPr/>
+      </p:nvGrpSpPr>
+      <p:grpSpPr>
+        <a:xfrm>
+          <a:off x="0" y="0"/>
+          <a:ext cx="0" cy="0"/>
+          <a:chOff x="0" y="0"/>
+          <a:chExt cx="0" cy="0"/>
+        </a:xfrm>
+      </p:grpSpPr>
+      <p:sp>
+        <p:nvSpPr>
+          <p:cNvPr id="2" name="Title 1"/>
+          <p:cNvSpPr>
+            <a:spLocks noGrp="1"/>
+          </p:cNvSpPr>
+          <p:nvPr>
+            <p:ph type="title"/>
+          </p:nvPr>
+        </p:nvSpPr>
+        <p:spPr/>
+        <p:txBody>
+          <a:bodyPr/>
+          <a:lstStyle/>
+          <a:p>
+            <a:r>
+              <a:rPr lang="da-DK" dirty="0" smtClean="0"/>
+              <a:t>Getting Started</a:t>
+            </a:r>
+            <a:endParaRPr lang="da-DK" dirty="0"/>
+          </a:p>
+        </p:txBody>
+      </p:sp>
+      <p:sp>
+        <p:nvSpPr>
+          <p:cNvPr id="3" name="Content Placeholder 2"/>
+          <p:cNvSpPr>
+            <a:spLocks noGrp="1"/>
+          </p:cNvSpPr>
+          <p:nvPr>
+            <p:ph idx="1"/>
+          </p:nvPr>
+        </p:nvSpPr>
+        <p:spPr/>
+        <p:txBody>
+          <a:bodyPr/>
+          <a:lstStyle/>
+          <a:p>
+            <a:r>
+              <a:rPr lang="da-DK" dirty="0" smtClean="0"/>
+              <a:t>React</a:t>
+            </a:r>
+          </a:p>
+          <a:p>
+            <a:pPr lvl="1"/>
+            <a:r>
+              <a:rPr lang="da-DK" dirty="0" smtClean="0"/>
+              <a:t>create-react-app from Facebook</a:t>
+            </a:r>
+            <a:endParaRPr lang="da-DK" dirty="0"/>
+          </a:p>
+        </p:txBody>
+      </p:sp>
+      <p:sp>
+        <p:nvSpPr>
+          <p:cNvPr id="4" name="Slide Number Placeholder 3"/>
+          <p:cNvSpPr>
+            <a:spLocks noGrp="1"/>
+          </p:cNvSpPr>
+          <p:nvPr>
+            <p:ph type="sldNum" sz="quarter" idx="12"/>
+          </p:nvPr>
+        </p:nvSpPr>
+        <p:spPr/>
+        <p:txBody>
+          <a:bodyPr/>
+          <a:lstStyle/>
+          <a:p>
+            <a:fld id="{0B0DDA44-FDCB-445C-9AC0-37FB199E677B}" type="slidenum">
+              <a:rPr lang="en-US" smtClean="0"/>
+              <a:pPr/>
+              <a:t>14</a:t>
+            </a:fld>
+            <a:endParaRPr lang="en-US" dirty="0"/>
+          </a:p>
+        </p:txBody>
+      </p:sp>
+    </p:spTree>
+    <p:extLst>
+      <p:ext uri="{BB962C8B-B14F-4D97-AF65-F5344CB8AC3E}">
+        <p14:creationId xmlns:p14="http://schemas.microsoft.com/office/powerpoint/2010/main" val="1592274045"/>
       </p:ext>
     </p:extLst>
   </p:cSld>
@@ -3335,17 +3686,12 @@
             <a:endParaRPr lang="en-GB" dirty="0"/>
           </a:p>
           <a:p>
-            <a:r>
-              <a:rPr lang="en-GB" dirty="0"/>
-              <a:t>Part 1</a:t>
-            </a:r>
-          </a:p>
-          <a:p>
             <a:pPr lvl="1"/>
             <a:r>
-              <a:rPr lang="en-GB" dirty="0"/>
+              <a:rPr lang="en-GB" dirty="0" smtClean="0"/>
               <a:t>React</a:t>
             </a:r>
+            <a:endParaRPr lang="en-GB" dirty="0"/>
           </a:p>
           <a:p>
             <a:pPr lvl="1"/>
@@ -3365,19 +3711,13 @@
           </a:p>
           <a:p>
             <a:pPr lvl="1"/>
-            <a:endParaRPr lang="en-GB" dirty="0"/>
-          </a:p>
-          <a:p>
+            <a:r>
+              <a:rPr lang="en-GB" dirty="0" smtClean="0"/>
+              <a:t>Visual </a:t>
+            </a:r>
             <a:r>
               <a:rPr lang="en-GB" dirty="0"/>
-              <a:t>Part 2</a:t>
-            </a:r>
-          </a:p>
-          <a:p>
-            <a:pPr lvl="1"/>
-            <a:r>
-              <a:rPr lang="en-GB" dirty="0"/>
-              <a:t>Visual Studio</a:t>
+              <a:t>Studio</a:t>
             </a:r>
           </a:p>
           <a:p>
@@ -3422,6 +3762,211 @@
           </a:p>
         </p:txBody>
       </p:sp>
+      <p:pic>
+        <p:nvPicPr>
+          <p:cNvPr id="2055" name="Picture 7" descr="C:\dev\react-webpack-typescript\_notes\images\templafy.png"/>
+          <p:cNvPicPr>
+            <a:picLocks noChangeAspect="1" noChangeArrowheads="1"/>
+          </p:cNvPicPr>
+          <p:nvPr/>
+        </p:nvPicPr>
+        <p:blipFill>
+          <a:blip r:embed="rId3" cstate="print">
+            <a:extLst>
+              <a:ext uri="{28A0092B-C50C-407E-A947-70E740481C1C}">
+                <a14:useLocalDpi xmlns:a14="http://schemas.microsoft.com/office/drawing/2010/main" val="0"/>
+              </a:ext>
+            </a:extLst>
+          </a:blip>
+          <a:srcRect/>
+          <a:stretch>
+            <a:fillRect/>
+          </a:stretch>
+        </p:blipFill>
+        <p:spPr bwMode="auto">
+          <a:xfrm>
+            <a:off x="5015880" y="476672"/>
+            <a:ext cx="2206552" cy="584736"/>
+          </a:xfrm>
+          <a:prstGeom prst="rect">
+            <a:avLst/>
+          </a:prstGeom>
+          <a:noFill/>
+          <a:extLst>
+            <a:ext uri="{909E8E84-426E-40DD-AFC4-6F175D3DCCD1}">
+              <a14:hiddenFill xmlns:a14="http://schemas.microsoft.com/office/drawing/2010/main">
+                <a:solidFill>
+                  <a:srgbClr val="FFFFFF"/>
+                </a:solidFill>
+              </a14:hiddenFill>
+            </a:ext>
+          </a:extLst>
+        </p:spPr>
+      </p:pic>
+      <p:pic>
+        <p:nvPicPr>
+          <p:cNvPr id="2056" name="Picture 8" descr="C:\dev\react-webpack-typescript\_notes\images\react.png"/>
+          <p:cNvPicPr>
+            <a:picLocks noChangeAspect="1" noChangeArrowheads="1"/>
+          </p:cNvPicPr>
+          <p:nvPr/>
+        </p:nvPicPr>
+        <p:blipFill>
+          <a:blip r:embed="rId4" cstate="print">
+            <a:extLst>
+              <a:ext uri="{28A0092B-C50C-407E-A947-70E740481C1C}">
+                <a14:useLocalDpi xmlns:a14="http://schemas.microsoft.com/office/drawing/2010/main" val="0"/>
+              </a:ext>
+            </a:extLst>
+          </a:blip>
+          <a:srcRect/>
+          <a:stretch>
+            <a:fillRect/>
+          </a:stretch>
+        </p:blipFill>
+        <p:spPr bwMode="auto">
+          <a:xfrm>
+            <a:off x="7896200" y="919936"/>
+            <a:ext cx="2281823" cy="2281823"/>
+          </a:xfrm>
+          <a:prstGeom prst="rect">
+            <a:avLst/>
+          </a:prstGeom>
+          <a:noFill/>
+          <a:extLst>
+            <a:ext uri="{909E8E84-426E-40DD-AFC4-6F175D3DCCD1}">
+              <a14:hiddenFill xmlns:a14="http://schemas.microsoft.com/office/drawing/2010/main">
+                <a:solidFill>
+                  <a:srgbClr val="FFFFFF"/>
+                </a:solidFill>
+              </a14:hiddenFill>
+            </a:ext>
+          </a:extLst>
+        </p:spPr>
+      </p:pic>
+      <p:pic>
+        <p:nvPicPr>
+          <p:cNvPr id="2057" name="Picture 9" descr="C:\dev\react-webpack-typescript\_notes\images\webpack.jpg"/>
+          <p:cNvPicPr>
+            <a:picLocks noChangeAspect="1" noChangeArrowheads="1"/>
+          </p:cNvPicPr>
+          <p:nvPr/>
+        </p:nvPicPr>
+        <p:blipFill>
+          <a:blip r:embed="rId5">
+            <a:extLst>
+              <a:ext uri="{28A0092B-C50C-407E-A947-70E740481C1C}">
+                <a14:useLocalDpi xmlns:a14="http://schemas.microsoft.com/office/drawing/2010/main" val="0"/>
+              </a:ext>
+            </a:extLst>
+          </a:blip>
+          <a:srcRect/>
+          <a:stretch>
+            <a:fillRect/>
+          </a:stretch>
+        </p:blipFill>
+        <p:spPr bwMode="auto">
+          <a:xfrm>
+            <a:off x="4613372" y="2060848"/>
+            <a:ext cx="2609060" cy="1806774"/>
+          </a:xfrm>
+          <a:prstGeom prst="rect">
+            <a:avLst/>
+          </a:prstGeom>
+          <a:noFill/>
+          <a:extLst>
+            <a:ext uri="{909E8E84-426E-40DD-AFC4-6F175D3DCCD1}">
+              <a14:hiddenFill xmlns:a14="http://schemas.microsoft.com/office/drawing/2010/main">
+                <a:solidFill>
+                  <a:srgbClr val="FFFFFF"/>
+                </a:solidFill>
+              </a14:hiddenFill>
+            </a:ext>
+          </a:extLst>
+        </p:spPr>
+      </p:pic>
+      <p:pic>
+        <p:nvPicPr>
+          <p:cNvPr id="2058" name="Picture 10" descr="C:\dev\react-webpack-typescript\_notes\images\typescript.png"/>
+          <p:cNvPicPr>
+            <a:picLocks noChangeAspect="1" noChangeArrowheads="1"/>
+          </p:cNvPicPr>
+          <p:nvPr/>
+        </p:nvPicPr>
+        <p:blipFill>
+          <a:blip r:embed="rId6" cstate="print">
+            <a:extLst>
+              <a:ext uri="{28A0092B-C50C-407E-A947-70E740481C1C}">
+                <a14:useLocalDpi xmlns:a14="http://schemas.microsoft.com/office/drawing/2010/main" val="0"/>
+              </a:ext>
+            </a:extLst>
+          </a:blip>
+          <a:srcRect/>
+          <a:stretch>
+            <a:fillRect/>
+          </a:stretch>
+        </p:blipFill>
+        <p:spPr bwMode="auto">
+          <a:xfrm>
+            <a:off x="7856550" y="3284984"/>
+            <a:ext cx="2722618" cy="1425030"/>
+          </a:xfrm>
+          <a:prstGeom prst="rect">
+            <a:avLst/>
+          </a:prstGeom>
+          <a:noFill/>
+          <a:extLst>
+            <a:ext uri="{909E8E84-426E-40DD-AFC4-6F175D3DCCD1}">
+              <a14:hiddenFill xmlns:a14="http://schemas.microsoft.com/office/drawing/2010/main">
+                <a:solidFill>
+                  <a:srgbClr val="FFFFFF"/>
+                </a:solidFill>
+              </a14:hiddenFill>
+            </a:ext>
+          </a:extLst>
+        </p:spPr>
+      </p:pic>
+      <p:pic>
+        <p:nvPicPr>
+          <p:cNvPr id="2059" name="Picture 11" descr="C:\dev\react-webpack-typescript\_notes\images\visual_studio.png"/>
+          <p:cNvPicPr>
+            <a:picLocks noChangeAspect="1" noChangeArrowheads="1"/>
+          </p:cNvPicPr>
+          <p:nvPr/>
+        </p:nvPicPr>
+        <p:blipFill>
+          <a:blip r:embed="rId7" cstate="print">
+            <a:extLst>
+              <a:ext uri="{28A0092B-C50C-407E-A947-70E740481C1C}">
+                <a14:useLocalDpi xmlns:a14="http://schemas.microsoft.com/office/drawing/2010/main" val="0"/>
+              </a:ext>
+            </a:extLst>
+          </a:blip>
+          <a:srcRect/>
+          <a:stretch>
+            <a:fillRect/>
+          </a:stretch>
+        </p:blipFill>
+        <p:spPr bwMode="auto">
+          <a:xfrm>
+            <a:off x="6334546" y="4797152"/>
+            <a:ext cx="2835275" cy="1408112"/>
+          </a:xfrm>
+          <a:prstGeom prst="rect">
+            <a:avLst/>
+          </a:prstGeom>
+          <a:noFill/>
+          <a:extLst>
+            <a:ext uri="{909E8E84-426E-40DD-AFC4-6F175D3DCCD1}">
+              <a14:hiddenFill xmlns:a14="http://schemas.microsoft.com/office/drawing/2010/main">
+                <a:solidFill>
+                  <a:srgbClr val="FFFFFF"/>
+                </a:solidFill>
+              </a14:hiddenFill>
+            </a:ext>
+          </a:extLst>
+        </p:spPr>
+      </p:pic>
     </p:spTree>
     <p:custDataLst>
       <p:tags r:id="rId1"/>
@@ -3471,39 +4016,96 @@
           <a:lstStyle/>
           <a:p>
             <a:r>
+              <a:rPr lang="da-DK" dirty="0" smtClean="0"/>
+              <a:t>Why this talk?</a:t>
+            </a:r>
+            <a:endParaRPr lang="da-DK" dirty="0"/>
+          </a:p>
+        </p:txBody>
+      </p:sp>
+      <p:sp>
+        <p:nvSpPr>
+          <p:cNvPr id="3" name="Content Placeholder 2"/>
+          <p:cNvSpPr>
+            <a:spLocks noGrp="1"/>
+          </p:cNvSpPr>
+          <p:nvPr>
+            <p:ph idx="1"/>
+          </p:nvPr>
+        </p:nvSpPr>
+        <p:spPr/>
+        <p:txBody>
+          <a:bodyPr/>
+          <a:lstStyle/>
+          <a:p>
+            <a:r>
+              <a:rPr lang="da-DK" dirty="0" smtClean="0"/>
+              <a:t>Sharing practical experiences – Templafy rewrite</a:t>
+            </a:r>
+          </a:p>
+          <a:p>
+            <a:endParaRPr lang="da-DK" dirty="0" smtClean="0"/>
+          </a:p>
+          <a:p>
+            <a:r>
+              <a:rPr lang="da-DK" dirty="0" smtClean="0"/>
+              <a:t>What I wish I had known when we started</a:t>
+            </a:r>
+          </a:p>
+          <a:p>
+            <a:endParaRPr lang="da-DK" dirty="0" smtClean="0"/>
+          </a:p>
+          <a:p>
+            <a:r>
+              <a:rPr lang="da-DK" dirty="0" smtClean="0"/>
+              <a:t>Boilerplates are complicated</a:t>
+            </a:r>
+          </a:p>
+          <a:p>
+            <a:pPr lvl="1"/>
+            <a:r>
+              <a:rPr lang="da-DK" dirty="0" smtClean="0"/>
+              <a:t>Usually </a:t>
+            </a:r>
+            <a:r>
               <a:rPr lang="da-DK" dirty="0"/>
-              <a:t>Goals</a:t>
-            </a:r>
-          </a:p>
-        </p:txBody>
-      </p:sp>
-      <p:sp>
-        <p:nvSpPr>
-          <p:cNvPr id="3" name="Content Placeholder 2"/>
-          <p:cNvSpPr>
-            <a:spLocks noGrp="1"/>
-          </p:cNvSpPr>
-          <p:nvPr>
-            <p:ph idx="1"/>
-          </p:nvPr>
-        </p:nvSpPr>
-        <p:spPr/>
-        <p:txBody>
-          <a:bodyPr/>
-          <a:lstStyle/>
-          <a:p>
-            <a:r>
-              <a:rPr lang="da-DK" dirty="0"/>
-              <a:t>Basic understanding of React, Webpack and TypeScript</a:t>
-            </a:r>
-          </a:p>
-          <a:p>
-            <a:endParaRPr lang="da-DK" dirty="0"/>
-          </a:p>
-          <a:p>
-            <a:pPr marL="0" indent="0">
-              <a:buNone/>
-            </a:pPr>
+              <a:t>have 100+ lines of configuration and 20+ npm </a:t>
+            </a:r>
+            <a:r>
+              <a:rPr lang="da-DK" dirty="0" smtClean="0"/>
+              <a:t>packages</a:t>
+            </a:r>
+          </a:p>
+          <a:p>
+            <a:pPr lvl="1"/>
+            <a:r>
+              <a:rPr lang="en-US" dirty="0" smtClean="0"/>
+              <a:t>Combination </a:t>
+            </a:r>
+            <a:r>
+              <a:rPr lang="en-US" dirty="0"/>
+              <a:t>of things make it hard to separate and understand the fundamentals</a:t>
+            </a:r>
+            <a:endParaRPr lang="da-DK" dirty="0" smtClean="0"/>
+          </a:p>
+          <a:p>
+            <a:pPr lvl="1"/>
+            <a:r>
+              <a:rPr lang="da-DK" dirty="0">
+                <a:hlinkClick r:id="rId2"/>
+              </a:rPr>
+              <a:t>http://andrewhfarmer.com/starter-project</a:t>
+            </a:r>
+            <a:r>
+              <a:rPr lang="da-DK" dirty="0" smtClean="0">
+                <a:hlinkClick r:id="rId2"/>
+              </a:rPr>
+              <a:t>/</a:t>
+            </a:r>
+            <a:endParaRPr lang="da-DK" dirty="0" smtClean="0"/>
+          </a:p>
+          <a:p>
+            <a:pPr lvl="1"/>
             <a:endParaRPr lang="da-DK" dirty="0"/>
           </a:p>
         </p:txBody>
@@ -3535,7 +4137,7 @@
     </p:spTree>
     <p:extLst>
       <p:ext uri="{BB962C8B-B14F-4D97-AF65-F5344CB8AC3E}">
-        <p14:creationId xmlns:p14="http://schemas.microsoft.com/office/powerpoint/2010/main" val="3704972693"/>
+        <p14:creationId xmlns:p14="http://schemas.microsoft.com/office/powerpoint/2010/main" val="1652736634"/>
       </p:ext>
     </p:extLst>
   </p:cSld>
@@ -3612,10 +4214,9 @@
           </a:p>
           <a:p>
             <a:r>
-              <a:rPr lang="da-DK"/>
+              <a:rPr lang="da-DK" dirty="0"/>
               <a:t>Common boilerplates usually have 100+ lines of configuration and 20+ npm packages</a:t>
             </a:r>
-            <a:endParaRPr lang="da-DK" dirty="0"/>
           </a:p>
         </p:txBody>
       </p:sp>
@@ -3889,7 +4490,7 @@
           <a:p>
             <a:r>
               <a:rPr lang="da-DK" dirty="0"/>
-              <a:t>Part 1</a:t>
+              <a:t>Goals</a:t>
             </a:r>
           </a:p>
         </p:txBody>
@@ -3909,7 +4510,45 @@
           <a:bodyPr/>
           <a:lstStyle/>
           <a:p>
-            <a:endParaRPr lang="da-DK"/>
+            <a:r>
+              <a:rPr lang="da-DK" dirty="0"/>
+              <a:t>Basic understanding of React, Webpack and </a:t>
+            </a:r>
+            <a:r>
+              <a:rPr lang="da-DK" dirty="0" smtClean="0"/>
+              <a:t>TypeScript</a:t>
+            </a:r>
+          </a:p>
+          <a:p>
+            <a:endParaRPr lang="en-US" dirty="0" smtClean="0"/>
+          </a:p>
+          <a:p>
+            <a:r>
+              <a:rPr lang="en-US" dirty="0" smtClean="0"/>
+              <a:t>Describe </a:t>
+            </a:r>
+            <a:r>
+              <a:rPr lang="en-US" dirty="0"/>
+              <a:t>fundamentals </a:t>
+            </a:r>
+            <a:endParaRPr lang="en-US" dirty="0" smtClean="0"/>
+          </a:p>
+          <a:p>
+            <a:pPr lvl="1"/>
+            <a:r>
+              <a:rPr lang="da-DK" dirty="0" smtClean="0"/>
+              <a:t>Changes at a slower rate than API</a:t>
+            </a:r>
+            <a:endParaRPr lang="da-DK" dirty="0"/>
+          </a:p>
+          <a:p>
+            <a:endParaRPr lang="da-DK" dirty="0"/>
+          </a:p>
+          <a:p>
+            <a:pPr marL="0" indent="0">
+              <a:buNone/>
+            </a:pPr>
+            <a:endParaRPr lang="da-DK" dirty="0"/>
           </a:p>
         </p:txBody>
       </p:sp>
@@ -3940,7 +4579,7 @@
     </p:spTree>
     <p:extLst>
       <p:ext uri="{BB962C8B-B14F-4D97-AF65-F5344CB8AC3E}">
-        <p14:creationId xmlns:p14="http://schemas.microsoft.com/office/powerpoint/2010/main" val="2693261336"/>
+        <p14:creationId xmlns:p14="http://schemas.microsoft.com/office/powerpoint/2010/main" val="3704972693"/>
       </p:ext>
     </p:extLst>
   </p:cSld>
@@ -3983,31 +4622,418 @@
           <a:lstStyle/>
           <a:p>
             <a:r>
-              <a:rPr lang="da-DK" dirty="0"/>
-              <a:t>React Component Lifecycle</a:t>
-            </a:r>
-          </a:p>
-        </p:txBody>
-      </p:sp>
-      <p:sp>
-        <p:nvSpPr>
-          <p:cNvPr id="3" name="Content Placeholder 2"/>
-          <p:cNvSpPr>
-            <a:spLocks noGrp="1"/>
-          </p:cNvSpPr>
+              <a:rPr lang="da-DK" dirty="0" smtClean="0"/>
+              <a:t>Javascript Versions</a:t>
+            </a:r>
+            <a:endParaRPr lang="da-DK" dirty="0"/>
+          </a:p>
+        </p:txBody>
+      </p:sp>
+      <p:graphicFrame>
+        <p:nvGraphicFramePr>
+          <p:cNvPr id="5" name="Content Placeholder 4"/>
+          <p:cNvGraphicFramePr>
+            <a:graphicFrameLocks noGrp="1"/>
+          </p:cNvGraphicFramePr>
           <p:nvPr>
             <p:ph idx="1"/>
-          </p:nvPr>
-        </p:nvSpPr>
-        <p:spPr/>
-        <p:txBody>
-          <a:bodyPr/>
-          <a:lstStyle/>
-          <a:p>
-            <a:endParaRPr lang="da-DK" dirty="0"/>
-          </a:p>
-        </p:txBody>
-      </p:sp>
+            <p:extLst>
+              <p:ext uri="{D42A27DB-BD31-4B8C-83A1-F6EECF244321}">
+                <p14:modId xmlns:p14="http://schemas.microsoft.com/office/powerpoint/2010/main" val="2622159592"/>
+              </p:ext>
+            </p:extLst>
+          </p:nvPr>
+        </p:nvGraphicFramePr>
+        <p:xfrm>
+          <a:off x="609600" y="1196975"/>
+          <a:ext cx="10972800" cy="2225040"/>
+        </p:xfrm>
+        <a:graphic>
+          <a:graphicData uri="http://schemas.openxmlformats.org/drawingml/2006/table">
+            <a:tbl>
+              <a:tblPr firstRow="1" bandRow="1">
+                <a:tableStyleId>{5C22544A-7EE6-4342-B048-85BDC9FD1C3A}</a:tableStyleId>
+              </a:tblPr>
+              <a:tblGrid>
+                <a:gridCol w="2743200"/>
+                <a:gridCol w="2743200"/>
+                <a:gridCol w="2743200"/>
+                <a:gridCol w="2743200"/>
+              </a:tblGrid>
+              <a:tr h="370840">
+                <a:tc>
+                  <a:txBody>
+                    <a:bodyPr/>
+                    <a:lstStyle/>
+                    <a:p>
+                      <a:endParaRPr lang="da-DK" dirty="0"/>
+                    </a:p>
+                  </a:txBody>
+                  <a:tcPr/>
+                </a:tc>
+                <a:tc>
+                  <a:txBody>
+                    <a:bodyPr/>
+                    <a:lstStyle/>
+                    <a:p>
+                      <a:pPr algn="ctr"/>
+                      <a:r>
+                        <a:rPr lang="da-DK" dirty="0" smtClean="0"/>
+                        <a:t>June</a:t>
+                      </a:r>
+                      <a:r>
+                        <a:rPr lang="da-DK" baseline="0" dirty="0" smtClean="0"/>
+                        <a:t> 2016</a:t>
+                      </a:r>
+                      <a:endParaRPr lang="da-DK" dirty="0"/>
+                    </a:p>
+                  </a:txBody>
+                  <a:tcPr/>
+                </a:tc>
+                <a:tc>
+                  <a:txBody>
+                    <a:bodyPr/>
+                    <a:lstStyle/>
+                    <a:p>
+                      <a:pPr algn="ctr"/>
+                      <a:r>
+                        <a:rPr lang="da-DK" dirty="0" smtClean="0"/>
+                        <a:t>Templafy</a:t>
+                      </a:r>
+                      <a:endParaRPr lang="da-DK" dirty="0"/>
+                    </a:p>
+                  </a:txBody>
+                  <a:tcPr/>
+                </a:tc>
+                <a:tc>
+                  <a:txBody>
+                    <a:bodyPr/>
+                    <a:lstStyle/>
+                    <a:p>
+                      <a:pPr algn="ctr"/>
+                      <a:r>
+                        <a:rPr lang="da-DK" dirty="0" smtClean="0"/>
+                        <a:t>March 2017</a:t>
+                      </a:r>
+                      <a:endParaRPr lang="da-DK" dirty="0"/>
+                    </a:p>
+                  </a:txBody>
+                  <a:tcPr/>
+                </a:tc>
+              </a:tr>
+              <a:tr h="370840">
+                <a:tc>
+                  <a:txBody>
+                    <a:bodyPr/>
+                    <a:lstStyle/>
+                    <a:p>
+                      <a:r>
+                        <a:rPr lang="da-DK" dirty="0" smtClean="0"/>
+                        <a:t>React</a:t>
+                      </a:r>
+                      <a:endParaRPr lang="da-DK" dirty="0"/>
+                    </a:p>
+                  </a:txBody>
+                  <a:tcPr/>
+                </a:tc>
+                <a:tc>
+                  <a:txBody>
+                    <a:bodyPr/>
+                    <a:lstStyle/>
+                    <a:p>
+                      <a:pPr algn="r"/>
+                      <a:r>
+                        <a:rPr lang="da-DK" dirty="0" smtClean="0"/>
+                        <a:t>15.1</a:t>
+                      </a:r>
+                      <a:endParaRPr lang="da-DK" dirty="0"/>
+                    </a:p>
+                  </a:txBody>
+                  <a:tcPr/>
+                </a:tc>
+                <a:tc>
+                  <a:txBody>
+                    <a:bodyPr/>
+                    <a:lstStyle/>
+                    <a:p>
+                      <a:pPr algn="r"/>
+                      <a:r>
+                        <a:rPr lang="da-DK" dirty="0" smtClean="0"/>
+                        <a:t>15.2.1</a:t>
+                      </a:r>
+                      <a:endParaRPr lang="da-DK" dirty="0"/>
+                    </a:p>
+                  </a:txBody>
+                  <a:tcPr/>
+                </a:tc>
+                <a:tc>
+                  <a:txBody>
+                    <a:bodyPr/>
+                    <a:lstStyle/>
+                    <a:p>
+                      <a:pPr algn="r"/>
+                      <a:r>
+                        <a:rPr lang="da-DK" dirty="0" smtClean="0"/>
+                        <a:t>15.4.2</a:t>
+                      </a:r>
+                      <a:endParaRPr lang="da-DK" dirty="0"/>
+                    </a:p>
+                  </a:txBody>
+                  <a:tcPr/>
+                </a:tc>
+              </a:tr>
+              <a:tr h="370840">
+                <a:tc>
+                  <a:txBody>
+                    <a:bodyPr/>
+                    <a:lstStyle/>
+                    <a:p>
+                      <a:r>
+                        <a:rPr lang="da-DK" dirty="0" smtClean="0"/>
+                        <a:t>Webpack</a:t>
+                      </a:r>
+                      <a:endParaRPr lang="da-DK" dirty="0"/>
+                    </a:p>
+                  </a:txBody>
+                  <a:tcPr/>
+                </a:tc>
+                <a:tc>
+                  <a:txBody>
+                    <a:bodyPr/>
+                    <a:lstStyle/>
+                    <a:p>
+                      <a:pPr algn="r"/>
+                      <a:r>
+                        <a:rPr lang="da-DK" dirty="0" smtClean="0"/>
+                        <a:t>1.6</a:t>
+                      </a:r>
+                      <a:endParaRPr lang="da-DK" dirty="0"/>
+                    </a:p>
+                  </a:txBody>
+                  <a:tcPr/>
+                </a:tc>
+                <a:tc>
+                  <a:txBody>
+                    <a:bodyPr/>
+                    <a:lstStyle/>
+                    <a:p>
+                      <a:pPr algn="r"/>
+                      <a:r>
+                        <a:rPr lang="da-DK" dirty="0" smtClean="0"/>
+                        <a:t>1.14</a:t>
+                      </a:r>
+                      <a:endParaRPr lang="da-DK" dirty="0"/>
+                    </a:p>
+                  </a:txBody>
+                  <a:tcPr/>
+                </a:tc>
+                <a:tc>
+                  <a:txBody>
+                    <a:bodyPr/>
+                    <a:lstStyle/>
+                    <a:p>
+                      <a:pPr algn="r"/>
+                      <a:r>
+                        <a:rPr lang="da-DK" dirty="0" smtClean="0"/>
+                        <a:t>2.2.1</a:t>
+                      </a:r>
+                      <a:endParaRPr lang="da-DK" dirty="0"/>
+                    </a:p>
+                  </a:txBody>
+                  <a:tcPr/>
+                </a:tc>
+              </a:tr>
+              <a:tr h="370840">
+                <a:tc>
+                  <a:txBody>
+                    <a:bodyPr/>
+                    <a:lstStyle/>
+                    <a:p>
+                      <a:r>
+                        <a:rPr lang="da-DK" dirty="0" smtClean="0"/>
+                        <a:t>TypeScript</a:t>
+                      </a:r>
+                      <a:endParaRPr lang="da-DK" dirty="0"/>
+                    </a:p>
+                  </a:txBody>
+                  <a:tcPr/>
+                </a:tc>
+                <a:tc>
+                  <a:txBody>
+                    <a:bodyPr/>
+                    <a:lstStyle/>
+                    <a:p>
+                      <a:pPr algn="r"/>
+                      <a:r>
+                        <a:rPr lang="da-DK" dirty="0" smtClean="0"/>
+                        <a:t>1.8</a:t>
+                      </a:r>
+                      <a:endParaRPr lang="da-DK" dirty="0"/>
+                    </a:p>
+                  </a:txBody>
+                  <a:tcPr/>
+                </a:tc>
+                <a:tc>
+                  <a:txBody>
+                    <a:bodyPr/>
+                    <a:lstStyle/>
+                    <a:p>
+                      <a:pPr algn="r"/>
+                      <a:r>
+                        <a:rPr lang="da-DK" dirty="0" smtClean="0"/>
+                        <a:t>2.1.4</a:t>
+                      </a:r>
+                      <a:endParaRPr lang="da-DK" dirty="0"/>
+                    </a:p>
+                  </a:txBody>
+                  <a:tcPr/>
+                </a:tc>
+                <a:tc>
+                  <a:txBody>
+                    <a:bodyPr/>
+                    <a:lstStyle/>
+                    <a:p>
+                      <a:pPr algn="r"/>
+                      <a:r>
+                        <a:rPr lang="da-DK" dirty="0" smtClean="0"/>
+                        <a:t>2.2</a:t>
+                      </a:r>
+                      <a:endParaRPr lang="da-DK" dirty="0"/>
+                    </a:p>
+                  </a:txBody>
+                  <a:tcPr/>
+                </a:tc>
+              </a:tr>
+              <a:tr h="370840">
+                <a:tc>
+                  <a:txBody>
+                    <a:bodyPr/>
+                    <a:lstStyle/>
+                    <a:p>
+                      <a:r>
+                        <a:rPr lang="da-DK" dirty="0" smtClean="0"/>
+                        <a:t>React Router</a:t>
+                      </a:r>
+                      <a:endParaRPr lang="da-DK" dirty="0"/>
+                    </a:p>
+                  </a:txBody>
+                  <a:tcPr/>
+                </a:tc>
+                <a:tc>
+                  <a:txBody>
+                    <a:bodyPr/>
+                    <a:lstStyle/>
+                    <a:p>
+                      <a:pPr algn="r"/>
+                      <a:r>
+                        <a:rPr lang="da-DK" dirty="0" smtClean="0"/>
+                        <a:t>2.4.1</a:t>
+                      </a:r>
+                      <a:endParaRPr lang="da-DK" dirty="0"/>
+                    </a:p>
+                  </a:txBody>
+                  <a:tcPr/>
+                </a:tc>
+                <a:tc>
+                  <a:txBody>
+                    <a:bodyPr/>
+                    <a:lstStyle/>
+                    <a:p>
+                      <a:pPr algn="r"/>
+                      <a:r>
+                        <a:rPr lang="da-DK" dirty="0" smtClean="0"/>
+                        <a:t>2.4.1</a:t>
+                      </a:r>
+                      <a:endParaRPr lang="da-DK" dirty="0"/>
+                    </a:p>
+                  </a:txBody>
+                  <a:tcPr/>
+                </a:tc>
+                <a:tc>
+                  <a:txBody>
+                    <a:bodyPr/>
+                    <a:lstStyle/>
+                    <a:p>
+                      <a:pPr algn="r"/>
+                      <a:r>
+                        <a:rPr lang="da-DK" dirty="0" smtClean="0"/>
+                        <a:t>3.0.2</a:t>
+                      </a:r>
+                      <a:r>
+                        <a:rPr lang="da-DK" baseline="0" dirty="0" smtClean="0"/>
+                        <a:t> (4.0-beta6)</a:t>
+                      </a:r>
+                      <a:endParaRPr lang="da-DK" dirty="0"/>
+                    </a:p>
+                  </a:txBody>
+                  <a:tcPr/>
+                </a:tc>
+              </a:tr>
+              <a:tr h="370840">
+                <a:tc>
+                  <a:txBody>
+                    <a:bodyPr/>
+                    <a:lstStyle/>
+                    <a:p>
+                      <a:r>
+                        <a:rPr lang="da-DK" dirty="0" smtClean="0"/>
+                        <a:t>React Hot Loader</a:t>
+                      </a:r>
+                      <a:endParaRPr lang="da-DK" dirty="0"/>
+                    </a:p>
+                  </a:txBody>
+                  <a:tcPr/>
+                </a:tc>
+                <a:tc>
+                  <a:txBody>
+                    <a:bodyPr/>
+                    <a:lstStyle/>
+                    <a:p>
+                      <a:pPr algn="r"/>
+                      <a:r>
+                        <a:rPr lang="da-DK" dirty="0" smtClean="0"/>
+                        <a:t>1.3</a:t>
+                      </a:r>
+                      <a:endParaRPr lang="da-DK" dirty="0"/>
+                    </a:p>
+                  </a:txBody>
+                  <a:tcPr/>
+                </a:tc>
+                <a:tc>
+                  <a:txBody>
+                    <a:bodyPr/>
+                    <a:lstStyle/>
+                    <a:p>
+                      <a:pPr algn="r"/>
+                      <a:r>
+                        <a:rPr lang="da-DK" dirty="0" smtClean="0"/>
+                        <a:t>1.3.1</a:t>
+                      </a:r>
+                      <a:endParaRPr lang="da-DK" dirty="0"/>
+                    </a:p>
+                  </a:txBody>
+                  <a:tcPr/>
+                </a:tc>
+                <a:tc>
+                  <a:txBody>
+                    <a:bodyPr/>
+                    <a:lstStyle/>
+                    <a:p>
+                      <a:pPr algn="r"/>
+                      <a:r>
+                        <a:rPr lang="da-DK" dirty="0" smtClean="0"/>
+                        <a:t>1.3.1 (3.0-beta6)</a:t>
+                      </a:r>
+                      <a:endParaRPr lang="da-DK" dirty="0"/>
+                    </a:p>
+                  </a:txBody>
+                  <a:tcPr/>
+                </a:tc>
+              </a:tr>
+            </a:tbl>
+          </a:graphicData>
+        </a:graphic>
+      </p:graphicFrame>
       <p:sp>
         <p:nvSpPr>
           <p:cNvPr id="4" name="Slide Number Placeholder 3"/>
@@ -4035,7 +5061,7 @@
     </p:spTree>
     <p:extLst>
       <p:ext uri="{BB962C8B-B14F-4D97-AF65-F5344CB8AC3E}">
-        <p14:creationId xmlns:p14="http://schemas.microsoft.com/office/powerpoint/2010/main" val="1309177343"/>
+        <p14:creationId xmlns:p14="http://schemas.microsoft.com/office/powerpoint/2010/main" val="375716754"/>
       </p:ext>
     </p:extLst>
   </p:cSld>
@@ -4429,7 +5455,7 @@
   <a:extraClrSchemeLst/>
   <a:extLst>
     <a:ext uri="{05A4C25C-085E-4340-85A3-A5531E510DB2}">
-      <thm15:themeFamily xmlns:thm15="http://schemas.microsoft.com/office/thememl/2012/main" name="Blank" id="{830CEE72-04DE-49CD-A238-BC86AC75B159}" vid="{B4F07104-86D5-428B-8C12-2ECED95A2983}"/>
+      <thm15:themeFamily xmlns:thm15="http://schemas.microsoft.com/office/thememl/2012/main" xmlns="" name="Blank" id="{830CEE72-04DE-49CD-A238-BC86AC75B159}" vid="{B4F07104-86D5-428B-8C12-2ECED95A2983}"/>
     </a:ext>
   </a:extLst>
 </a:theme>
@@ -4690,7 +5716,7 @@
   <a:extraClrSchemeLst/>
   <a:extLst>
     <a:ext uri="{05A4C25C-085E-4340-85A3-A5531E510DB2}">
-      <thm15:themeFamily xmlns:thm15="http://schemas.microsoft.com/office/thememl/2012/main" name="Office Theme" id="{62F939B6-93AF-4DB8-9C6B-D6C7DFDC589F}" vid="{4A3C46E8-61CC-4603-A589-7422A47A8E4A}"/>
+      <thm15:themeFamily xmlns:thm15="http://schemas.microsoft.com/office/thememl/2012/main" xmlns="" name="Office Theme" id="{62F939B6-93AF-4DB8-9C6B-D6C7DFDC589F}" vid="{4A3C46E8-61CC-4603-A589-7422A47A8E4A}"/>
     </a:ext>
   </a:extLst>
 </a:theme>
@@ -4951,7 +5977,7 @@
   <a:extraClrSchemeLst/>
   <a:extLst>
     <a:ext uri="{05A4C25C-085E-4340-85A3-A5531E510DB2}">
-      <thm15:themeFamily xmlns:thm15="http://schemas.microsoft.com/office/thememl/2012/main" name="Office Theme" id="{62F939B6-93AF-4DB8-9C6B-D6C7DFDC589F}" vid="{4A3C46E8-61CC-4603-A589-7422A47A8E4A}"/>
+      <thm15:themeFamily xmlns:thm15="http://schemas.microsoft.com/office/thememl/2012/main" xmlns="" name="Office Theme" id="{62F939B6-93AF-4DB8-9C6B-D6C7DFDC589F}" vid="{4A3C46E8-61CC-4603-A589-7422A47A8E4A}"/>
     </a:ext>
   </a:extLst>
 </a:theme>

</xml_diff>

<commit_message>
Added more content to webpack and webpack-hot-reload.
</commit_message>
<xml_diff>
--- a/_notes/Presentation.pptx
+++ b/_notes/Presentation.pptx
@@ -128,7 +128,18 @@
   </p:defaultTextStyle>
   <p:extLst>
     <p:ext uri="{EFAFB233-063F-42B5-8137-9DF3F51BA10A}">
-      <p15:sldGuideLst xmlns:p15="http://schemas.microsoft.com/office/powerpoint/2012/main" xmlns=""/>
+      <p15:sldGuideLst xmlns:p15="http://schemas.microsoft.com/office/powerpoint/2012/main">
+        <p15:guide id="1" orient="horz" pos="2160">
+          <p15:clr>
+            <a:srgbClr val="A4A3A4"/>
+          </p15:clr>
+        </p15:guide>
+        <p15:guide id="2" pos="3840">
+          <p15:clr>
+            <a:srgbClr val="A4A3A4"/>
+          </p15:clr>
+        </p15:guide>
+      </p15:sldGuideLst>
     </p:ext>
   </p:extLst>
 </p:presentation>
@@ -2230,7 +2241,7 @@
           <a:graphicData uri="http://schemas.openxmlformats.org/presentationml/2006/ole">
             <mc:AlternateContent xmlns:mc="http://schemas.openxmlformats.org/markup-compatibility/2006">
               <mc:Choice xmlns:v="urn:schemas-microsoft-com:vml" Requires="v">
-                <p:oleObj spid="_x0000_s1137" name="think-cell Slide" r:id="rId11" imgW="473" imgH="473" progId="TCLayout.ActiveDocument.1">
+                <p:oleObj spid="_x0000_s1140" name="think-cell Slide" r:id="rId11" imgW="473" imgH="473" progId="TCLayout.ActiveDocument.1">
                   <p:embed/>
                 </p:oleObj>
               </mc:Choice>
@@ -2855,7 +2866,7 @@
   </p:txStyles>
   <p:extLst mod="1">
     <p:ext uri="{27BBF7A9-308A-43DC-89C8-2F10F3537804}">
-      <p15:sldGuideLst xmlns:p15="http://schemas.microsoft.com/office/powerpoint/2012/main" xmlns="">
+      <p15:sldGuideLst xmlns:p15="http://schemas.microsoft.com/office/powerpoint/2012/main">
         <p15:guide id="1" pos="384" userDrawn="1">
           <p15:clr>
             <a:srgbClr val="F26B43"/>
@@ -2909,7 +2920,12 @@
             <p:ph type="ctrTitle"/>
           </p:nvPr>
         </p:nvSpPr>
-        <p:spPr/>
+        <p:spPr>
+          <a:xfrm>
+            <a:off x="914400" y="2130426"/>
+            <a:ext cx="7773888" cy="1635544"/>
+          </a:xfrm>
+        </p:spPr>
         <p:txBody>
           <a:bodyPr/>
           <a:lstStyle/>
@@ -3012,10 +3028,9 @@
           <a:lstStyle/>
           <a:p>
             <a:r>
-              <a:rPr lang="da-DK" dirty="0" smtClean="0"/>
+              <a:rPr lang="da-DK" dirty="0"/>
               <a:t>React</a:t>
             </a:r>
-            <a:endParaRPr lang="da-DK" dirty="0"/>
           </a:p>
         </p:txBody>
       </p:sp>
@@ -3036,11 +3051,7 @@
           <a:p>
             <a:r>
               <a:rPr lang="en-US" dirty="0"/>
-              <a:t>Function from data to </a:t>
-            </a:r>
-            <a:r>
-              <a:rPr lang="en-US" dirty="0" smtClean="0"/>
-              <a:t>UI description</a:t>
+              <a:t>Function from data to UI description</a:t>
             </a:r>
           </a:p>
           <a:p>
@@ -3048,14 +3059,14 @@
           </a:p>
           <a:p>
             <a:r>
-              <a:rPr lang="en-US" dirty="0" smtClean="0"/>
+              <a:rPr lang="en-US" dirty="0"/>
               <a:t>React </a:t>
             </a:r>
             <a:r>
-              <a:rPr lang="en-US" dirty="0" err="1" smtClean="0"/>
+              <a:rPr lang="en-US" dirty="0" err="1"/>
               <a:t>Reconsilliation</a:t>
             </a:r>
-            <a:endParaRPr lang="en-US" dirty="0" smtClean="0"/>
+            <a:endParaRPr lang="en-US" dirty="0"/>
           </a:p>
           <a:p>
             <a:pPr lvl="1"/>
@@ -3137,63 +3148,62 @@
           <a:lstStyle/>
           <a:p>
             <a:r>
-              <a:rPr lang="da-DK" dirty="0" smtClean="0"/>
+              <a:rPr lang="da-DK" dirty="0"/>
               <a:t>Why not Angular 2</a:t>
             </a:r>
+          </a:p>
+        </p:txBody>
+      </p:sp>
+      <p:sp>
+        <p:nvSpPr>
+          <p:cNvPr id="3" name="Content Placeholder 2"/>
+          <p:cNvSpPr>
+            <a:spLocks noGrp="1"/>
+          </p:cNvSpPr>
+          <p:nvPr>
+            <p:ph idx="1"/>
+          </p:nvPr>
+        </p:nvSpPr>
+        <p:spPr/>
+        <p:txBody>
+          <a:bodyPr/>
+          <a:lstStyle/>
+          <a:p>
+            <a:r>
+              <a:rPr lang="da-DK" dirty="0"/>
+              <a:t>Angular 2 was released in September 2016</a:t>
+            </a:r>
+          </a:p>
+          <a:p>
             <a:endParaRPr lang="da-DK" dirty="0"/>
           </a:p>
-        </p:txBody>
-      </p:sp>
-      <p:sp>
-        <p:nvSpPr>
-          <p:cNvPr id="3" name="Content Placeholder 2"/>
-          <p:cNvSpPr>
-            <a:spLocks noGrp="1"/>
-          </p:cNvSpPr>
-          <p:nvPr>
-            <p:ph idx="1"/>
-          </p:nvPr>
-        </p:nvSpPr>
-        <p:spPr/>
-        <p:txBody>
-          <a:bodyPr/>
-          <a:lstStyle/>
-          <a:p>
-            <a:r>
-              <a:rPr lang="da-DK" dirty="0" smtClean="0"/>
-              <a:t>Angular 2 was released in September 2016</a:t>
-            </a:r>
-          </a:p>
-          <a:p>
-            <a:endParaRPr lang="da-DK" dirty="0" smtClean="0"/>
-          </a:p>
-          <a:p>
-            <a:r>
-              <a:rPr lang="da-DK" dirty="0" smtClean="0"/>
+          <a:p>
+            <a:r>
+              <a:rPr lang="da-DK" dirty="0"/>
               <a:t>Big changes during beta and RC of Angular</a:t>
             </a:r>
           </a:p>
           <a:p>
             <a:pPr lvl="1"/>
             <a:r>
-              <a:rPr lang="da-DK" dirty="0" smtClean="0"/>
+              <a:rPr lang="da-DK" dirty="0"/>
               <a:t>Fragmentation on Stack Overflow</a:t>
             </a:r>
           </a:p>
           <a:p>
-            <a:endParaRPr lang="da-DK" dirty="0" smtClean="0"/>
-          </a:p>
-          <a:p>
-            <a:r>
-              <a:rPr lang="da-DK" dirty="0" smtClean="0"/>
+            <a:endParaRPr lang="da-DK" dirty="0"/>
+          </a:p>
+          <a:p>
+            <a:r>
+              <a:rPr lang="da-DK" dirty="0"/>
               <a:t>JSX + TypeScript vs custom template language</a:t>
             </a:r>
           </a:p>
           <a:p>
-            <a:endParaRPr lang="da-DK" dirty="0" smtClean="0"/>
-          </a:p>
-          <a:p>
-            <a:endParaRPr lang="da-DK" dirty="0" smtClean="0"/>
+            <a:endParaRPr lang="da-DK" dirty="0"/>
+          </a:p>
+          <a:p>
+            <a:endParaRPr lang="da-DK" dirty="0"/>
           </a:p>
           <a:p>
             <a:endParaRPr lang="da-DK" dirty="0"/>
@@ -3460,10 +3470,9 @@
           <a:lstStyle/>
           <a:p>
             <a:r>
-              <a:rPr lang="da-DK" dirty="0" smtClean="0"/>
+              <a:rPr lang="da-DK" dirty="0"/>
               <a:t>Getting Started</a:t>
             </a:r>
-            <a:endParaRPr lang="da-DK" dirty="0"/>
           </a:p>
         </p:txBody>
       </p:sp>
@@ -3483,17 +3492,16 @@
           <a:lstStyle/>
           <a:p>
             <a:r>
-              <a:rPr lang="da-DK" dirty="0" smtClean="0"/>
+              <a:rPr lang="da-DK" dirty="0"/>
               <a:t>React</a:t>
             </a:r>
           </a:p>
           <a:p>
             <a:pPr lvl="1"/>
             <a:r>
-              <a:rPr lang="da-DK" dirty="0" smtClean="0"/>
+              <a:rPr lang="da-DK" dirty="0"/>
               <a:t>create-react-app from Facebook</a:t>
             </a:r>
-            <a:endParaRPr lang="da-DK" dirty="0"/>
           </a:p>
         </p:txBody>
       </p:sp>
@@ -3705,10 +3713,9 @@
           <a:p>
             <a:pPr lvl="1"/>
             <a:r>
-              <a:rPr lang="en-GB" dirty="0" smtClean="0"/>
+              <a:rPr lang="en-GB" dirty="0"/>
               <a:t>React</a:t>
             </a:r>
-            <a:endParaRPr lang="en-GB" dirty="0"/>
           </a:p>
           <a:p>
             <a:pPr lvl="1"/>
@@ -3729,12 +3736,8 @@
           <a:p>
             <a:pPr lvl="1"/>
             <a:r>
-              <a:rPr lang="en-GB" dirty="0" smtClean="0"/>
-              <a:t>Visual </a:t>
-            </a:r>
-            <a:r>
               <a:rPr lang="en-GB" dirty="0"/>
-              <a:t>Studio</a:t>
+              <a:t>Visual Studio</a:t>
             </a:r>
           </a:p>
           <a:p>
@@ -4033,77 +4036,64 @@
           <a:lstStyle/>
           <a:p>
             <a:r>
-              <a:rPr lang="da-DK" dirty="0" smtClean="0"/>
+              <a:rPr lang="da-DK" dirty="0"/>
               <a:t>Why this talk?</a:t>
             </a:r>
+          </a:p>
+        </p:txBody>
+      </p:sp>
+      <p:sp>
+        <p:nvSpPr>
+          <p:cNvPr id="3" name="Content Placeholder 2"/>
+          <p:cNvSpPr>
+            <a:spLocks noGrp="1"/>
+          </p:cNvSpPr>
+          <p:nvPr>
+            <p:ph idx="1"/>
+          </p:nvPr>
+        </p:nvSpPr>
+        <p:spPr/>
+        <p:txBody>
+          <a:bodyPr/>
+          <a:lstStyle/>
+          <a:p>
+            <a:r>
+              <a:rPr lang="da-DK" dirty="0"/>
+              <a:t>Sharing practical experiences – Templafy rewrite</a:t>
+            </a:r>
+          </a:p>
+          <a:p>
             <a:endParaRPr lang="da-DK" dirty="0"/>
           </a:p>
-        </p:txBody>
-      </p:sp>
-      <p:sp>
-        <p:nvSpPr>
-          <p:cNvPr id="3" name="Content Placeholder 2"/>
-          <p:cNvSpPr>
-            <a:spLocks noGrp="1"/>
-          </p:cNvSpPr>
-          <p:nvPr>
-            <p:ph idx="1"/>
-          </p:nvPr>
-        </p:nvSpPr>
-        <p:spPr/>
-        <p:txBody>
-          <a:bodyPr/>
-          <a:lstStyle/>
-          <a:p>
-            <a:r>
-              <a:rPr lang="da-DK" dirty="0" smtClean="0"/>
-              <a:t>Sharing practical experiences – Templafy rewrite</a:t>
-            </a:r>
-          </a:p>
-          <a:p>
-            <a:endParaRPr lang="da-DK" dirty="0" smtClean="0"/>
-          </a:p>
-          <a:p>
-            <a:r>
-              <a:rPr lang="da-DK" dirty="0" smtClean="0"/>
+          <a:p>
+            <a:r>
+              <a:rPr lang="da-DK" dirty="0"/>
               <a:t>What I wish I had known when we started</a:t>
             </a:r>
           </a:p>
           <a:p>
-            <a:endParaRPr lang="da-DK" dirty="0" smtClean="0"/>
-          </a:p>
-          <a:p>
-            <a:r>
-              <a:rPr lang="da-DK" dirty="0" smtClean="0"/>
+            <a:endParaRPr lang="da-DK" dirty="0"/>
+          </a:p>
+          <a:p>
+            <a:r>
+              <a:rPr lang="da-DK" dirty="0"/>
               <a:t>Boilerplates are complicated</a:t>
             </a:r>
           </a:p>
           <a:p>
             <a:pPr lvl="1"/>
             <a:r>
-              <a:rPr lang="da-DK" dirty="0" smtClean="0"/>
-              <a:t>Usually </a:t>
-            </a:r>
-            <a:r>
               <a:rPr lang="da-DK" dirty="0"/>
-              <a:t>have 100+ lines of configuration and 20+ npm </a:t>
-            </a:r>
-            <a:r>
-              <a:rPr lang="da-DK" dirty="0" smtClean="0"/>
-              <a:t>packages</a:t>
+              <a:t>Usually have 100+ lines of configuration and 20+ npm packages</a:t>
             </a:r>
           </a:p>
           <a:p>
             <a:pPr lvl="1"/>
             <a:r>
-              <a:rPr lang="en-US" dirty="0" smtClean="0"/>
-              <a:t>Combination </a:t>
-            </a:r>
-            <a:r>
               <a:rPr lang="en-US" dirty="0"/>
-              <a:t>of things make it hard to separate and understand the fundamentals</a:t>
-            </a:r>
-            <a:endParaRPr lang="da-DK" dirty="0" smtClean="0"/>
+              <a:t>Combination of things make it hard to separate and understand the fundamentals</a:t>
+            </a:r>
+            <a:endParaRPr lang="da-DK" dirty="0"/>
           </a:p>
           <a:p>
             <a:pPr lvl="1"/>
@@ -4111,15 +4101,9 @@
               <a:rPr lang="da-DK" dirty="0">
                 <a:hlinkClick r:id="rId2"/>
               </a:rPr>
-              <a:t>http://andrewhfarmer.com/starter-project</a:t>
-            </a:r>
-            <a:r>
-              <a:rPr lang="da-DK" dirty="0" smtClean="0">
-                <a:hlinkClick r:id="rId2"/>
-              </a:rPr>
-              <a:t>/</a:t>
-            </a:r>
-            <a:endParaRPr lang="da-DK" dirty="0" smtClean="0"/>
+              <a:t>http://andrewhfarmer.com/starter-project/</a:t>
+            </a:r>
+            <a:endParaRPr lang="da-DK" dirty="0"/>
           </a:p>
           <a:p>
             <a:pPr lvl="1"/>
@@ -4330,6 +4314,72 @@
           <a:p>
             <a:endParaRPr lang="da-DK" dirty="0"/>
           </a:p>
+          <a:p>
+            <a:endParaRPr lang="da-DK" dirty="0"/>
+          </a:p>
+          <a:p>
+            <a:endParaRPr lang="da-DK" dirty="0"/>
+          </a:p>
+          <a:p>
+            <a:endParaRPr lang="da-DK" dirty="0"/>
+          </a:p>
+          <a:p>
+            <a:endParaRPr lang="da-DK" dirty="0"/>
+          </a:p>
+          <a:p>
+            <a:endParaRPr lang="da-DK" dirty="0"/>
+          </a:p>
+          <a:p>
+            <a:r>
+              <a:rPr lang="da-DK" dirty="0"/>
+              <a:t>Team</a:t>
+            </a:r>
+          </a:p>
+          <a:p>
+            <a:pPr lvl="1"/>
+            <a:r>
+              <a:rPr lang="da-DK" dirty="0"/>
+              <a:t>Distributed:</a:t>
+            </a:r>
+          </a:p>
+          <a:p>
+            <a:pPr lvl="2"/>
+            <a:r>
+              <a:rPr lang="da-DK" dirty="0"/>
+              <a:t>Copenhagen: 4 developers</a:t>
+            </a:r>
+          </a:p>
+          <a:p>
+            <a:pPr lvl="2"/>
+            <a:r>
+              <a:rPr lang="da-DK" dirty="0"/>
+              <a:t>Århus: 1 developer</a:t>
+            </a:r>
+          </a:p>
+          <a:p>
+            <a:pPr lvl="2"/>
+            <a:r>
+              <a:rPr lang="da-DK" dirty="0"/>
+              <a:t>Romania: 2 developers, 1 tester</a:t>
+            </a:r>
+          </a:p>
+          <a:p>
+            <a:pPr lvl="2"/>
+            <a:r>
+              <a:rPr lang="da-DK" dirty="0"/>
+              <a:t>Poland: 1 designer</a:t>
+            </a:r>
+          </a:p>
+          <a:p>
+            <a:pPr lvl="2"/>
+            <a:endParaRPr lang="da-DK" dirty="0"/>
+          </a:p>
+          <a:p>
+            <a:endParaRPr lang="da-DK" dirty="0"/>
+          </a:p>
+          <a:p>
+            <a:endParaRPr lang="da-DK" dirty="0"/>
+          </a:p>
         </p:txBody>
       </p:sp>
       <p:sp>
@@ -4529,34 +4579,24 @@
           <a:p>
             <a:r>
               <a:rPr lang="da-DK" dirty="0"/>
-              <a:t>Basic understanding of React, Webpack and </a:t>
-            </a:r>
-            <a:r>
-              <a:rPr lang="da-DK" dirty="0" smtClean="0"/>
-              <a:t>TypeScript</a:t>
-            </a:r>
-          </a:p>
-          <a:p>
-            <a:endParaRPr lang="en-US" dirty="0" smtClean="0"/>
-          </a:p>
-          <a:p>
-            <a:r>
-              <a:rPr lang="en-US" dirty="0" smtClean="0"/>
-              <a:t>Describe </a:t>
-            </a:r>
+              <a:t>Basic understanding of React, Webpack and TypeScript</a:t>
+            </a:r>
+          </a:p>
+          <a:p>
+            <a:endParaRPr lang="en-US" dirty="0"/>
+          </a:p>
+          <a:p>
             <a:r>
               <a:rPr lang="en-US" dirty="0"/>
-              <a:t>fundamentals </a:t>
-            </a:r>
-            <a:endParaRPr lang="en-US" dirty="0" smtClean="0"/>
+              <a:t>Describe fundamentals </a:t>
+            </a:r>
           </a:p>
           <a:p>
             <a:pPr lvl="1"/>
             <a:r>
-              <a:rPr lang="da-DK" dirty="0" smtClean="0"/>
+              <a:rPr lang="da-DK" dirty="0"/>
               <a:t>Changes at a slower rate than API</a:t>
             </a:r>
-            <a:endParaRPr lang="da-DK" dirty="0"/>
           </a:p>
           <a:p>
             <a:endParaRPr lang="da-DK" dirty="0"/>
@@ -4639,10 +4679,9 @@
           <a:lstStyle/>
           <a:p>
             <a:r>
-              <a:rPr lang="da-DK" dirty="0" smtClean="0"/>
+              <a:rPr lang="da-DK" dirty="0"/>
               <a:t>Javascript Versions</a:t>
             </a:r>
-            <a:endParaRPr lang="da-DK" dirty="0"/>
           </a:p>
         </p:txBody>
       </p:sp>
@@ -4672,10 +4711,34 @@
                 <a:tableStyleId>{5C22544A-7EE6-4342-B048-85BDC9FD1C3A}</a:tableStyleId>
               </a:tblPr>
               <a:tblGrid>
-                <a:gridCol w="2743200"/>
-                <a:gridCol w="2743200"/>
-                <a:gridCol w="2743200"/>
-                <a:gridCol w="2743200"/>
+                <a:gridCol w="2743200">
+                  <a:extLst>
+                    <a:ext uri="{9D8B030D-6E8A-4147-A177-3AD203B41FA5}">
+                      <a16:colId xmlns:a16="http://schemas.microsoft.com/office/drawing/2014/main" val="20000"/>
+                    </a:ext>
+                  </a:extLst>
+                </a:gridCol>
+                <a:gridCol w="2743200">
+                  <a:extLst>
+                    <a:ext uri="{9D8B030D-6E8A-4147-A177-3AD203B41FA5}">
+                      <a16:colId xmlns:a16="http://schemas.microsoft.com/office/drawing/2014/main" val="20001"/>
+                    </a:ext>
+                  </a:extLst>
+                </a:gridCol>
+                <a:gridCol w="2743200">
+                  <a:extLst>
+                    <a:ext uri="{9D8B030D-6E8A-4147-A177-3AD203B41FA5}">
+                      <a16:colId xmlns:a16="http://schemas.microsoft.com/office/drawing/2014/main" val="20002"/>
+                    </a:ext>
+                  </a:extLst>
+                </a:gridCol>
+                <a:gridCol w="2743200">
+                  <a:extLst>
+                    <a:ext uri="{9D8B030D-6E8A-4147-A177-3AD203B41FA5}">
+                      <a16:colId xmlns:a16="http://schemas.microsoft.com/office/drawing/2014/main" val="20003"/>
+                    </a:ext>
+                  </a:extLst>
+                </a:gridCol>
               </a:tblGrid>
               <a:tr h="370840">
                 <a:tc>
@@ -4695,11 +4758,11 @@
                     <a:p>
                       <a:pPr algn="ctr"/>
                       <a:r>
-                        <a:rPr lang="da-DK" dirty="0" smtClean="0"/>
+                        <a:rPr lang="da-DK" dirty="0"/>
                         <a:t>June</a:t>
                       </a:r>
                       <a:r>
-                        <a:rPr lang="da-DK" baseline="0" dirty="0" smtClean="0"/>
+                        <a:rPr lang="da-DK" baseline="0" dirty="0"/>
                         <a:t> 2016</a:t>
                       </a:r>
                       <a:endParaRPr lang="da-DK" dirty="0"/>
@@ -4714,10 +4777,9 @@
                     <a:p>
                       <a:pPr algn="ctr"/>
                       <a:r>
-                        <a:rPr lang="da-DK" dirty="0" smtClean="0"/>
+                        <a:rPr lang="da-DK" dirty="0"/>
                         <a:t>Templafy</a:t>
                       </a:r>
-                      <a:endParaRPr lang="da-DK" dirty="0"/>
                     </a:p>
                   </a:txBody>
                   <a:tcPr/>
@@ -4729,14 +4791,18 @@
                     <a:p>
                       <a:pPr algn="ctr"/>
                       <a:r>
-                        <a:rPr lang="da-DK" dirty="0" smtClean="0"/>
+                        <a:rPr lang="da-DK" dirty="0"/>
                         <a:t>March 2017</a:t>
                       </a:r>
-                      <a:endParaRPr lang="da-DK" dirty="0"/>
                     </a:p>
                   </a:txBody>
                   <a:tcPr/>
                 </a:tc>
+                <a:extLst>
+                  <a:ext uri="{0D108BD9-81ED-4DB2-BD59-A6C34878D82A}">
+                    <a16:rowId xmlns:a16="http://schemas.microsoft.com/office/drawing/2014/main" val="10000"/>
+                  </a:ext>
+                </a:extLst>
               </a:tr>
               <a:tr h="370840">
                 <a:tc>
@@ -4745,10 +4811,9 @@
                     <a:lstStyle/>
                     <a:p>
                       <a:r>
-                        <a:rPr lang="da-DK" dirty="0" smtClean="0"/>
+                        <a:rPr lang="da-DK" dirty="0"/>
                         <a:t>React</a:t>
                       </a:r>
-                      <a:endParaRPr lang="da-DK" dirty="0"/>
                     </a:p>
                   </a:txBody>
                   <a:tcPr/>
@@ -4760,10 +4825,9 @@
                     <a:p>
                       <a:pPr algn="r"/>
                       <a:r>
-                        <a:rPr lang="da-DK" dirty="0" smtClean="0"/>
+                        <a:rPr lang="da-DK" dirty="0"/>
                         <a:t>15.1</a:t>
                       </a:r>
-                      <a:endParaRPr lang="da-DK" dirty="0"/>
                     </a:p>
                   </a:txBody>
                   <a:tcPr/>
@@ -4775,10 +4839,9 @@
                     <a:p>
                       <a:pPr algn="r"/>
                       <a:r>
-                        <a:rPr lang="da-DK" dirty="0" smtClean="0"/>
+                        <a:rPr lang="da-DK" dirty="0"/>
                         <a:t>15.2.1</a:t>
                       </a:r>
-                      <a:endParaRPr lang="da-DK" dirty="0"/>
                     </a:p>
                   </a:txBody>
                   <a:tcPr/>
@@ -4790,14 +4853,18 @@
                     <a:p>
                       <a:pPr algn="r"/>
                       <a:r>
-                        <a:rPr lang="da-DK" dirty="0" smtClean="0"/>
+                        <a:rPr lang="da-DK" dirty="0"/>
                         <a:t>15.4.2</a:t>
                       </a:r>
-                      <a:endParaRPr lang="da-DK" dirty="0"/>
                     </a:p>
                   </a:txBody>
                   <a:tcPr/>
                 </a:tc>
+                <a:extLst>
+                  <a:ext uri="{0D108BD9-81ED-4DB2-BD59-A6C34878D82A}">
+                    <a16:rowId xmlns:a16="http://schemas.microsoft.com/office/drawing/2014/main" val="10001"/>
+                  </a:ext>
+                </a:extLst>
               </a:tr>
               <a:tr h="370840">
                 <a:tc>
@@ -4806,10 +4873,9 @@
                     <a:lstStyle/>
                     <a:p>
                       <a:r>
-                        <a:rPr lang="da-DK" dirty="0" smtClean="0"/>
+                        <a:rPr lang="da-DK" dirty="0"/>
                         <a:t>Webpack</a:t>
                       </a:r>
-                      <a:endParaRPr lang="da-DK" dirty="0"/>
                     </a:p>
                   </a:txBody>
                   <a:tcPr/>
@@ -4821,10 +4887,9 @@
                     <a:p>
                       <a:pPr algn="r"/>
                       <a:r>
-                        <a:rPr lang="da-DK" dirty="0" smtClean="0"/>
+                        <a:rPr lang="da-DK" dirty="0"/>
                         <a:t>1.6</a:t>
                       </a:r>
-                      <a:endParaRPr lang="da-DK" dirty="0"/>
                     </a:p>
                   </a:txBody>
                   <a:tcPr/>
@@ -4836,10 +4901,9 @@
                     <a:p>
                       <a:pPr algn="r"/>
                       <a:r>
-                        <a:rPr lang="da-DK" dirty="0" smtClean="0"/>
+                        <a:rPr lang="da-DK" dirty="0"/>
                         <a:t>1.14</a:t>
                       </a:r>
-                      <a:endParaRPr lang="da-DK" dirty="0"/>
                     </a:p>
                   </a:txBody>
                   <a:tcPr/>
@@ -4851,14 +4915,18 @@
                     <a:p>
                       <a:pPr algn="r"/>
                       <a:r>
-                        <a:rPr lang="da-DK" dirty="0" smtClean="0"/>
+                        <a:rPr lang="da-DK" dirty="0"/>
                         <a:t>2.2.1</a:t>
                       </a:r>
-                      <a:endParaRPr lang="da-DK" dirty="0"/>
                     </a:p>
                   </a:txBody>
                   <a:tcPr/>
                 </a:tc>
+                <a:extLst>
+                  <a:ext uri="{0D108BD9-81ED-4DB2-BD59-A6C34878D82A}">
+                    <a16:rowId xmlns:a16="http://schemas.microsoft.com/office/drawing/2014/main" val="10002"/>
+                  </a:ext>
+                </a:extLst>
               </a:tr>
               <a:tr h="370840">
                 <a:tc>
@@ -4867,10 +4935,9 @@
                     <a:lstStyle/>
                     <a:p>
                       <a:r>
-                        <a:rPr lang="da-DK" dirty="0" smtClean="0"/>
+                        <a:rPr lang="da-DK" dirty="0"/>
                         <a:t>TypeScript</a:t>
                       </a:r>
-                      <a:endParaRPr lang="da-DK" dirty="0"/>
                     </a:p>
                   </a:txBody>
                   <a:tcPr/>
@@ -4882,10 +4949,9 @@
                     <a:p>
                       <a:pPr algn="r"/>
                       <a:r>
-                        <a:rPr lang="da-DK" dirty="0" smtClean="0"/>
+                        <a:rPr lang="da-DK" dirty="0"/>
                         <a:t>1.8</a:t>
                       </a:r>
-                      <a:endParaRPr lang="da-DK" dirty="0"/>
                     </a:p>
                   </a:txBody>
                   <a:tcPr/>
@@ -4897,10 +4963,9 @@
                     <a:p>
                       <a:pPr algn="r"/>
                       <a:r>
-                        <a:rPr lang="da-DK" dirty="0" smtClean="0"/>
+                        <a:rPr lang="da-DK" dirty="0"/>
                         <a:t>2.1.4</a:t>
                       </a:r>
-                      <a:endParaRPr lang="da-DK" dirty="0"/>
                     </a:p>
                   </a:txBody>
                   <a:tcPr/>
@@ -4912,14 +4977,18 @@
                     <a:p>
                       <a:pPr algn="r"/>
                       <a:r>
-                        <a:rPr lang="da-DK" dirty="0" smtClean="0"/>
+                        <a:rPr lang="da-DK" dirty="0"/>
                         <a:t>2.2</a:t>
                       </a:r>
-                      <a:endParaRPr lang="da-DK" dirty="0"/>
                     </a:p>
                   </a:txBody>
                   <a:tcPr/>
                 </a:tc>
+                <a:extLst>
+                  <a:ext uri="{0D108BD9-81ED-4DB2-BD59-A6C34878D82A}">
+                    <a16:rowId xmlns:a16="http://schemas.microsoft.com/office/drawing/2014/main" val="10003"/>
+                  </a:ext>
+                </a:extLst>
               </a:tr>
               <a:tr h="370840">
                 <a:tc>
@@ -4928,10 +4997,9 @@
                     <a:lstStyle/>
                     <a:p>
                       <a:r>
-                        <a:rPr lang="da-DK" dirty="0" smtClean="0"/>
+                        <a:rPr lang="da-DK" dirty="0"/>
                         <a:t>React Router</a:t>
                       </a:r>
-                      <a:endParaRPr lang="da-DK" dirty="0"/>
                     </a:p>
                   </a:txBody>
                   <a:tcPr/>
@@ -4943,10 +5011,9 @@
                     <a:p>
                       <a:pPr algn="r"/>
                       <a:r>
-                        <a:rPr lang="da-DK" dirty="0" smtClean="0"/>
+                        <a:rPr lang="da-DK" dirty="0"/>
                         <a:t>2.4.1</a:t>
                       </a:r>
-                      <a:endParaRPr lang="da-DK" dirty="0"/>
                     </a:p>
                   </a:txBody>
                   <a:tcPr/>
@@ -4958,10 +5025,9 @@
                     <a:p>
                       <a:pPr algn="r"/>
                       <a:r>
-                        <a:rPr lang="da-DK" dirty="0" smtClean="0"/>
+                        <a:rPr lang="da-DK" dirty="0"/>
                         <a:t>2.4.1</a:t>
                       </a:r>
-                      <a:endParaRPr lang="da-DK" dirty="0"/>
                     </a:p>
                   </a:txBody>
                   <a:tcPr/>
@@ -4973,11 +5039,11 @@
                     <a:p>
                       <a:pPr algn="r"/>
                       <a:r>
-                        <a:rPr lang="da-DK" dirty="0" smtClean="0"/>
+                        <a:rPr lang="da-DK" dirty="0"/>
                         <a:t>3.0.2</a:t>
                       </a:r>
                       <a:r>
-                        <a:rPr lang="da-DK" baseline="0" dirty="0" smtClean="0"/>
+                        <a:rPr lang="da-DK" baseline="0" dirty="0"/>
                         <a:t> (4.0-beta6)</a:t>
                       </a:r>
                       <a:endParaRPr lang="da-DK" dirty="0"/>
@@ -4985,6 +5051,11 @@
                   </a:txBody>
                   <a:tcPr/>
                 </a:tc>
+                <a:extLst>
+                  <a:ext uri="{0D108BD9-81ED-4DB2-BD59-A6C34878D82A}">
+                    <a16:rowId xmlns:a16="http://schemas.microsoft.com/office/drawing/2014/main" val="10004"/>
+                  </a:ext>
+                </a:extLst>
               </a:tr>
               <a:tr h="370840">
                 <a:tc>
@@ -4993,10 +5064,9 @@
                     <a:lstStyle/>
                     <a:p>
                       <a:r>
-                        <a:rPr lang="da-DK" dirty="0" smtClean="0"/>
+                        <a:rPr lang="da-DK" dirty="0"/>
                         <a:t>React Hot Loader</a:t>
                       </a:r>
-                      <a:endParaRPr lang="da-DK" dirty="0"/>
                     </a:p>
                   </a:txBody>
                   <a:tcPr/>
@@ -5008,10 +5078,9 @@
                     <a:p>
                       <a:pPr algn="r"/>
                       <a:r>
-                        <a:rPr lang="da-DK" dirty="0" smtClean="0"/>
+                        <a:rPr lang="da-DK" dirty="0"/>
                         <a:t>1.3</a:t>
                       </a:r>
-                      <a:endParaRPr lang="da-DK" dirty="0"/>
                     </a:p>
                   </a:txBody>
                   <a:tcPr/>
@@ -5023,10 +5092,9 @@
                     <a:p>
                       <a:pPr algn="r"/>
                       <a:r>
-                        <a:rPr lang="da-DK" dirty="0" smtClean="0"/>
+                        <a:rPr lang="da-DK" dirty="0"/>
                         <a:t>1.3.1</a:t>
                       </a:r>
-                      <a:endParaRPr lang="da-DK" dirty="0"/>
                     </a:p>
                   </a:txBody>
                   <a:tcPr/>
@@ -5038,14 +5106,18 @@
                     <a:p>
                       <a:pPr algn="r"/>
                       <a:r>
-                        <a:rPr lang="da-DK" dirty="0" smtClean="0"/>
+                        <a:rPr lang="da-DK" dirty="0"/>
                         <a:t>1.3.1 (3.0-beta6)</a:t>
                       </a:r>
-                      <a:endParaRPr lang="da-DK" dirty="0"/>
                     </a:p>
                   </a:txBody>
                   <a:tcPr/>
                 </a:tc>
+                <a:extLst>
+                  <a:ext uri="{0D108BD9-81ED-4DB2-BD59-A6C34878D82A}">
+                    <a16:rowId xmlns:a16="http://schemas.microsoft.com/office/drawing/2014/main" val="10005"/>
+                  </a:ext>
+                </a:extLst>
               </a:tr>
             </a:tbl>
           </a:graphicData>
@@ -5472,7 +5544,7 @@
   <a:extraClrSchemeLst/>
   <a:extLst>
     <a:ext uri="{05A4C25C-085E-4340-85A3-A5531E510DB2}">
-      <thm15:themeFamily xmlns:thm15="http://schemas.microsoft.com/office/thememl/2012/main" xmlns="" name="Blank" id="{830CEE72-04DE-49CD-A238-BC86AC75B159}" vid="{B4F07104-86D5-428B-8C12-2ECED95A2983}"/>
+      <thm15:themeFamily xmlns:thm15="http://schemas.microsoft.com/office/thememl/2012/main" name="Blank" id="{830CEE72-04DE-49CD-A238-BC86AC75B159}" vid="{B4F07104-86D5-428B-8C12-2ECED95A2983}"/>
     </a:ext>
   </a:extLst>
 </a:theme>
@@ -5733,7 +5805,7 @@
   <a:extraClrSchemeLst/>
   <a:extLst>
     <a:ext uri="{05A4C25C-085E-4340-85A3-A5531E510DB2}">
-      <thm15:themeFamily xmlns:thm15="http://schemas.microsoft.com/office/thememl/2012/main" xmlns="" name="Office Theme" id="{62F939B6-93AF-4DB8-9C6B-D6C7DFDC589F}" vid="{4A3C46E8-61CC-4603-A589-7422A47A8E4A}"/>
+      <thm15:themeFamily xmlns:thm15="http://schemas.microsoft.com/office/thememl/2012/main" name="Office Theme" id="{62F939B6-93AF-4DB8-9C6B-D6C7DFDC589F}" vid="{4A3C46E8-61CC-4603-A589-7422A47A8E4A}"/>
     </a:ext>
   </a:extLst>
 </a:theme>
@@ -5994,7 +6066,7 @@
   <a:extraClrSchemeLst/>
   <a:extLst>
     <a:ext uri="{05A4C25C-085E-4340-85A3-A5531E510DB2}">
-      <thm15:themeFamily xmlns:thm15="http://schemas.microsoft.com/office/thememl/2012/main" xmlns="" name="Office Theme" id="{62F939B6-93AF-4DB8-9C6B-D6C7DFDC589F}" vid="{4A3C46E8-61CC-4603-A589-7422A47A8E4A}"/>
+      <thm15:themeFamily xmlns:thm15="http://schemas.microsoft.com/office/thememl/2012/main" name="Office Theme" id="{62F939B6-93AF-4DB8-9C6B-D6C7DFDC589F}" vid="{4A3C46E8-61CC-4603-A589-7422A47A8E4A}"/>
     </a:ext>
   </a:extLst>
 </a:theme>

</xml_diff>

<commit_message>
More work on webpack.
</commit_message>
<xml_diff>
--- a/_notes/Presentation.pptx
+++ b/_notes/Presentation.pptx
@@ -2241,7 +2241,7 @@
           <a:graphicData uri="http://schemas.openxmlformats.org/presentationml/2006/ole">
             <mc:AlternateContent xmlns:mc="http://schemas.openxmlformats.org/markup-compatibility/2006">
               <mc:Choice xmlns:v="urn:schemas-microsoft-com:vml" Requires="v">
-                <p:oleObj spid="_x0000_s1140" name="think-cell Slide" r:id="rId11" imgW="473" imgH="473" progId="TCLayout.ActiveDocument.1">
+                <p:oleObj spid="_x0000_s1143" name="think-cell Slide" r:id="rId11" imgW="473" imgH="473" progId="TCLayout.ActiveDocument.1">
                   <p:embed/>
                 </p:oleObj>
               </mc:Choice>
@@ -3784,7 +3784,7 @@
       </p:sp>
       <p:pic>
         <p:nvPicPr>
-          <p:cNvPr id="2055" name="Picture 7" descr="C:\dev\react-webpack-typescript\_notes\images\templafy.png"/>
+          <p:cNvPr id="2056" name="Picture 8" descr="C:\dev\react-webpack-typescript\_notes\images\react.png"/>
           <p:cNvPicPr>
             <a:picLocks noChangeAspect="1" noChangeArrowheads="1"/>
           </p:cNvPicPr>
@@ -3805,48 +3805,7 @@
         </p:blipFill>
         <p:spPr bwMode="auto">
           <a:xfrm>
-            <a:off x="4560793" y="769040"/>
-            <a:ext cx="2206552" cy="584736"/>
-          </a:xfrm>
-          <a:prstGeom prst="rect">
-            <a:avLst/>
-          </a:prstGeom>
-          <a:noFill/>
-          <a:extLst>
-            <a:ext uri="{909E8E84-426E-40DD-AFC4-6F175D3DCCD1}">
-              <a14:hiddenFill xmlns:a14="http://schemas.microsoft.com/office/drawing/2010/main">
-                <a:solidFill>
-                  <a:srgbClr val="FFFFFF"/>
-                </a:solidFill>
-              </a14:hiddenFill>
-            </a:ext>
-          </a:extLst>
-        </p:spPr>
-      </p:pic>
-      <p:pic>
-        <p:nvPicPr>
-          <p:cNvPr id="2056" name="Picture 8" descr="C:\dev\react-webpack-typescript\_notes\images\react.png"/>
-          <p:cNvPicPr>
-            <a:picLocks noChangeAspect="1" noChangeArrowheads="1"/>
-          </p:cNvPicPr>
-          <p:nvPr/>
-        </p:nvPicPr>
-        <p:blipFill>
-          <a:blip r:embed="rId4" cstate="print">
-            <a:extLst>
-              <a:ext uri="{28A0092B-C50C-407E-A947-70E740481C1C}">
-                <a14:useLocalDpi xmlns:a14="http://schemas.microsoft.com/office/drawing/2010/main" val="0"/>
-              </a:ext>
-            </a:extLst>
-          </a:blip>
-          <a:srcRect/>
-          <a:stretch>
-            <a:fillRect/>
-          </a:stretch>
-        </p:blipFill>
-        <p:spPr bwMode="auto">
-          <a:xfrm>
-            <a:off x="7464152" y="508700"/>
+            <a:off x="8347850" y="744180"/>
             <a:ext cx="2281823" cy="2281823"/>
           </a:xfrm>
           <a:prstGeom prst="rect">
@@ -3873,7 +3832,7 @@
           <p:nvPr/>
         </p:nvPicPr>
         <p:blipFill>
-          <a:blip r:embed="rId5">
+          <a:blip r:embed="rId4">
             <a:extLst>
               <a:ext uri="{28A0092B-C50C-407E-A947-70E740481C1C}">
                 <a14:useLocalDpi xmlns:a14="http://schemas.microsoft.com/office/drawing/2010/main" val="0"/>
@@ -3887,7 +3846,7 @@
         </p:blipFill>
         <p:spPr bwMode="auto">
           <a:xfrm>
-            <a:off x="8184232" y="2924944"/>
+            <a:off x="8184231" y="3156017"/>
             <a:ext cx="2609060" cy="1806774"/>
           </a:xfrm>
           <a:prstGeom prst="rect">
@@ -3914,7 +3873,7 @@
           <p:nvPr/>
         </p:nvPicPr>
         <p:blipFill>
-          <a:blip r:embed="rId6" cstate="print">
+          <a:blip r:embed="rId5" cstate="print">
             <a:extLst>
               <a:ext uri="{28A0092B-C50C-407E-A947-70E740481C1C}">
                 <a14:useLocalDpi xmlns:a14="http://schemas.microsoft.com/office/drawing/2010/main" val="0"/>
@@ -3928,7 +3887,7 @@
         </p:blipFill>
         <p:spPr bwMode="auto">
           <a:xfrm>
-            <a:off x="4079776" y="2492896"/>
+            <a:off x="5052342" y="2300011"/>
             <a:ext cx="2722618" cy="1425030"/>
           </a:xfrm>
           <a:prstGeom prst="rect">
@@ -3955,7 +3914,7 @@
           <p:nvPr/>
         </p:nvPicPr>
         <p:blipFill>
-          <a:blip r:embed="rId7" cstate="print">
+          <a:blip r:embed="rId6" cstate="print">
             <a:extLst>
               <a:ext uri="{28A0092B-C50C-407E-A947-70E740481C1C}">
                 <a14:useLocalDpi xmlns:a14="http://schemas.microsoft.com/office/drawing/2010/main" val="0"/>
@@ -3969,7 +3928,7 @@
         </p:blipFill>
         <p:spPr bwMode="auto">
           <a:xfrm>
-            <a:off x="5231904" y="4365104"/>
+            <a:off x="5591944" y="4393767"/>
             <a:ext cx="2835275" cy="1408112"/>
           </a:xfrm>
           <a:prstGeom prst="rect">
@@ -3985,6 +3944,36 @@
               </a14:hiddenFill>
             </a:ext>
           </a:extLst>
+        </p:spPr>
+      </p:pic>
+      <p:pic>
+        <p:nvPicPr>
+          <p:cNvPr id="5" name="Picture 4"/>
+          <p:cNvPicPr>
+            <a:picLocks noChangeAspect="1"/>
+          </p:cNvPicPr>
+          <p:nvPr/>
+        </p:nvPicPr>
+        <p:blipFill>
+          <a:blip r:embed="rId7">
+            <a:extLst>
+              <a:ext uri="{28A0092B-C50C-407E-A947-70E740481C1C}">
+                <a14:useLocalDpi xmlns:a14="http://schemas.microsoft.com/office/drawing/2010/main" val="0"/>
+              </a:ext>
+            </a:extLst>
+          </a:blip>
+          <a:stretch>
+            <a:fillRect/>
+          </a:stretch>
+        </p:blipFill>
+        <p:spPr>
+          <a:xfrm>
+            <a:off x="5418119" y="449053"/>
+            <a:ext cx="2906269" cy="835552"/>
+          </a:xfrm>
+          <a:prstGeom prst="rect">
+            <a:avLst/>
+          </a:prstGeom>
         </p:spPr>
       </p:pic>
     </p:spTree>
@@ -4332,14 +4321,7 @@
           <a:p>
             <a:r>
               <a:rPr lang="da-DK" dirty="0"/>
-              <a:t>Team</a:t>
-            </a:r>
-          </a:p>
-          <a:p>
-            <a:pPr lvl="1"/>
-            <a:r>
-              <a:rPr lang="da-DK" dirty="0"/>
-              <a:t>Distributed:</a:t>
+              <a:t>Distributed team</a:t>
             </a:r>
           </a:p>
           <a:p>

</xml_diff>

<commit_message>
Added visual studio todo app.
</commit_message>
<xml_diff>
--- a/_notes/Presentation.pptx
+++ b/_notes/Presentation.pptx
@@ -2241,7 +2241,7 @@
           <a:graphicData uri="http://schemas.openxmlformats.org/presentationml/2006/ole">
             <mc:AlternateContent xmlns:mc="http://schemas.openxmlformats.org/markup-compatibility/2006">
               <mc:Choice xmlns:v="urn:schemas-microsoft-com:vml" Requires="v">
-                <p:oleObj spid="_x0000_s1143" name="think-cell Slide" r:id="rId11" imgW="473" imgH="473" progId="TCLayout.ActiveDocument.1">
+                <p:oleObj spid="_x0000_s1144" name="think-cell Slide" r:id="rId11" imgW="473" imgH="473" progId="TCLayout.ActiveDocument.1">
                   <p:embed/>
                 </p:oleObj>
               </mc:Choice>
@@ -4320,8 +4320,12 @@
           </a:p>
           <a:p>
             <a:r>
+              <a:rPr lang="da-DK"/>
+              <a:t>Distributed development </a:t>
+            </a:r>
+            <a:r>
               <a:rPr lang="da-DK" dirty="0"/>
-              <a:t>Distributed team</a:t>
+              <a:t>team</a:t>
             </a:r>
           </a:p>
           <a:p>

</xml_diff>

<commit_message>
Added React lifecycle and reconcillation slides.
</commit_message>
<xml_diff>
--- a/_notes/Presentation.pptx
+++ b/_notes/Presentation.pptx
@@ -5,10 +5,10 @@
     <p:sldMasterId id="2147483648" r:id="rId1"/>
   </p:sldMasterIdLst>
   <p:notesMasterIdLst>
-    <p:notesMasterId r:id="rId15"/>
+    <p:notesMasterId r:id="rId19"/>
   </p:notesMasterIdLst>
   <p:handoutMasterIdLst>
-    <p:handoutMasterId r:id="rId16"/>
+    <p:handoutMasterId r:id="rId20"/>
   </p:handoutMasterIdLst>
   <p:sldIdLst>
     <p:sldId id="256" r:id="rId2"/>
@@ -17,18 +17,22 @@
     <p:sldId id="266" r:id="rId5"/>
     <p:sldId id="260" r:id="rId6"/>
     <p:sldId id="259" r:id="rId7"/>
-    <p:sldId id="270" r:id="rId8"/>
-    <p:sldId id="268" r:id="rId9"/>
-    <p:sldId id="269" r:id="rId10"/>
-    <p:sldId id="273" r:id="rId11"/>
-    <p:sldId id="263" r:id="rId12"/>
+    <p:sldId id="268" r:id="rId8"/>
+    <p:sldId id="269" r:id="rId9"/>
+    <p:sldId id="273" r:id="rId10"/>
+    <p:sldId id="275" r:id="rId11"/>
+    <p:sldId id="276" r:id="rId12"/>
     <p:sldId id="272" r:id="rId13"/>
-    <p:sldId id="271" r:id="rId14"/>
+    <p:sldId id="263" r:id="rId14"/>
+    <p:sldId id="274" r:id="rId15"/>
+    <p:sldId id="277" r:id="rId16"/>
+    <p:sldId id="271" r:id="rId17"/>
+    <p:sldId id="270" r:id="rId18"/>
   </p:sldIdLst>
   <p:sldSz cx="12192000" cy="6858000"/>
   <p:notesSz cx="6797675" cy="9926638"/>
   <p:custDataLst>
-    <p:tags r:id="rId17"/>
+    <p:tags r:id="rId21"/>
   </p:custDataLst>
   <p:defaultTextStyle>
     <a:defPPr>
@@ -2240,7 +2244,7 @@
           <a:graphicData uri="http://schemas.openxmlformats.org/presentationml/2006/ole">
             <mc:AlternateContent xmlns:mc="http://schemas.openxmlformats.org/markup-compatibility/2006">
               <mc:Choice xmlns:v="urn:schemas-microsoft-com:vml" Requires="v">
-                <p:oleObj spid="_x0000_s1247" name="think-cell Slide" r:id="rId11" imgW="473" imgH="473" progId="TCLayout.ActiveDocument.1">
+                <p:oleObj spid="_x0000_s1274" name="think-cell Slide" r:id="rId11" imgW="473" imgH="473" progId="TCLayout.ActiveDocument.1">
                   <p:embed/>
                 </p:oleObj>
               </mc:Choice>
@@ -3028,7 +3032,7 @@
           <a:p>
             <a:r>
               <a:rPr lang="da-DK" dirty="0"/>
-              <a:t>Demo</a:t>
+              <a:t>TypeScript</a:t>
             </a:r>
           </a:p>
         </p:txBody>
@@ -3048,7 +3052,7 @@
           <a:bodyPr/>
           <a:lstStyle/>
           <a:p>
-            <a:endParaRPr lang="da-DK" dirty="0"/>
+            <a:endParaRPr lang="da-DK"/>
           </a:p>
         </p:txBody>
       </p:sp>
@@ -3079,7 +3083,7 @@
     </p:spTree>
     <p:extLst>
       <p:ext uri="{BB962C8B-B14F-4D97-AF65-F5344CB8AC3E}">
-        <p14:creationId xmlns:p14="http://schemas.microsoft.com/office/powerpoint/2010/main" val="1031077889"/>
+        <p14:creationId xmlns:p14="http://schemas.microsoft.com/office/powerpoint/2010/main" val="1704763269"/>
       </p:ext>
     </p:extLst>
   </p:cSld>
@@ -3108,47 +3112,6 @@
       </p:grpSpPr>
       <p:sp>
         <p:nvSpPr>
-          <p:cNvPr id="2" name="Title 1"/>
-          <p:cNvSpPr>
-            <a:spLocks noGrp="1"/>
-          </p:cNvSpPr>
-          <p:nvPr>
-            <p:ph type="title"/>
-          </p:nvPr>
-        </p:nvSpPr>
-        <p:spPr/>
-        <p:txBody>
-          <a:bodyPr/>
-          <a:lstStyle/>
-          <a:p>
-            <a:r>
-              <a:rPr lang="da-DK" dirty="0"/>
-              <a:t>React Component Lifecycle</a:t>
-            </a:r>
-          </a:p>
-        </p:txBody>
-      </p:sp>
-      <p:sp>
-        <p:nvSpPr>
-          <p:cNvPr id="3" name="Content Placeholder 2"/>
-          <p:cNvSpPr>
-            <a:spLocks noGrp="1"/>
-          </p:cNvSpPr>
-          <p:nvPr>
-            <p:ph idx="1"/>
-          </p:nvPr>
-        </p:nvSpPr>
-        <p:spPr/>
-        <p:txBody>
-          <a:bodyPr/>
-          <a:lstStyle/>
-          <a:p>
-            <a:endParaRPr lang="da-DK" dirty="0"/>
-          </a:p>
-        </p:txBody>
-      </p:sp>
-      <p:sp>
-        <p:nvSpPr>
           <p:cNvPr id="4" name="Slide Number Placeholder 3"/>
           <p:cNvSpPr>
             <a:spLocks noGrp="1"/>
@@ -3171,10 +3134,44 @@
           </a:p>
         </p:txBody>
       </p:sp>
+      <p:sp>
+        <p:nvSpPr>
+          <p:cNvPr id="5" name="TextBox 4"/>
+          <p:cNvSpPr txBox="1"/>
+          <p:nvPr/>
+        </p:nvSpPr>
+        <p:spPr>
+          <a:xfrm>
+            <a:off x="4887074" y="3059668"/>
+            <a:ext cx="2417853" cy="738664"/>
+          </a:xfrm>
+          <a:prstGeom prst="rect">
+            <a:avLst/>
+          </a:prstGeom>
+          <a:noFill/>
+        </p:spPr>
+        <p:txBody>
+          <a:bodyPr wrap="square" lIns="0" tIns="0" rIns="0" bIns="0" rtlCol="0">
+            <a:spAutoFit/>
+          </a:bodyPr>
+          <a:lstStyle/>
+          <a:p>
+            <a:pPr algn="ctr"/>
+            <a:r>
+              <a:rPr lang="da-DK" sz="4800" dirty="0">
+                <a:latin typeface="Arial" panose="020B0604020202020204" pitchFamily="34" charset="0"/>
+                <a:ea typeface="Open Sans" panose="020B0606030504020204" pitchFamily="34" charset="0"/>
+                <a:cs typeface="Arial" panose="020B0604020202020204" pitchFamily="34" charset="0"/>
+              </a:rPr>
+              <a:t>Demo</a:t>
+            </a:r>
+          </a:p>
+        </p:txBody>
+      </p:sp>
     </p:spTree>
     <p:extLst>
       <p:ext uri="{BB962C8B-B14F-4D97-AF65-F5344CB8AC3E}">
-        <p14:creationId xmlns:p14="http://schemas.microsoft.com/office/powerpoint/2010/main" val="1309177343"/>
+        <p14:creationId xmlns:p14="http://schemas.microsoft.com/office/powerpoint/2010/main" val="1191038346"/>
       </p:ext>
     </p:extLst>
   </p:cSld>
@@ -3203,6 +3200,53 @@
       </p:grpSpPr>
       <p:sp>
         <p:nvSpPr>
+          <p:cNvPr id="76" name="Rectangle 75"/>
+          <p:cNvSpPr/>
+          <p:nvPr/>
+        </p:nvSpPr>
+        <p:spPr>
+          <a:xfrm>
+            <a:off x="2423592" y="1085605"/>
+            <a:ext cx="7344816" cy="3168352"/>
+          </a:xfrm>
+          <a:prstGeom prst="rect">
+            <a:avLst/>
+          </a:prstGeom>
+          <a:ln>
+            <a:prstDash val="sysDash"/>
+          </a:ln>
+        </p:spPr>
+        <p:style>
+          <a:lnRef idx="2">
+            <a:schemeClr val="dk1"/>
+          </a:lnRef>
+          <a:fillRef idx="1">
+            <a:schemeClr val="lt1"/>
+          </a:fillRef>
+          <a:effectRef idx="0">
+            <a:schemeClr val="dk1"/>
+          </a:effectRef>
+          <a:fontRef idx="minor">
+            <a:schemeClr val="dk1"/>
+          </a:fontRef>
+        </p:style>
+        <p:txBody>
+          <a:bodyPr rtlCol="0" anchor="ctr"/>
+          <a:lstStyle/>
+          <a:p>
+            <a:pPr algn="ctr"/>
+            <a:endParaRPr lang="da-DK" sz="900" dirty="0">
+              <a:solidFill>
+                <a:schemeClr val="tx1"/>
+              </a:solidFill>
+              <a:latin typeface="Arial" panose="020B0604020202020204" pitchFamily="34" charset="0"/>
+              <a:cs typeface="Arial" panose="020B0604020202020204" pitchFamily="34" charset="0"/>
+            </a:endParaRPr>
+          </a:p>
+        </p:txBody>
+      </p:sp>
+      <p:sp>
+        <p:nvSpPr>
           <p:cNvPr id="2" name="Title 1"/>
           <p:cNvSpPr>
             <a:spLocks noGrp="1"/>
@@ -3238,30 +3282,8 @@
           <a:bodyPr/>
           <a:lstStyle/>
           <a:p>
-            <a:r>
-              <a:rPr lang="en-US" dirty="0"/>
-              <a:t>React Reconciliation</a:t>
-            </a:r>
-          </a:p>
-          <a:p>
-            <a:pPr lvl="1"/>
-            <a:r>
-              <a:rPr lang="da-DK" dirty="0">
-                <a:hlinkClick r:id="rId2"/>
-              </a:rPr>
-              <a:t>http://madhukaudantha.blogspot.dk/2015/04/reactjs-and-virtual-dom.html</a:t>
-            </a:r>
-            <a:endParaRPr lang="da-DK" dirty="0"/>
-          </a:p>
-          <a:p>
             <a:pPr lvl="1"/>
             <a:endParaRPr lang="da-DK" dirty="0"/>
-          </a:p>
-          <a:p>
-            <a:r>
-              <a:rPr lang="da-DK" dirty="0"/>
-              <a:t>Compare with last render and patch DOM</a:t>
-            </a:r>
           </a:p>
           <a:p>
             <a:endParaRPr lang="da-DK" dirty="0"/>
@@ -3289,6 +3311,1083 @@
               <a:t>12</a:t>
             </a:fld>
             <a:endParaRPr lang="en-US" dirty="0"/>
+          </a:p>
+        </p:txBody>
+      </p:sp>
+      <p:sp>
+        <p:nvSpPr>
+          <p:cNvPr id="5" name="Rectangle 4"/>
+          <p:cNvSpPr/>
+          <p:nvPr/>
+        </p:nvSpPr>
+        <p:spPr>
+          <a:xfrm>
+            <a:off x="3236744" y="1547035"/>
+            <a:ext cx="720000" cy="504056"/>
+          </a:xfrm>
+          <a:prstGeom prst="rect">
+            <a:avLst/>
+          </a:prstGeom>
+          <a:ln/>
+        </p:spPr>
+        <p:style>
+          <a:lnRef idx="2">
+            <a:schemeClr val="accent1">
+              <a:shade val="50000"/>
+            </a:schemeClr>
+          </a:lnRef>
+          <a:fillRef idx="1">
+            <a:schemeClr val="accent1"/>
+          </a:fillRef>
+          <a:effectRef idx="0">
+            <a:schemeClr val="accent1"/>
+          </a:effectRef>
+          <a:fontRef idx="minor">
+            <a:schemeClr val="lt1"/>
+          </a:fontRef>
+        </p:style>
+        <p:txBody>
+          <a:bodyPr rtlCol="0" anchor="ctr"/>
+          <a:lstStyle/>
+          <a:p>
+            <a:pPr algn="ctr"/>
+            <a:r>
+              <a:rPr lang="da-DK" sz="1600" dirty="0">
+                <a:solidFill>
+                  <a:schemeClr val="bg1"/>
+                </a:solidFill>
+                <a:latin typeface="Arial" panose="020B0604020202020204" pitchFamily="34" charset="0"/>
+                <a:cs typeface="Arial" panose="020B0604020202020204" pitchFamily="34" charset="0"/>
+              </a:rPr>
+              <a:t>div</a:t>
+            </a:r>
+          </a:p>
+        </p:txBody>
+      </p:sp>
+      <p:sp>
+        <p:nvSpPr>
+          <p:cNvPr id="7" name="Rectangle 6"/>
+          <p:cNvSpPr/>
+          <p:nvPr/>
+        </p:nvSpPr>
+        <p:spPr>
+          <a:xfrm>
+            <a:off x="2860376" y="2503743"/>
+            <a:ext cx="720000" cy="504056"/>
+          </a:xfrm>
+          <a:prstGeom prst="rect">
+            <a:avLst/>
+          </a:prstGeom>
+          <a:ln/>
+        </p:spPr>
+        <p:style>
+          <a:lnRef idx="2">
+            <a:schemeClr val="accent1">
+              <a:shade val="50000"/>
+            </a:schemeClr>
+          </a:lnRef>
+          <a:fillRef idx="1">
+            <a:schemeClr val="accent1"/>
+          </a:fillRef>
+          <a:effectRef idx="0">
+            <a:schemeClr val="accent1"/>
+          </a:effectRef>
+          <a:fontRef idx="minor">
+            <a:schemeClr val="lt1"/>
+          </a:fontRef>
+        </p:style>
+        <p:txBody>
+          <a:bodyPr rtlCol="0" anchor="ctr"/>
+          <a:lstStyle/>
+          <a:p>
+            <a:pPr algn="ctr"/>
+            <a:r>
+              <a:rPr lang="da-DK" sz="1600" dirty="0">
+                <a:solidFill>
+                  <a:schemeClr val="bg1"/>
+                </a:solidFill>
+                <a:latin typeface="Arial" panose="020B0604020202020204" pitchFamily="34" charset="0"/>
+                <a:cs typeface="Arial" panose="020B0604020202020204" pitchFamily="34" charset="0"/>
+              </a:rPr>
+              <a:t>h1</a:t>
+            </a:r>
+          </a:p>
+        </p:txBody>
+      </p:sp>
+      <p:sp>
+        <p:nvSpPr>
+          <p:cNvPr id="8" name="Rectangle 7"/>
+          <p:cNvSpPr/>
+          <p:nvPr/>
+        </p:nvSpPr>
+        <p:spPr>
+          <a:xfrm>
+            <a:off x="3699777" y="2503743"/>
+            <a:ext cx="720000" cy="504056"/>
+          </a:xfrm>
+          <a:prstGeom prst="rect">
+            <a:avLst/>
+          </a:prstGeom>
+          <a:ln/>
+        </p:spPr>
+        <p:style>
+          <a:lnRef idx="2">
+            <a:schemeClr val="accent1">
+              <a:shade val="50000"/>
+            </a:schemeClr>
+          </a:lnRef>
+          <a:fillRef idx="1">
+            <a:schemeClr val="accent1"/>
+          </a:fillRef>
+          <a:effectRef idx="0">
+            <a:schemeClr val="accent1"/>
+          </a:effectRef>
+          <a:fontRef idx="minor">
+            <a:schemeClr val="lt1"/>
+          </a:fontRef>
+        </p:style>
+        <p:txBody>
+          <a:bodyPr rtlCol="0" anchor="ctr"/>
+          <a:lstStyle/>
+          <a:p>
+            <a:pPr algn="ctr"/>
+            <a:r>
+              <a:rPr lang="da-DK" sz="1600" dirty="0">
+                <a:solidFill>
+                  <a:schemeClr val="bg1"/>
+                </a:solidFill>
+                <a:latin typeface="Arial" panose="020B0604020202020204" pitchFamily="34" charset="0"/>
+                <a:cs typeface="Arial" panose="020B0604020202020204" pitchFamily="34" charset="0"/>
+              </a:rPr>
+              <a:t>ul</a:t>
+            </a:r>
+          </a:p>
+        </p:txBody>
+      </p:sp>
+      <p:sp>
+        <p:nvSpPr>
+          <p:cNvPr id="9" name="Rectangle 8"/>
+          <p:cNvSpPr/>
+          <p:nvPr/>
+        </p:nvSpPr>
+        <p:spPr>
+          <a:xfrm>
+            <a:off x="3339777" y="3468232"/>
+            <a:ext cx="720000" cy="504056"/>
+          </a:xfrm>
+          <a:prstGeom prst="rect">
+            <a:avLst/>
+          </a:prstGeom>
+          <a:ln/>
+        </p:spPr>
+        <p:style>
+          <a:lnRef idx="2">
+            <a:schemeClr val="accent1">
+              <a:shade val="50000"/>
+            </a:schemeClr>
+          </a:lnRef>
+          <a:fillRef idx="1">
+            <a:schemeClr val="accent1"/>
+          </a:fillRef>
+          <a:effectRef idx="0">
+            <a:schemeClr val="accent1"/>
+          </a:effectRef>
+          <a:fontRef idx="minor">
+            <a:schemeClr val="lt1"/>
+          </a:fontRef>
+        </p:style>
+        <p:txBody>
+          <a:bodyPr rtlCol="0" anchor="ctr"/>
+          <a:lstStyle/>
+          <a:p>
+            <a:pPr algn="ctr"/>
+            <a:r>
+              <a:rPr lang="da-DK" sz="1600" dirty="0">
+                <a:solidFill>
+                  <a:schemeClr val="bg1"/>
+                </a:solidFill>
+                <a:latin typeface="Arial" panose="020B0604020202020204" pitchFamily="34" charset="0"/>
+                <a:cs typeface="Arial" panose="020B0604020202020204" pitchFamily="34" charset="0"/>
+              </a:rPr>
+              <a:t>li</a:t>
+            </a:r>
+          </a:p>
+        </p:txBody>
+      </p:sp>
+      <p:sp>
+        <p:nvSpPr>
+          <p:cNvPr id="10" name="Rectangle 9"/>
+          <p:cNvSpPr/>
+          <p:nvPr/>
+        </p:nvSpPr>
+        <p:spPr>
+          <a:xfrm>
+            <a:off x="4162810" y="3469944"/>
+            <a:ext cx="720000" cy="504056"/>
+          </a:xfrm>
+          <a:prstGeom prst="rect">
+            <a:avLst/>
+          </a:prstGeom>
+          <a:ln/>
+        </p:spPr>
+        <p:style>
+          <a:lnRef idx="2">
+            <a:schemeClr val="accent1">
+              <a:shade val="50000"/>
+            </a:schemeClr>
+          </a:lnRef>
+          <a:fillRef idx="1">
+            <a:schemeClr val="accent1"/>
+          </a:fillRef>
+          <a:effectRef idx="0">
+            <a:schemeClr val="accent1"/>
+          </a:effectRef>
+          <a:fontRef idx="minor">
+            <a:schemeClr val="lt1"/>
+          </a:fontRef>
+        </p:style>
+        <p:txBody>
+          <a:bodyPr rtlCol="0" anchor="ctr"/>
+          <a:lstStyle/>
+          <a:p>
+            <a:pPr algn="ctr"/>
+            <a:r>
+              <a:rPr lang="da-DK" sz="1600" dirty="0">
+                <a:solidFill>
+                  <a:schemeClr val="bg1"/>
+                </a:solidFill>
+                <a:latin typeface="Arial" panose="020B0604020202020204" pitchFamily="34" charset="0"/>
+                <a:cs typeface="Arial" panose="020B0604020202020204" pitchFamily="34" charset="0"/>
+              </a:rPr>
+              <a:t>li</a:t>
+            </a:r>
+          </a:p>
+        </p:txBody>
+      </p:sp>
+      <p:cxnSp>
+        <p:nvCxnSpPr>
+          <p:cNvPr id="12" name="Straight Connector 11"/>
+          <p:cNvCxnSpPr>
+            <a:stCxn id="5" idx="2"/>
+            <a:endCxn id="7" idx="0"/>
+          </p:cNvCxnSpPr>
+          <p:nvPr/>
+        </p:nvCxnSpPr>
+        <p:spPr>
+          <a:xfrm flipH="1">
+            <a:off x="3220376" y="2051091"/>
+            <a:ext cx="376368" cy="452652"/>
+          </a:xfrm>
+          <a:prstGeom prst="line">
+            <a:avLst/>
+          </a:prstGeom>
+        </p:spPr>
+        <p:style>
+          <a:lnRef idx="1">
+            <a:schemeClr val="accent1"/>
+          </a:lnRef>
+          <a:fillRef idx="0">
+            <a:schemeClr val="accent1"/>
+          </a:fillRef>
+          <a:effectRef idx="0">
+            <a:schemeClr val="accent1"/>
+          </a:effectRef>
+          <a:fontRef idx="minor">
+            <a:schemeClr val="tx1"/>
+          </a:fontRef>
+        </p:style>
+      </p:cxnSp>
+      <p:cxnSp>
+        <p:nvCxnSpPr>
+          <p:cNvPr id="17" name="Straight Connector 16"/>
+          <p:cNvCxnSpPr>
+            <a:stCxn id="5" idx="2"/>
+            <a:endCxn id="8" idx="0"/>
+          </p:cNvCxnSpPr>
+          <p:nvPr/>
+        </p:nvCxnSpPr>
+        <p:spPr>
+          <a:xfrm>
+            <a:off x="3596744" y="2051091"/>
+            <a:ext cx="463033" cy="452652"/>
+          </a:xfrm>
+          <a:prstGeom prst="line">
+            <a:avLst/>
+          </a:prstGeom>
+        </p:spPr>
+        <p:style>
+          <a:lnRef idx="1">
+            <a:schemeClr val="accent1"/>
+          </a:lnRef>
+          <a:fillRef idx="0">
+            <a:schemeClr val="accent1"/>
+          </a:fillRef>
+          <a:effectRef idx="0">
+            <a:schemeClr val="accent1"/>
+          </a:effectRef>
+          <a:fontRef idx="minor">
+            <a:schemeClr val="tx1"/>
+          </a:fontRef>
+        </p:style>
+      </p:cxnSp>
+      <p:cxnSp>
+        <p:nvCxnSpPr>
+          <p:cNvPr id="19" name="Straight Connector 18"/>
+          <p:cNvCxnSpPr>
+            <a:stCxn id="8" idx="2"/>
+            <a:endCxn id="9" idx="0"/>
+          </p:cNvCxnSpPr>
+          <p:nvPr/>
+        </p:nvCxnSpPr>
+        <p:spPr>
+          <a:xfrm flipH="1">
+            <a:off x="3699777" y="3007799"/>
+            <a:ext cx="360000" cy="460433"/>
+          </a:xfrm>
+          <a:prstGeom prst="line">
+            <a:avLst/>
+          </a:prstGeom>
+        </p:spPr>
+        <p:style>
+          <a:lnRef idx="1">
+            <a:schemeClr val="accent1"/>
+          </a:lnRef>
+          <a:fillRef idx="0">
+            <a:schemeClr val="accent1"/>
+          </a:fillRef>
+          <a:effectRef idx="0">
+            <a:schemeClr val="accent1"/>
+          </a:effectRef>
+          <a:fontRef idx="minor">
+            <a:schemeClr val="tx1"/>
+          </a:fontRef>
+        </p:style>
+      </p:cxnSp>
+      <p:cxnSp>
+        <p:nvCxnSpPr>
+          <p:cNvPr id="21" name="Straight Connector 20"/>
+          <p:cNvCxnSpPr>
+            <a:stCxn id="8" idx="2"/>
+            <a:endCxn id="10" idx="0"/>
+          </p:cNvCxnSpPr>
+          <p:nvPr/>
+        </p:nvCxnSpPr>
+        <p:spPr>
+          <a:xfrm>
+            <a:off x="4059777" y="3007799"/>
+            <a:ext cx="463033" cy="462145"/>
+          </a:xfrm>
+          <a:prstGeom prst="line">
+            <a:avLst/>
+          </a:prstGeom>
+        </p:spPr>
+        <p:style>
+          <a:lnRef idx="1">
+            <a:schemeClr val="accent1"/>
+          </a:lnRef>
+          <a:fillRef idx="0">
+            <a:schemeClr val="accent1"/>
+          </a:fillRef>
+          <a:effectRef idx="0">
+            <a:schemeClr val="accent1"/>
+          </a:effectRef>
+          <a:fontRef idx="minor">
+            <a:schemeClr val="tx1"/>
+          </a:fontRef>
+        </p:style>
+      </p:cxnSp>
+      <p:sp>
+        <p:nvSpPr>
+          <p:cNvPr id="57" name="Rectangle 56"/>
+          <p:cNvSpPr/>
+          <p:nvPr/>
+        </p:nvSpPr>
+        <p:spPr>
+          <a:xfrm>
+            <a:off x="7231939" y="1547035"/>
+            <a:ext cx="720000" cy="504056"/>
+          </a:xfrm>
+          <a:prstGeom prst="rect">
+            <a:avLst/>
+          </a:prstGeom>
+          <a:ln/>
+        </p:spPr>
+        <p:style>
+          <a:lnRef idx="2">
+            <a:schemeClr val="accent1">
+              <a:shade val="50000"/>
+            </a:schemeClr>
+          </a:lnRef>
+          <a:fillRef idx="1">
+            <a:schemeClr val="accent1"/>
+          </a:fillRef>
+          <a:effectRef idx="0">
+            <a:schemeClr val="accent1"/>
+          </a:effectRef>
+          <a:fontRef idx="minor">
+            <a:schemeClr val="lt1"/>
+          </a:fontRef>
+        </p:style>
+        <p:txBody>
+          <a:bodyPr rtlCol="0" anchor="ctr"/>
+          <a:lstStyle/>
+          <a:p>
+            <a:pPr algn="ctr"/>
+            <a:r>
+              <a:rPr lang="da-DK" sz="1600" dirty="0">
+                <a:solidFill>
+                  <a:schemeClr val="bg1"/>
+                </a:solidFill>
+                <a:latin typeface="Arial" panose="020B0604020202020204" pitchFamily="34" charset="0"/>
+                <a:cs typeface="Arial" panose="020B0604020202020204" pitchFamily="34" charset="0"/>
+              </a:rPr>
+              <a:t>div</a:t>
+            </a:r>
+          </a:p>
+        </p:txBody>
+      </p:sp>
+      <p:sp>
+        <p:nvSpPr>
+          <p:cNvPr id="58" name="Rectangle 57"/>
+          <p:cNvSpPr/>
+          <p:nvPr/>
+        </p:nvSpPr>
+        <p:spPr>
+          <a:xfrm>
+            <a:off x="6855571" y="2503743"/>
+            <a:ext cx="720000" cy="504056"/>
+          </a:xfrm>
+          <a:prstGeom prst="rect">
+            <a:avLst/>
+          </a:prstGeom>
+          <a:ln/>
+        </p:spPr>
+        <p:style>
+          <a:lnRef idx="2">
+            <a:schemeClr val="accent1">
+              <a:shade val="50000"/>
+            </a:schemeClr>
+          </a:lnRef>
+          <a:fillRef idx="1">
+            <a:schemeClr val="accent1"/>
+          </a:fillRef>
+          <a:effectRef idx="0">
+            <a:schemeClr val="accent1"/>
+          </a:effectRef>
+          <a:fontRef idx="minor">
+            <a:schemeClr val="lt1"/>
+          </a:fontRef>
+        </p:style>
+        <p:txBody>
+          <a:bodyPr rtlCol="0" anchor="ctr"/>
+          <a:lstStyle/>
+          <a:p>
+            <a:pPr algn="ctr"/>
+            <a:r>
+              <a:rPr lang="da-DK" sz="1600" dirty="0">
+                <a:solidFill>
+                  <a:schemeClr val="bg1"/>
+                </a:solidFill>
+                <a:latin typeface="Arial" panose="020B0604020202020204" pitchFamily="34" charset="0"/>
+                <a:cs typeface="Arial" panose="020B0604020202020204" pitchFamily="34" charset="0"/>
+              </a:rPr>
+              <a:t>h1</a:t>
+            </a:r>
+          </a:p>
+        </p:txBody>
+      </p:sp>
+      <p:sp>
+        <p:nvSpPr>
+          <p:cNvPr id="59" name="Rectangle 58"/>
+          <p:cNvSpPr/>
+          <p:nvPr/>
+        </p:nvSpPr>
+        <p:spPr>
+          <a:xfrm>
+            <a:off x="7694972" y="2503743"/>
+            <a:ext cx="720000" cy="504056"/>
+          </a:xfrm>
+          <a:prstGeom prst="rect">
+            <a:avLst/>
+          </a:prstGeom>
+          <a:ln/>
+        </p:spPr>
+        <p:style>
+          <a:lnRef idx="2">
+            <a:schemeClr val="accent1">
+              <a:shade val="50000"/>
+            </a:schemeClr>
+          </a:lnRef>
+          <a:fillRef idx="1">
+            <a:schemeClr val="accent1"/>
+          </a:fillRef>
+          <a:effectRef idx="0">
+            <a:schemeClr val="accent1"/>
+          </a:effectRef>
+          <a:fontRef idx="minor">
+            <a:schemeClr val="lt1"/>
+          </a:fontRef>
+        </p:style>
+        <p:txBody>
+          <a:bodyPr rtlCol="0" anchor="ctr"/>
+          <a:lstStyle/>
+          <a:p>
+            <a:pPr algn="ctr"/>
+            <a:r>
+              <a:rPr lang="da-DK" sz="1600" dirty="0">
+                <a:solidFill>
+                  <a:schemeClr val="bg1"/>
+                </a:solidFill>
+                <a:latin typeface="Arial" panose="020B0604020202020204" pitchFamily="34" charset="0"/>
+                <a:cs typeface="Arial" panose="020B0604020202020204" pitchFamily="34" charset="0"/>
+              </a:rPr>
+              <a:t>ul</a:t>
+            </a:r>
+          </a:p>
+        </p:txBody>
+      </p:sp>
+      <p:sp>
+        <p:nvSpPr>
+          <p:cNvPr id="60" name="Rectangle 59"/>
+          <p:cNvSpPr/>
+          <p:nvPr/>
+        </p:nvSpPr>
+        <p:spPr>
+          <a:xfrm>
+            <a:off x="7334972" y="3468232"/>
+            <a:ext cx="720000" cy="504056"/>
+          </a:xfrm>
+          <a:prstGeom prst="rect">
+            <a:avLst/>
+          </a:prstGeom>
+          <a:ln/>
+        </p:spPr>
+        <p:style>
+          <a:lnRef idx="2">
+            <a:schemeClr val="accent1">
+              <a:shade val="50000"/>
+            </a:schemeClr>
+          </a:lnRef>
+          <a:fillRef idx="1">
+            <a:schemeClr val="accent1"/>
+          </a:fillRef>
+          <a:effectRef idx="0">
+            <a:schemeClr val="accent1"/>
+          </a:effectRef>
+          <a:fontRef idx="minor">
+            <a:schemeClr val="lt1"/>
+          </a:fontRef>
+        </p:style>
+        <p:txBody>
+          <a:bodyPr rtlCol="0" anchor="ctr"/>
+          <a:lstStyle/>
+          <a:p>
+            <a:pPr algn="ctr"/>
+            <a:r>
+              <a:rPr lang="da-DK" sz="1600" dirty="0">
+                <a:solidFill>
+                  <a:schemeClr val="bg1"/>
+                </a:solidFill>
+                <a:latin typeface="Arial" panose="020B0604020202020204" pitchFamily="34" charset="0"/>
+                <a:cs typeface="Arial" panose="020B0604020202020204" pitchFamily="34" charset="0"/>
+              </a:rPr>
+              <a:t>li</a:t>
+            </a:r>
+          </a:p>
+        </p:txBody>
+      </p:sp>
+      <p:sp>
+        <p:nvSpPr>
+          <p:cNvPr id="61" name="Rectangle 60"/>
+          <p:cNvSpPr/>
+          <p:nvPr/>
+        </p:nvSpPr>
+        <p:spPr>
+          <a:xfrm>
+            <a:off x="8158005" y="3469944"/>
+            <a:ext cx="720000" cy="504056"/>
+          </a:xfrm>
+          <a:prstGeom prst="rect">
+            <a:avLst/>
+          </a:prstGeom>
+          <a:ln/>
+        </p:spPr>
+        <p:style>
+          <a:lnRef idx="2">
+            <a:schemeClr val="accent1">
+              <a:shade val="50000"/>
+            </a:schemeClr>
+          </a:lnRef>
+          <a:fillRef idx="1">
+            <a:schemeClr val="accent1"/>
+          </a:fillRef>
+          <a:effectRef idx="0">
+            <a:schemeClr val="accent1"/>
+          </a:effectRef>
+          <a:fontRef idx="minor">
+            <a:schemeClr val="lt1"/>
+          </a:fontRef>
+        </p:style>
+        <p:txBody>
+          <a:bodyPr rtlCol="0" anchor="ctr"/>
+          <a:lstStyle/>
+          <a:p>
+            <a:pPr algn="ctr"/>
+            <a:r>
+              <a:rPr lang="da-DK" sz="1600" dirty="0">
+                <a:solidFill>
+                  <a:schemeClr val="bg1"/>
+                </a:solidFill>
+                <a:latin typeface="Arial" panose="020B0604020202020204" pitchFamily="34" charset="0"/>
+                <a:cs typeface="Arial" panose="020B0604020202020204" pitchFamily="34" charset="0"/>
+              </a:rPr>
+              <a:t>li</a:t>
+            </a:r>
+          </a:p>
+        </p:txBody>
+      </p:sp>
+      <p:cxnSp>
+        <p:nvCxnSpPr>
+          <p:cNvPr id="62" name="Straight Connector 61"/>
+          <p:cNvCxnSpPr>
+            <a:stCxn id="57" idx="2"/>
+            <a:endCxn id="58" idx="0"/>
+          </p:cNvCxnSpPr>
+          <p:nvPr/>
+        </p:nvCxnSpPr>
+        <p:spPr>
+          <a:xfrm flipH="1">
+            <a:off x="7215571" y="2051091"/>
+            <a:ext cx="376368" cy="452652"/>
+          </a:xfrm>
+          <a:prstGeom prst="line">
+            <a:avLst/>
+          </a:prstGeom>
+        </p:spPr>
+        <p:style>
+          <a:lnRef idx="1">
+            <a:schemeClr val="accent1"/>
+          </a:lnRef>
+          <a:fillRef idx="0">
+            <a:schemeClr val="accent1"/>
+          </a:fillRef>
+          <a:effectRef idx="0">
+            <a:schemeClr val="accent1"/>
+          </a:effectRef>
+          <a:fontRef idx="minor">
+            <a:schemeClr val="tx1"/>
+          </a:fontRef>
+        </p:style>
+      </p:cxnSp>
+      <p:cxnSp>
+        <p:nvCxnSpPr>
+          <p:cNvPr id="63" name="Straight Connector 62"/>
+          <p:cNvCxnSpPr>
+            <a:stCxn id="57" idx="2"/>
+            <a:endCxn id="59" idx="0"/>
+          </p:cNvCxnSpPr>
+          <p:nvPr/>
+        </p:nvCxnSpPr>
+        <p:spPr>
+          <a:xfrm>
+            <a:off x="7591939" y="2051091"/>
+            <a:ext cx="463033" cy="452652"/>
+          </a:xfrm>
+          <a:prstGeom prst="line">
+            <a:avLst/>
+          </a:prstGeom>
+        </p:spPr>
+        <p:style>
+          <a:lnRef idx="1">
+            <a:schemeClr val="accent1"/>
+          </a:lnRef>
+          <a:fillRef idx="0">
+            <a:schemeClr val="accent1"/>
+          </a:fillRef>
+          <a:effectRef idx="0">
+            <a:schemeClr val="accent1"/>
+          </a:effectRef>
+          <a:fontRef idx="minor">
+            <a:schemeClr val="tx1"/>
+          </a:fontRef>
+        </p:style>
+      </p:cxnSp>
+      <p:cxnSp>
+        <p:nvCxnSpPr>
+          <p:cNvPr id="64" name="Straight Connector 63"/>
+          <p:cNvCxnSpPr>
+            <a:stCxn id="59" idx="2"/>
+            <a:endCxn id="60" idx="0"/>
+          </p:cNvCxnSpPr>
+          <p:nvPr/>
+        </p:nvCxnSpPr>
+        <p:spPr>
+          <a:xfrm flipH="1">
+            <a:off x="7694972" y="3007799"/>
+            <a:ext cx="360000" cy="460433"/>
+          </a:xfrm>
+          <a:prstGeom prst="line">
+            <a:avLst/>
+          </a:prstGeom>
+        </p:spPr>
+        <p:style>
+          <a:lnRef idx="1">
+            <a:schemeClr val="accent1"/>
+          </a:lnRef>
+          <a:fillRef idx="0">
+            <a:schemeClr val="accent1"/>
+          </a:fillRef>
+          <a:effectRef idx="0">
+            <a:schemeClr val="accent1"/>
+          </a:effectRef>
+          <a:fontRef idx="minor">
+            <a:schemeClr val="tx1"/>
+          </a:fontRef>
+        </p:style>
+      </p:cxnSp>
+      <p:cxnSp>
+        <p:nvCxnSpPr>
+          <p:cNvPr id="65" name="Straight Connector 64"/>
+          <p:cNvCxnSpPr>
+            <a:stCxn id="59" idx="2"/>
+            <a:endCxn id="61" idx="0"/>
+          </p:cNvCxnSpPr>
+          <p:nvPr/>
+        </p:nvCxnSpPr>
+        <p:spPr>
+          <a:xfrm>
+            <a:off x="8054972" y="3007799"/>
+            <a:ext cx="463033" cy="462145"/>
+          </a:xfrm>
+          <a:prstGeom prst="line">
+            <a:avLst/>
+          </a:prstGeom>
+        </p:spPr>
+        <p:style>
+          <a:lnRef idx="1">
+            <a:schemeClr val="accent1"/>
+          </a:lnRef>
+          <a:fillRef idx="0">
+            <a:schemeClr val="accent1"/>
+          </a:fillRef>
+          <a:effectRef idx="0">
+            <a:schemeClr val="accent1"/>
+          </a:effectRef>
+          <a:fontRef idx="minor">
+            <a:schemeClr val="tx1"/>
+          </a:fontRef>
+        </p:style>
+      </p:cxnSp>
+      <p:sp>
+        <p:nvSpPr>
+          <p:cNvPr id="66" name="Rectangle 65"/>
+          <p:cNvSpPr/>
+          <p:nvPr/>
+        </p:nvSpPr>
+        <p:spPr>
+          <a:xfrm>
+            <a:off x="8534373" y="2503743"/>
+            <a:ext cx="720000" cy="504056"/>
+          </a:xfrm>
+          <a:prstGeom prst="rect">
+            <a:avLst/>
+          </a:prstGeom>
+          <a:ln/>
+        </p:spPr>
+        <p:style>
+          <a:lnRef idx="2">
+            <a:schemeClr val="accent3">
+              <a:shade val="50000"/>
+            </a:schemeClr>
+          </a:lnRef>
+          <a:fillRef idx="1">
+            <a:schemeClr val="accent3"/>
+          </a:fillRef>
+          <a:effectRef idx="0">
+            <a:schemeClr val="accent3"/>
+          </a:effectRef>
+          <a:fontRef idx="minor">
+            <a:schemeClr val="lt1"/>
+          </a:fontRef>
+        </p:style>
+        <p:txBody>
+          <a:bodyPr rtlCol="0" anchor="ctr"/>
+          <a:lstStyle/>
+          <a:p>
+            <a:pPr algn="ctr"/>
+            <a:r>
+              <a:rPr lang="da-DK" sz="1600" dirty="0">
+                <a:solidFill>
+                  <a:schemeClr val="bg1"/>
+                </a:solidFill>
+                <a:latin typeface="Arial" panose="020B0604020202020204" pitchFamily="34" charset="0"/>
+                <a:cs typeface="Arial" panose="020B0604020202020204" pitchFamily="34" charset="0"/>
+              </a:rPr>
+              <a:t>p</a:t>
+            </a:r>
+          </a:p>
+        </p:txBody>
+      </p:sp>
+      <p:cxnSp>
+        <p:nvCxnSpPr>
+          <p:cNvPr id="71" name="Straight Connector 70"/>
+          <p:cNvCxnSpPr>
+            <a:stCxn id="57" idx="2"/>
+            <a:endCxn id="66" idx="0"/>
+          </p:cNvCxnSpPr>
+          <p:nvPr/>
+        </p:nvCxnSpPr>
+        <p:spPr>
+          <a:xfrm>
+            <a:off x="7591939" y="2051091"/>
+            <a:ext cx="1302434" cy="452652"/>
+          </a:xfrm>
+          <a:prstGeom prst="line">
+            <a:avLst/>
+          </a:prstGeom>
+        </p:spPr>
+        <p:style>
+          <a:lnRef idx="1">
+            <a:schemeClr val="accent3"/>
+          </a:lnRef>
+          <a:fillRef idx="0">
+            <a:schemeClr val="accent3"/>
+          </a:fillRef>
+          <a:effectRef idx="0">
+            <a:schemeClr val="accent3"/>
+          </a:effectRef>
+          <a:fontRef idx="minor">
+            <a:schemeClr val="tx1"/>
+          </a:fontRef>
+        </p:style>
+      </p:cxnSp>
+      <p:sp>
+        <p:nvSpPr>
+          <p:cNvPr id="75" name="Arrow: Down 74"/>
+          <p:cNvSpPr/>
+          <p:nvPr/>
+        </p:nvSpPr>
+        <p:spPr>
+          <a:xfrm>
+            <a:off x="5657705" y="4192795"/>
+            <a:ext cx="432048" cy="840648"/>
+          </a:xfrm>
+          <a:prstGeom prst="downArrow">
+            <a:avLst/>
+          </a:prstGeom>
+          <a:solidFill>
+            <a:schemeClr val="tx1"/>
+          </a:solidFill>
+          <a:ln w="9525">
+            <a:noFill/>
+            <a:prstDash val="dash"/>
+          </a:ln>
+        </p:spPr>
+        <p:style>
+          <a:lnRef idx="2">
+            <a:schemeClr val="accent1">
+              <a:shade val="50000"/>
+            </a:schemeClr>
+          </a:lnRef>
+          <a:fillRef idx="1">
+            <a:schemeClr val="accent1"/>
+          </a:fillRef>
+          <a:effectRef idx="0">
+            <a:schemeClr val="accent1"/>
+          </a:effectRef>
+          <a:fontRef idx="minor">
+            <a:schemeClr val="lt1"/>
+          </a:fontRef>
+        </p:style>
+        <p:txBody>
+          <a:bodyPr rtlCol="0" anchor="ctr"/>
+          <a:lstStyle/>
+          <a:p>
+            <a:pPr algn="ctr"/>
+            <a:endParaRPr lang="da-DK" sz="900" dirty="0">
+              <a:solidFill>
+                <a:schemeClr val="tx1"/>
+              </a:solidFill>
+              <a:latin typeface="Arial" panose="020B0604020202020204" pitchFamily="34" charset="0"/>
+              <a:cs typeface="Arial" panose="020B0604020202020204" pitchFamily="34" charset="0"/>
+            </a:endParaRPr>
+          </a:p>
+        </p:txBody>
+      </p:sp>
+      <p:sp>
+        <p:nvSpPr>
+          <p:cNvPr id="77" name="Arrow: Left-Right 76"/>
+          <p:cNvSpPr/>
+          <p:nvPr/>
+        </p:nvSpPr>
+        <p:spPr>
+          <a:xfrm>
+            <a:off x="5297665" y="2503743"/>
+            <a:ext cx="1152128" cy="382062"/>
+          </a:xfrm>
+          <a:prstGeom prst="leftRightArrow">
+            <a:avLst/>
+          </a:prstGeom>
+          <a:solidFill>
+            <a:schemeClr val="tx1"/>
+          </a:solidFill>
+          <a:ln w="9525">
+            <a:noFill/>
+            <a:prstDash val="dash"/>
+          </a:ln>
+        </p:spPr>
+        <p:style>
+          <a:lnRef idx="2">
+            <a:schemeClr val="accent1">
+              <a:shade val="50000"/>
+            </a:schemeClr>
+          </a:lnRef>
+          <a:fillRef idx="1">
+            <a:schemeClr val="accent1"/>
+          </a:fillRef>
+          <a:effectRef idx="0">
+            <a:schemeClr val="accent1"/>
+          </a:effectRef>
+          <a:fontRef idx="minor">
+            <a:schemeClr val="lt1"/>
+          </a:fontRef>
+        </p:style>
+        <p:txBody>
+          <a:bodyPr rtlCol="0" anchor="ctr"/>
+          <a:lstStyle/>
+          <a:p>
+            <a:pPr algn="ctr"/>
+            <a:endParaRPr lang="da-DK" sz="900" dirty="0">
+              <a:solidFill>
+                <a:schemeClr val="tx1"/>
+              </a:solidFill>
+              <a:latin typeface="Arial" panose="020B0604020202020204" pitchFamily="34" charset="0"/>
+              <a:cs typeface="Arial" panose="020B0604020202020204" pitchFamily="34" charset="0"/>
+            </a:endParaRPr>
+          </a:p>
+        </p:txBody>
+      </p:sp>
+      <p:sp>
+        <p:nvSpPr>
+          <p:cNvPr id="78" name="TextBox 77"/>
+          <p:cNvSpPr txBox="1"/>
+          <p:nvPr/>
+        </p:nvSpPr>
+        <p:spPr>
+          <a:xfrm>
+            <a:off x="5530944" y="2228313"/>
+            <a:ext cx="626202" cy="369332"/>
+          </a:xfrm>
+          <a:prstGeom prst="rect">
+            <a:avLst/>
+          </a:prstGeom>
+          <a:noFill/>
+        </p:spPr>
+        <p:txBody>
+          <a:bodyPr wrap="square" lIns="0" tIns="0" rIns="0" bIns="0" rtlCol="0">
+            <a:spAutoFit/>
+          </a:bodyPr>
+          <a:lstStyle/>
+          <a:p>
+            <a:pPr algn="ctr"/>
+            <a:r>
+              <a:rPr lang="da-DK" sz="2400" dirty="0">
+                <a:latin typeface="Arial" panose="020B0604020202020204" pitchFamily="34" charset="0"/>
+                <a:ea typeface="Open Sans" panose="020B0606030504020204" pitchFamily="34" charset="0"/>
+                <a:cs typeface="Arial" panose="020B0604020202020204" pitchFamily="34" charset="0"/>
+              </a:rPr>
+              <a:t>diff</a:t>
+            </a:r>
+          </a:p>
+        </p:txBody>
+      </p:sp>
+      <p:sp>
+        <p:nvSpPr>
+          <p:cNvPr id="79" name="TextBox 78"/>
+          <p:cNvSpPr txBox="1"/>
+          <p:nvPr/>
+        </p:nvSpPr>
+        <p:spPr>
+          <a:xfrm>
+            <a:off x="5888773" y="4325966"/>
+            <a:ext cx="1198280" cy="369332"/>
+          </a:xfrm>
+          <a:prstGeom prst="rect">
+            <a:avLst/>
+          </a:prstGeom>
+          <a:noFill/>
+        </p:spPr>
+        <p:txBody>
+          <a:bodyPr wrap="square" lIns="0" tIns="0" rIns="0" bIns="0" rtlCol="0">
+            <a:spAutoFit/>
+          </a:bodyPr>
+          <a:lstStyle/>
+          <a:p>
+            <a:pPr algn="ctr"/>
+            <a:r>
+              <a:rPr lang="da-DK" sz="2400" dirty="0">
+                <a:latin typeface="Arial" panose="020B0604020202020204" pitchFamily="34" charset="0"/>
+                <a:ea typeface="Open Sans" panose="020B0606030504020204" pitchFamily="34" charset="0"/>
+                <a:cs typeface="Arial" panose="020B0604020202020204" pitchFamily="34" charset="0"/>
+              </a:rPr>
+              <a:t>patch</a:t>
+            </a:r>
+          </a:p>
+        </p:txBody>
+      </p:sp>
+      <p:sp>
+        <p:nvSpPr>
+          <p:cNvPr id="80" name="Rectangle 79"/>
+          <p:cNvSpPr/>
+          <p:nvPr/>
+        </p:nvSpPr>
+        <p:spPr>
+          <a:xfrm>
+            <a:off x="4522810" y="5085184"/>
+            <a:ext cx="2880945" cy="1152128"/>
+          </a:xfrm>
+          <a:prstGeom prst="rect">
+            <a:avLst/>
+          </a:prstGeom>
+          <a:solidFill>
+            <a:schemeClr val="tx1"/>
+          </a:solidFill>
+          <a:ln w="9525">
+            <a:noFill/>
+            <a:prstDash val="dash"/>
+          </a:ln>
+        </p:spPr>
+        <p:style>
+          <a:lnRef idx="2">
+            <a:schemeClr val="accent1">
+              <a:shade val="50000"/>
+            </a:schemeClr>
+          </a:lnRef>
+          <a:fillRef idx="1">
+            <a:schemeClr val="accent1"/>
+          </a:fillRef>
+          <a:effectRef idx="0">
+            <a:schemeClr val="accent1"/>
+          </a:effectRef>
+          <a:fontRef idx="minor">
+            <a:schemeClr val="lt1"/>
+          </a:fontRef>
+        </p:style>
+        <p:txBody>
+          <a:bodyPr rtlCol="0" anchor="ctr"/>
+          <a:lstStyle/>
+          <a:p>
+            <a:pPr algn="ctr"/>
+            <a:r>
+              <a:rPr lang="da-DK" sz="2400" dirty="0">
+                <a:solidFill>
+                  <a:schemeClr val="bg1"/>
+                </a:solidFill>
+                <a:latin typeface="Arial" panose="020B0604020202020204" pitchFamily="34" charset="0"/>
+                <a:cs typeface="Arial" panose="020B0604020202020204" pitchFamily="34" charset="0"/>
+              </a:rPr>
+              <a:t>DOM</a:t>
+            </a:r>
           </a:p>
         </p:txBody>
       </p:sp>
@@ -3339,7 +4438,7 @@
           <a:p>
             <a:r>
               <a:rPr lang="da-DK" dirty="0"/>
-              <a:t>Advice</a:t>
+              <a:t>React Component Lifecycle</a:t>
             </a:r>
           </a:p>
         </p:txBody>
@@ -3359,16 +4458,82 @@
           <a:bodyPr/>
           <a:lstStyle/>
           <a:p>
+            <a:endParaRPr lang="da-DK" dirty="0"/>
+          </a:p>
+          <a:p>
             <a:r>
               <a:rPr lang="da-DK" dirty="0"/>
-              <a:t>React</a:t>
+              <a:t>Component added: </a:t>
+            </a:r>
+            <a:r>
+              <a:rPr lang="da-DK" b="1" dirty="0"/>
+              <a:t>Mount</a:t>
             </a:r>
           </a:p>
           <a:p>
             <a:pPr lvl="1"/>
             <a:r>
               <a:rPr lang="da-DK" dirty="0"/>
-              <a:t>create-react-app from Facebook</a:t>
+              <a:t>componentWillMount</a:t>
+            </a:r>
+          </a:p>
+          <a:p>
+            <a:pPr lvl="1"/>
+            <a:r>
+              <a:rPr lang="da-DK" dirty="0"/>
+              <a:t>componentDidMount</a:t>
+            </a:r>
+          </a:p>
+          <a:p>
+            <a:pPr lvl="1"/>
+            <a:endParaRPr lang="da-DK" dirty="0"/>
+          </a:p>
+          <a:p>
+            <a:r>
+              <a:rPr lang="da-DK" dirty="0"/>
+              <a:t>Component updated</a:t>
+            </a:r>
+          </a:p>
+          <a:p>
+            <a:pPr lvl="1"/>
+            <a:r>
+              <a:rPr lang="da-DK" dirty="0"/>
+              <a:t>componentShouldUpdate</a:t>
+            </a:r>
+          </a:p>
+          <a:p>
+            <a:pPr lvl="1"/>
+            <a:r>
+              <a:rPr lang="da-DK" dirty="0"/>
+              <a:t>componentWillUpdate</a:t>
+            </a:r>
+          </a:p>
+          <a:p>
+            <a:pPr lvl="1"/>
+            <a:r>
+              <a:rPr lang="da-DK" dirty="0"/>
+              <a:t>componentDidUpdate</a:t>
+            </a:r>
+          </a:p>
+          <a:p>
+            <a:pPr lvl="1"/>
+            <a:endParaRPr lang="da-DK" dirty="0"/>
+          </a:p>
+          <a:p>
+            <a:r>
+              <a:rPr lang="da-DK" dirty="0"/>
+              <a:t>Component removed: </a:t>
+            </a:r>
+            <a:r>
+              <a:rPr lang="da-DK" b="1" dirty="0"/>
+              <a:t>Unmount</a:t>
+            </a:r>
+          </a:p>
+          <a:p>
+            <a:pPr lvl="1"/>
+            <a:r>
+              <a:rPr lang="da-DK" dirty="0"/>
+              <a:t>componentWillUnmount</a:t>
             </a:r>
           </a:p>
         </p:txBody>
@@ -3397,161 +4562,18 @@
           </a:p>
         </p:txBody>
       </p:sp>
-    </p:spTree>
-    <p:extLst>
-      <p:ext uri="{BB962C8B-B14F-4D97-AF65-F5344CB8AC3E}">
-        <p14:creationId xmlns:p14="http://schemas.microsoft.com/office/powerpoint/2010/main" val="1592274045"/>
-      </p:ext>
-    </p:extLst>
-  </p:cSld>
-  <p:clrMapOvr>
-    <a:masterClrMapping/>
-  </p:clrMapOvr>
-</p:sld>
-</file>
-
-<file path=ppt/slides/slide2.xml><?xml version="1.0" encoding="utf-8"?>
-<p:sld xmlns:a="http://schemas.openxmlformats.org/drawingml/2006/main" xmlns:r="http://schemas.openxmlformats.org/officeDocument/2006/relationships" xmlns:p="http://schemas.openxmlformats.org/presentationml/2006/main">
-  <p:cSld>
-    <p:spTree>
-      <p:nvGrpSpPr>
-        <p:cNvPr id="1" name=""/>
-        <p:cNvGrpSpPr/>
-        <p:nvPr/>
-      </p:nvGrpSpPr>
-      <p:grpSpPr>
-        <a:xfrm>
-          <a:off x="0" y="0"/>
-          <a:ext cx="0" cy="0"/>
-          <a:chOff x="0" y="0"/>
-          <a:chExt cx="0" cy="0"/>
-        </a:xfrm>
-      </p:grpSpPr>
-      <p:sp>
-        <p:nvSpPr>
-          <p:cNvPr id="2" name="Title 1"/>
-          <p:cNvSpPr>
-            <a:spLocks noGrp="1"/>
-          </p:cNvSpPr>
-          <p:nvPr>
-            <p:ph type="title"/>
-          </p:nvPr>
-        </p:nvSpPr>
-        <p:spPr/>
-        <p:txBody>
-          <a:bodyPr/>
-          <a:lstStyle/>
-          <a:p>
-            <a:r>
-              <a:rPr lang="da-DK" dirty="0"/>
-              <a:t>Me</a:t>
-            </a:r>
-          </a:p>
-        </p:txBody>
-      </p:sp>
-      <p:sp>
-        <p:nvSpPr>
-          <p:cNvPr id="3" name="Content Placeholder 2"/>
-          <p:cNvSpPr>
-            <a:spLocks noGrp="1"/>
-          </p:cNvSpPr>
-          <p:nvPr>
-            <p:ph idx="1"/>
-          </p:nvPr>
-        </p:nvSpPr>
-        <p:spPr/>
-        <p:txBody>
-          <a:bodyPr/>
-          <a:lstStyle/>
-          <a:p>
-            <a:r>
-              <a:rPr lang="da-DK" dirty="0"/>
-              <a:t>Developer at Templafy</a:t>
-            </a:r>
-          </a:p>
-          <a:p>
-            <a:endParaRPr lang="da-DK" dirty="0"/>
-          </a:p>
-          <a:p>
-            <a:endParaRPr lang="da-DK" dirty="0"/>
-          </a:p>
-          <a:p>
-            <a:endParaRPr lang="da-DK" dirty="0"/>
-          </a:p>
-          <a:p>
-            <a:endParaRPr lang="da-DK" dirty="0"/>
-          </a:p>
-          <a:p>
-            <a:endParaRPr lang="da-DK" dirty="0"/>
-          </a:p>
-          <a:p>
-            <a:endParaRPr lang="da-DK" dirty="0"/>
-          </a:p>
-          <a:p>
-            <a:endParaRPr lang="da-DK" dirty="0"/>
-          </a:p>
-          <a:p>
-            <a:endParaRPr lang="da-DK" dirty="0"/>
-          </a:p>
-          <a:p>
-            <a:endParaRPr lang="da-DK" dirty="0"/>
-          </a:p>
-          <a:p>
-            <a:r>
-              <a:rPr lang="da-DK" dirty="0"/>
-              <a:t>Twitter: @rasmuskl</a:t>
-            </a:r>
-          </a:p>
-          <a:p>
-            <a:r>
-              <a:rPr lang="da-DK" dirty="0"/>
-              <a:t>Blog: rasmuskl.dk</a:t>
-            </a:r>
-          </a:p>
-          <a:p>
-            <a:endParaRPr lang="da-DK" dirty="0"/>
-          </a:p>
-          <a:p>
-            <a:endParaRPr lang="da-DK" dirty="0"/>
-          </a:p>
-        </p:txBody>
-      </p:sp>
-      <p:sp>
-        <p:nvSpPr>
-          <p:cNvPr id="4" name="Slide Number Placeholder 3"/>
-          <p:cNvSpPr>
-            <a:spLocks noGrp="1"/>
-          </p:cNvSpPr>
-          <p:nvPr>
-            <p:ph type="sldNum" sz="quarter" idx="12"/>
-          </p:nvPr>
-        </p:nvSpPr>
-        <p:spPr/>
-        <p:txBody>
-          <a:bodyPr/>
-          <a:lstStyle/>
-          <a:p>
-            <a:fld id="{0B0DDA44-FDCB-445C-9AC0-37FB199E677B}" type="slidenum">
-              <a:rPr lang="en-US" smtClean="0"/>
-              <a:pPr/>
-              <a:t>2</a:t>
-            </a:fld>
-            <a:endParaRPr lang="en-US" dirty="0"/>
-          </a:p>
-        </p:txBody>
-      </p:sp>
-      <p:sp>
-        <p:nvSpPr>
-          <p:cNvPr id="5" name="Arrow: Down 4"/>
+      <p:sp>
+        <p:nvSpPr>
+          <p:cNvPr id="6" name="Rectangle 5"/>
           <p:cNvSpPr/>
           <p:nvPr/>
         </p:nvSpPr>
         <p:spPr>
-          <a:xfrm rot="3902989">
-            <a:off x="7555342" y="1924684"/>
-            <a:ext cx="2123110" cy="3302258"/>
+          <a:xfrm>
+            <a:off x="5591944" y="1628800"/>
+            <a:ext cx="2232248" cy="936104"/>
           </a:xfrm>
-          <a:prstGeom prst="downArrow">
+          <a:prstGeom prst="rect">
             <a:avLst/>
           </a:prstGeom>
           <a:solidFill>
@@ -3583,6 +4605,174 @@
           <a:lstStyle/>
           <a:p>
             <a:pPr algn="ctr"/>
+            <a:r>
+              <a:rPr lang="da-DK" sz="2000" dirty="0">
+                <a:solidFill>
+                  <a:schemeClr val="bg1"/>
+                </a:solidFill>
+                <a:latin typeface="Arial" panose="020B0604020202020204" pitchFamily="34" charset="0"/>
+                <a:cs typeface="Arial" panose="020B0604020202020204" pitchFamily="34" charset="0"/>
+              </a:rPr>
+              <a:t>Mount</a:t>
+            </a:r>
+          </a:p>
+        </p:txBody>
+      </p:sp>
+      <p:sp>
+        <p:nvSpPr>
+          <p:cNvPr id="7" name="Rectangle 6"/>
+          <p:cNvSpPr/>
+          <p:nvPr/>
+        </p:nvSpPr>
+        <p:spPr>
+          <a:xfrm>
+            <a:off x="5591944" y="4653136"/>
+            <a:ext cx="2232248" cy="936104"/>
+          </a:xfrm>
+          <a:prstGeom prst="rect">
+            <a:avLst/>
+          </a:prstGeom>
+          <a:solidFill>
+            <a:schemeClr val="tx1"/>
+          </a:solidFill>
+          <a:ln w="9525">
+            <a:noFill/>
+            <a:prstDash val="dash"/>
+          </a:ln>
+        </p:spPr>
+        <p:style>
+          <a:lnRef idx="2">
+            <a:schemeClr val="accent1">
+              <a:shade val="50000"/>
+            </a:schemeClr>
+          </a:lnRef>
+          <a:fillRef idx="1">
+            <a:schemeClr val="accent1"/>
+          </a:fillRef>
+          <a:effectRef idx="0">
+            <a:schemeClr val="accent1"/>
+          </a:effectRef>
+          <a:fontRef idx="minor">
+            <a:schemeClr val="lt1"/>
+          </a:fontRef>
+        </p:style>
+        <p:txBody>
+          <a:bodyPr rtlCol="0" anchor="ctr"/>
+          <a:lstStyle/>
+          <a:p>
+            <a:pPr algn="ctr"/>
+            <a:r>
+              <a:rPr lang="da-DK" sz="2000" dirty="0">
+                <a:solidFill>
+                  <a:schemeClr val="bg1"/>
+                </a:solidFill>
+                <a:latin typeface="Arial" panose="020B0604020202020204" pitchFamily="34" charset="0"/>
+                <a:cs typeface="Arial" panose="020B0604020202020204" pitchFamily="34" charset="0"/>
+              </a:rPr>
+              <a:t>Unmount</a:t>
+            </a:r>
+          </a:p>
+        </p:txBody>
+      </p:sp>
+      <p:sp>
+        <p:nvSpPr>
+          <p:cNvPr id="8" name="Rectangle 7"/>
+          <p:cNvSpPr/>
+          <p:nvPr/>
+        </p:nvSpPr>
+        <p:spPr>
+          <a:xfrm>
+            <a:off x="8472264" y="3193406"/>
+            <a:ext cx="2232248" cy="936104"/>
+          </a:xfrm>
+          <a:prstGeom prst="rect">
+            <a:avLst/>
+          </a:prstGeom>
+          <a:solidFill>
+            <a:schemeClr val="tx1"/>
+          </a:solidFill>
+          <a:ln w="9525">
+            <a:noFill/>
+            <a:prstDash val="dash"/>
+          </a:ln>
+        </p:spPr>
+        <p:style>
+          <a:lnRef idx="2">
+            <a:schemeClr val="accent1">
+              <a:shade val="50000"/>
+            </a:schemeClr>
+          </a:lnRef>
+          <a:fillRef idx="1">
+            <a:schemeClr val="accent1"/>
+          </a:fillRef>
+          <a:effectRef idx="0">
+            <a:schemeClr val="accent1"/>
+          </a:effectRef>
+          <a:fontRef idx="minor">
+            <a:schemeClr val="lt1"/>
+          </a:fontRef>
+        </p:style>
+        <p:txBody>
+          <a:bodyPr rtlCol="0" anchor="ctr"/>
+          <a:lstStyle/>
+          <a:p>
+            <a:pPr algn="ctr"/>
+            <a:r>
+              <a:rPr lang="da-DK" sz="2000" dirty="0">
+                <a:solidFill>
+                  <a:schemeClr val="bg1"/>
+                </a:solidFill>
+                <a:latin typeface="Arial" panose="020B0604020202020204" pitchFamily="34" charset="0"/>
+                <a:cs typeface="Arial" panose="020B0604020202020204" pitchFamily="34" charset="0"/>
+              </a:rPr>
+              <a:t>Update</a:t>
+            </a:r>
+          </a:p>
+        </p:txBody>
+      </p:sp>
+      <p:sp>
+        <p:nvSpPr>
+          <p:cNvPr id="9" name="Arrow: Circular 8"/>
+          <p:cNvSpPr/>
+          <p:nvPr/>
+        </p:nvSpPr>
+        <p:spPr>
+          <a:xfrm>
+            <a:off x="8940316" y="2389722"/>
+            <a:ext cx="1296144" cy="1440160"/>
+          </a:xfrm>
+          <a:prstGeom prst="circularArrow">
+            <a:avLst/>
+          </a:prstGeom>
+          <a:solidFill>
+            <a:schemeClr val="tx1"/>
+          </a:solidFill>
+          <a:ln w="9525">
+            <a:noFill/>
+            <a:prstDash val="dash"/>
+          </a:ln>
+        </p:spPr>
+        <p:style>
+          <a:lnRef idx="2">
+            <a:schemeClr val="accent1">
+              <a:shade val="50000"/>
+            </a:schemeClr>
+          </a:lnRef>
+          <a:fillRef idx="1">
+            <a:schemeClr val="accent1"/>
+          </a:fillRef>
+          <a:effectRef idx="0">
+            <a:schemeClr val="accent1"/>
+          </a:effectRef>
+          <a:fontRef idx="minor">
+            <a:schemeClr val="lt1"/>
+          </a:fontRef>
+        </p:style>
+        <p:txBody>
+          <a:bodyPr rtlCol="0" anchor="ctr"/>
+          <a:lstStyle/>
+          <a:p>
+            <a:pPr algn="ctr"/>
             <a:endParaRPr lang="da-DK" sz="900" dirty="0">
               <a:solidFill>
                 <a:schemeClr val="tx1"/>
@@ -3593,10 +4783,116 @@
           </a:p>
         </p:txBody>
       </p:sp>
+      <p:sp>
+        <p:nvSpPr>
+          <p:cNvPr id="10" name="Arrow: Right 9"/>
+          <p:cNvSpPr/>
+          <p:nvPr/>
+        </p:nvSpPr>
+        <p:spPr>
+          <a:xfrm rot="1430574">
+            <a:off x="7332213" y="2775382"/>
+            <a:ext cx="1116124" cy="354026"/>
+          </a:xfrm>
+          <a:prstGeom prst="rightArrow">
+            <a:avLst/>
+          </a:prstGeom>
+          <a:solidFill>
+            <a:schemeClr val="tx1"/>
+          </a:solidFill>
+          <a:ln w="9525">
+            <a:noFill/>
+            <a:prstDash val="dash"/>
+          </a:ln>
+        </p:spPr>
+        <p:style>
+          <a:lnRef idx="2">
+            <a:schemeClr val="accent1">
+              <a:shade val="50000"/>
+            </a:schemeClr>
+          </a:lnRef>
+          <a:fillRef idx="1">
+            <a:schemeClr val="accent1"/>
+          </a:fillRef>
+          <a:effectRef idx="0">
+            <a:schemeClr val="accent1"/>
+          </a:effectRef>
+          <a:fontRef idx="minor">
+            <a:schemeClr val="lt1"/>
+          </a:fontRef>
+        </p:style>
+        <p:txBody>
+          <a:bodyPr rtlCol="0" anchor="ctr"/>
+          <a:lstStyle/>
+          <a:p>
+            <a:pPr algn="ctr"/>
+            <a:endParaRPr lang="da-DK" sz="900" dirty="0">
+              <a:solidFill>
+                <a:schemeClr val="tx1"/>
+              </a:solidFill>
+              <a:latin typeface="Arial" panose="020B0604020202020204" pitchFamily="34" charset="0"/>
+              <a:cs typeface="Arial" panose="020B0604020202020204" pitchFamily="34" charset="0"/>
+            </a:endParaRPr>
+          </a:p>
+        </p:txBody>
+      </p:sp>
+      <p:sp>
+        <p:nvSpPr>
+          <p:cNvPr id="11" name="Arrow: Right 10"/>
+          <p:cNvSpPr/>
+          <p:nvPr/>
+        </p:nvSpPr>
+        <p:spPr>
+          <a:xfrm rot="9363890">
+            <a:off x="7266129" y="4093123"/>
+            <a:ext cx="1116124" cy="354026"/>
+          </a:xfrm>
+          <a:prstGeom prst="rightArrow">
+            <a:avLst/>
+          </a:prstGeom>
+          <a:solidFill>
+            <a:schemeClr val="tx1"/>
+          </a:solidFill>
+          <a:ln w="9525">
+            <a:noFill/>
+            <a:prstDash val="dash"/>
+          </a:ln>
+        </p:spPr>
+        <p:style>
+          <a:lnRef idx="2">
+            <a:schemeClr val="accent1">
+              <a:shade val="50000"/>
+            </a:schemeClr>
+          </a:lnRef>
+          <a:fillRef idx="1">
+            <a:schemeClr val="accent1"/>
+          </a:fillRef>
+          <a:effectRef idx="0">
+            <a:schemeClr val="accent1"/>
+          </a:effectRef>
+          <a:fontRef idx="minor">
+            <a:schemeClr val="lt1"/>
+          </a:fontRef>
+        </p:style>
+        <p:txBody>
+          <a:bodyPr rtlCol="0" anchor="ctr"/>
+          <a:lstStyle/>
+          <a:p>
+            <a:pPr algn="ctr"/>
+            <a:endParaRPr lang="da-DK" sz="900" dirty="0">
+              <a:solidFill>
+                <a:schemeClr val="tx1"/>
+              </a:solidFill>
+              <a:latin typeface="Arial" panose="020B0604020202020204" pitchFamily="34" charset="0"/>
+              <a:cs typeface="Arial" panose="020B0604020202020204" pitchFamily="34" charset="0"/>
+            </a:endParaRPr>
+          </a:p>
+        </p:txBody>
+      </p:sp>
     </p:spTree>
     <p:extLst>
       <p:ext uri="{BB962C8B-B14F-4D97-AF65-F5344CB8AC3E}">
-        <p14:creationId xmlns:p14="http://schemas.microsoft.com/office/powerpoint/2010/main" val="72391307"/>
+        <p14:creationId xmlns:p14="http://schemas.microsoft.com/office/powerpoint/2010/main" val="1309177343"/>
       </p:ext>
     </p:extLst>
   </p:cSld>
@@ -3606,7 +4902,7 @@
 </p:sld>
 </file>
 
-<file path=ppt/slides/slide3.xml><?xml version="1.0" encoding="utf-8"?>
+<file path=ppt/slides/slide14.xml><?xml version="1.0" encoding="utf-8"?>
 <p:sld xmlns:a="http://schemas.openxmlformats.org/drawingml/2006/main" xmlns:r="http://schemas.openxmlformats.org/officeDocument/2006/relationships" xmlns:p="http://schemas.openxmlformats.org/presentationml/2006/main">
   <p:cSld>
     <p:spTree>
@@ -3639,8 +4935,8 @@
           <a:lstStyle/>
           <a:p>
             <a:r>
-              <a:rPr lang="en-GB" dirty="0"/>
-              <a:t>Agenda</a:t>
+              <a:rPr lang="da-DK" dirty="0"/>
+              <a:t>Webpack</a:t>
             </a:r>
           </a:p>
         </p:txBody>
@@ -3660,20 +4956,7 @@
           <a:bodyPr/>
           <a:lstStyle/>
           <a:p>
-            <a:pPr lvl="1"/>
-            <a:endParaRPr lang="en-GB" dirty="0"/>
-          </a:p>
-          <a:p>
-            <a:pPr lvl="1"/>
-            <a:endParaRPr lang="en-GB" dirty="0"/>
-          </a:p>
-          <a:p>
-            <a:pPr lvl="1"/>
-            <a:endParaRPr lang="en-GB" dirty="0"/>
-          </a:p>
-          <a:p>
-            <a:pPr lvl="1"/>
-            <a:endParaRPr lang="en-GB" dirty="0"/>
+            <a:endParaRPr lang="da-DK"/>
           </a:p>
         </p:txBody>
       </p:sp>
@@ -3695,202 +4978,16 @@
             <a:fld id="{0B0DDA44-FDCB-445C-9AC0-37FB199E677B}" type="slidenum">
               <a:rPr lang="en-US" smtClean="0"/>
               <a:pPr/>
-              <a:t>3</a:t>
+              <a:t>14</a:t>
             </a:fld>
             <a:endParaRPr lang="en-US" dirty="0"/>
           </a:p>
         </p:txBody>
       </p:sp>
-      <p:pic>
-        <p:nvPicPr>
-          <p:cNvPr id="2057" name="Picture 9" descr="C:\dev\react-webpack-typescript\_notes\images\webpack.jpg"/>
-          <p:cNvPicPr>
-            <a:picLocks noChangeAspect="1" noChangeArrowheads="1"/>
-          </p:cNvPicPr>
-          <p:nvPr/>
-        </p:nvPicPr>
-        <p:blipFill>
-          <a:blip r:embed="rId3">
-            <a:extLst>
-              <a:ext uri="{28A0092B-C50C-407E-A947-70E740481C1C}">
-                <a14:useLocalDpi xmlns:a14="http://schemas.microsoft.com/office/drawing/2010/main" val="0"/>
-              </a:ext>
-            </a:extLst>
-          </a:blip>
-          <a:srcRect/>
-          <a:stretch>
-            <a:fillRect/>
-          </a:stretch>
-        </p:blipFill>
-        <p:spPr bwMode="auto">
-          <a:xfrm>
-            <a:off x="8229071" y="3588055"/>
-            <a:ext cx="2609060" cy="1806774"/>
-          </a:xfrm>
-          <a:prstGeom prst="rect">
-            <a:avLst/>
-          </a:prstGeom>
-          <a:noFill/>
-          <a:extLst>
-            <a:ext uri="{909E8E84-426E-40DD-AFC4-6F175D3DCCD1}">
-              <a14:hiddenFill xmlns:a14="http://schemas.microsoft.com/office/drawing/2010/main">
-                <a:solidFill>
-                  <a:srgbClr val="FFFFFF"/>
-                </a:solidFill>
-              </a14:hiddenFill>
-            </a:ext>
-          </a:extLst>
-        </p:spPr>
-      </p:pic>
-      <p:pic>
-        <p:nvPicPr>
-          <p:cNvPr id="2058" name="Picture 10" descr="C:\dev\react-webpack-typescript\_notes\images\typescript.png"/>
-          <p:cNvPicPr>
-            <a:picLocks noChangeAspect="1" noChangeArrowheads="1"/>
-          </p:cNvPicPr>
-          <p:nvPr/>
-        </p:nvPicPr>
-        <p:blipFill>
-          <a:blip r:embed="rId4" cstate="print">
-            <a:extLst>
-              <a:ext uri="{28A0092B-C50C-407E-A947-70E740481C1C}">
-                <a14:useLocalDpi xmlns:a14="http://schemas.microsoft.com/office/drawing/2010/main" val="0"/>
-              </a:ext>
-            </a:extLst>
-          </a:blip>
-          <a:srcRect/>
-          <a:stretch>
-            <a:fillRect/>
-          </a:stretch>
-        </p:blipFill>
-        <p:spPr bwMode="auto">
-          <a:xfrm>
-            <a:off x="1366316" y="3212976"/>
-            <a:ext cx="2722618" cy="1425030"/>
-          </a:xfrm>
-          <a:prstGeom prst="rect">
-            <a:avLst/>
-          </a:prstGeom>
-          <a:noFill/>
-          <a:extLst>
-            <a:ext uri="{909E8E84-426E-40DD-AFC4-6F175D3DCCD1}">
-              <a14:hiddenFill xmlns:a14="http://schemas.microsoft.com/office/drawing/2010/main">
-                <a:solidFill>
-                  <a:srgbClr val="FFFFFF"/>
-                </a:solidFill>
-              </a14:hiddenFill>
-            </a:ext>
-          </a:extLst>
-        </p:spPr>
-      </p:pic>
-      <p:pic>
-        <p:nvPicPr>
-          <p:cNvPr id="2059" name="Picture 11" descr="C:\dev\react-webpack-typescript\_notes\images\visual_studio.png"/>
-          <p:cNvPicPr>
-            <a:picLocks noChangeAspect="1" noChangeArrowheads="1"/>
-          </p:cNvPicPr>
-          <p:nvPr/>
-        </p:nvPicPr>
-        <p:blipFill>
-          <a:blip r:embed="rId5" cstate="print">
-            <a:extLst>
-              <a:ext uri="{28A0092B-C50C-407E-A947-70E740481C1C}">
-                <a14:useLocalDpi xmlns:a14="http://schemas.microsoft.com/office/drawing/2010/main" val="0"/>
-              </a:ext>
-            </a:extLst>
-          </a:blip>
-          <a:srcRect/>
-          <a:stretch>
-            <a:fillRect/>
-          </a:stretch>
-        </p:blipFill>
-        <p:spPr bwMode="auto">
-          <a:xfrm>
-            <a:off x="4223792" y="4755745"/>
-            <a:ext cx="2835275" cy="1408112"/>
-          </a:xfrm>
-          <a:prstGeom prst="rect">
-            <a:avLst/>
-          </a:prstGeom>
-          <a:noFill/>
-          <a:extLst>
-            <a:ext uri="{909E8E84-426E-40DD-AFC4-6F175D3DCCD1}">
-              <a14:hiddenFill xmlns:a14="http://schemas.microsoft.com/office/drawing/2010/main">
-                <a:solidFill>
-                  <a:srgbClr val="FFFFFF"/>
-                </a:solidFill>
-              </a14:hiddenFill>
-            </a:ext>
-          </a:extLst>
-        </p:spPr>
-      </p:pic>
-      <p:pic>
-        <p:nvPicPr>
-          <p:cNvPr id="5" name="Picture 4"/>
-          <p:cNvPicPr>
-            <a:picLocks noChangeAspect="1"/>
-          </p:cNvPicPr>
-          <p:nvPr/>
-        </p:nvPicPr>
-        <p:blipFill>
-          <a:blip r:embed="rId6">
-            <a:extLst>
-              <a:ext uri="{28A0092B-C50C-407E-A947-70E740481C1C}">
-                <a14:useLocalDpi xmlns:a14="http://schemas.microsoft.com/office/drawing/2010/main" val="0"/>
-              </a:ext>
-            </a:extLst>
-          </a:blip>
-          <a:stretch>
-            <a:fillRect/>
-          </a:stretch>
-        </p:blipFill>
-        <p:spPr>
-          <a:xfrm>
-            <a:off x="2279576" y="1465296"/>
-            <a:ext cx="2906269" cy="835552"/>
-          </a:xfrm>
-          <a:prstGeom prst="rect">
-            <a:avLst/>
-          </a:prstGeom>
-        </p:spPr>
-      </p:pic>
-      <p:pic>
-        <p:nvPicPr>
-          <p:cNvPr id="11" name="Picture 10"/>
-          <p:cNvPicPr>
-            <a:picLocks noChangeAspect="1"/>
-          </p:cNvPicPr>
-          <p:nvPr/>
-        </p:nvPicPr>
-        <p:blipFill>
-          <a:blip r:embed="rId7">
-            <a:extLst>
-              <a:ext uri="{28A0092B-C50C-407E-A947-70E740481C1C}">
-                <a14:useLocalDpi xmlns:a14="http://schemas.microsoft.com/office/drawing/2010/main" val="0"/>
-              </a:ext>
-            </a:extLst>
-          </a:blip>
-          <a:stretch>
-            <a:fillRect/>
-          </a:stretch>
-        </p:blipFill>
-        <p:spPr>
-          <a:xfrm>
-            <a:off x="6561400" y="1300679"/>
-            <a:ext cx="1685994" cy="1986681"/>
-          </a:xfrm>
-          <a:prstGeom prst="rect">
-            <a:avLst/>
-          </a:prstGeom>
-        </p:spPr>
-      </p:pic>
     </p:spTree>
-    <p:custDataLst>
-      <p:tags r:id="rId1"/>
-    </p:custDataLst>
     <p:extLst>
       <p:ext uri="{BB962C8B-B14F-4D97-AF65-F5344CB8AC3E}">
-        <p14:creationId xmlns:p14="http://schemas.microsoft.com/office/powerpoint/2010/main" val="4085506166"/>
+        <p14:creationId xmlns:p14="http://schemas.microsoft.com/office/powerpoint/2010/main" val="784608745"/>
       </p:ext>
     </p:extLst>
   </p:cSld>
@@ -3900,7 +4997,7 @@
 </p:sld>
 </file>
 
-<file path=ppt/slides/slide4.xml><?xml version="1.0" encoding="utf-8"?>
+<file path=ppt/slides/slide15.xml><?xml version="1.0" encoding="utf-8"?>
 <p:sld xmlns:a="http://schemas.openxmlformats.org/drawingml/2006/main" xmlns:r="http://schemas.openxmlformats.org/officeDocument/2006/relationships" xmlns:p="http://schemas.openxmlformats.org/presentationml/2006/main">
   <p:cSld>
     <p:spTree>
@@ -3917,197 +5014,68 @@
           <a:chExt cx="0" cy="0"/>
         </a:xfrm>
       </p:grpSpPr>
-      <p:pic>
-        <p:nvPicPr>
-          <p:cNvPr id="5" name="Picture 4"/>
-          <p:cNvPicPr>
-            <a:picLocks noChangeAspect="1"/>
-          </p:cNvPicPr>
+      <p:sp>
+        <p:nvSpPr>
+          <p:cNvPr id="4" name="Slide Number Placeholder 3"/>
+          <p:cNvSpPr>
+            <a:spLocks noGrp="1"/>
+          </p:cNvSpPr>
+          <p:nvPr>
+            <p:ph type="sldNum" sz="quarter" idx="12"/>
+          </p:nvPr>
+        </p:nvSpPr>
+        <p:spPr/>
+        <p:txBody>
+          <a:bodyPr/>
+          <a:lstStyle/>
+          <a:p>
+            <a:fld id="{0B0DDA44-FDCB-445C-9AC0-37FB199E677B}" type="slidenum">
+              <a:rPr lang="en-US" smtClean="0"/>
+              <a:pPr/>
+              <a:t>15</a:t>
+            </a:fld>
+            <a:endParaRPr lang="en-US" dirty="0"/>
+          </a:p>
+        </p:txBody>
+      </p:sp>
+      <p:sp>
+        <p:nvSpPr>
+          <p:cNvPr id="5" name="TextBox 4"/>
+          <p:cNvSpPr txBox="1"/>
           <p:nvPr/>
-        </p:nvPicPr>
-        <p:blipFill>
-          <a:blip r:embed="rId2"/>
-          <a:stretch>
-            <a:fillRect/>
-          </a:stretch>
-        </p:blipFill>
+        </p:nvSpPr>
         <p:spPr>
           <a:xfrm>
-            <a:off x="7104112" y="692696"/>
-            <a:ext cx="7249537" cy="6735115"/>
+            <a:off x="4887074" y="3059668"/>
+            <a:ext cx="2417853" cy="738664"/>
           </a:xfrm>
           <a:prstGeom prst="rect">
             <a:avLst/>
           </a:prstGeom>
-          <a:solidFill>
-            <a:srgbClr val="FFFFFF">
-              <a:shade val="85000"/>
-            </a:srgbClr>
-          </a:solidFill>
-          <a:ln w="88900" cap="sq">
-            <a:solidFill>
-              <a:srgbClr val="FFFFFF"/>
-            </a:solidFill>
-            <a:miter lim="800000"/>
-          </a:ln>
-          <a:effectLst>
-            <a:outerShdw blurRad="55000" dist="18000" dir="5400000" algn="tl" rotWithShape="0">
-              <a:srgbClr val="000000">
-                <a:alpha val="40000"/>
-              </a:srgbClr>
-            </a:outerShdw>
-          </a:effectLst>
-          <a:scene3d>
-            <a:camera prst="orthographicFront"/>
-            <a:lightRig rig="twoPt" dir="t">
-              <a:rot lat="0" lon="0" rev="7200000"/>
-            </a:lightRig>
-          </a:scene3d>
-          <a:sp3d>
-            <a:bevelT w="25400" h="19050"/>
-            <a:contourClr>
-              <a:srgbClr val="FFFFFF"/>
-            </a:contourClr>
-          </a:sp3d>
+          <a:noFill/>
         </p:spPr>
-      </p:pic>
-      <p:sp>
-        <p:nvSpPr>
-          <p:cNvPr id="2" name="Title 1"/>
-          <p:cNvSpPr>
-            <a:spLocks noGrp="1"/>
-          </p:cNvSpPr>
-          <p:nvPr>
-            <p:ph type="title"/>
-          </p:nvPr>
-        </p:nvSpPr>
-        <p:spPr/>
-        <p:txBody>
-          <a:bodyPr/>
-          <a:lstStyle/>
-          <a:p>
-            <a:r>
-              <a:rPr lang="da-DK" dirty="0"/>
-              <a:t>Why this talk?</a:t>
-            </a:r>
-          </a:p>
-        </p:txBody>
-      </p:sp>
-      <p:sp>
-        <p:nvSpPr>
-          <p:cNvPr id="3" name="Content Placeholder 2"/>
-          <p:cNvSpPr>
-            <a:spLocks noGrp="1"/>
-          </p:cNvSpPr>
-          <p:nvPr>
-            <p:ph idx="1"/>
-          </p:nvPr>
-        </p:nvSpPr>
-        <p:spPr/>
-        <p:txBody>
-          <a:bodyPr>
-            <a:normAutofit/>
+        <p:txBody>
+          <a:bodyPr wrap="square" lIns="0" tIns="0" rIns="0" bIns="0" rtlCol="0">
+            <a:spAutoFit/>
           </a:bodyPr>
           <a:lstStyle/>
           <a:p>
-            <a:endParaRPr lang="da-DK" dirty="0"/>
-          </a:p>
-          <a:p>
-            <a:endParaRPr lang="da-DK" dirty="0"/>
-          </a:p>
-          <a:p>
-            <a:r>
-              <a:rPr lang="da-DK" dirty="0"/>
-              <a:t>JavaScript ecosystem changes rapidly</a:t>
-            </a:r>
-          </a:p>
-          <a:p>
-            <a:endParaRPr lang="da-DK" dirty="0"/>
-          </a:p>
-          <a:p>
-            <a:r>
-              <a:rPr lang="da-DK" dirty="0"/>
-              <a:t>Lots of ”starter projects” online</a:t>
-            </a:r>
-          </a:p>
-          <a:p>
-            <a:pPr lvl="1"/>
-            <a:r>
-              <a:rPr lang="da-DK" dirty="0"/>
-              <a:t>Usually 20+ npm packages</a:t>
-            </a:r>
-          </a:p>
-          <a:p>
-            <a:pPr lvl="1"/>
-            <a:r>
-              <a:rPr lang="da-DK" dirty="0"/>
-              <a:t>Usually 100+ lines of configuration</a:t>
-            </a:r>
-          </a:p>
-          <a:p>
-            <a:pPr lvl="1"/>
-            <a:r>
-              <a:rPr lang="da-DK" dirty="0"/>
-              <a:t>Usually out of date</a:t>
-            </a:r>
-          </a:p>
-          <a:p>
-            <a:endParaRPr lang="da-DK" dirty="0"/>
-          </a:p>
-          <a:p>
-            <a:r>
-              <a:rPr lang="da-DK" dirty="0"/>
-              <a:t>Show how everything works from the ground up</a:t>
-            </a:r>
-          </a:p>
-          <a:p>
-            <a:endParaRPr lang="da-DK" dirty="0"/>
-          </a:p>
-          <a:p>
-            <a:r>
-              <a:rPr lang="da-DK" dirty="0"/>
-              <a:t>What we wish we had known when we started</a:t>
-            </a:r>
-          </a:p>
-          <a:p>
-            <a:endParaRPr lang="da-DK" dirty="0"/>
-          </a:p>
-          <a:p>
-            <a:endParaRPr lang="da-DK" dirty="0"/>
-          </a:p>
-          <a:p>
-            <a:endParaRPr lang="da-DK" dirty="0"/>
-          </a:p>
-        </p:txBody>
-      </p:sp>
-      <p:sp>
-        <p:nvSpPr>
-          <p:cNvPr id="4" name="Slide Number Placeholder 3"/>
-          <p:cNvSpPr>
-            <a:spLocks noGrp="1"/>
-          </p:cNvSpPr>
-          <p:nvPr>
-            <p:ph type="sldNum" sz="quarter" idx="12"/>
-          </p:nvPr>
-        </p:nvSpPr>
-        <p:spPr/>
-        <p:txBody>
-          <a:bodyPr/>
-          <a:lstStyle/>
-          <a:p>
-            <a:fld id="{0B0DDA44-FDCB-445C-9AC0-37FB199E677B}" type="slidenum">
-              <a:rPr lang="en-US" smtClean="0"/>
-              <a:pPr/>
-              <a:t>4</a:t>
-            </a:fld>
-            <a:endParaRPr lang="en-US" dirty="0"/>
+            <a:pPr algn="ctr"/>
+            <a:r>
+              <a:rPr lang="da-DK" sz="4800" dirty="0">
+                <a:latin typeface="Arial" panose="020B0604020202020204" pitchFamily="34" charset="0"/>
+                <a:ea typeface="Open Sans" panose="020B0606030504020204" pitchFamily="34" charset="0"/>
+                <a:cs typeface="Arial" panose="020B0604020202020204" pitchFamily="34" charset="0"/>
+              </a:rPr>
+              <a:t>Demo</a:t>
+            </a:r>
           </a:p>
         </p:txBody>
       </p:sp>
     </p:spTree>
     <p:extLst>
       <p:ext uri="{BB962C8B-B14F-4D97-AF65-F5344CB8AC3E}">
-        <p14:creationId xmlns:p14="http://schemas.microsoft.com/office/powerpoint/2010/main" val="1861659024"/>
+        <p14:creationId xmlns:p14="http://schemas.microsoft.com/office/powerpoint/2010/main" val="54450135"/>
       </p:ext>
     </p:extLst>
   </p:cSld>
@@ -4117,7 +5085,7 @@
 </p:sld>
 </file>
 
-<file path=ppt/slides/slide5.xml><?xml version="1.0" encoding="utf-8"?>
+<file path=ppt/slides/slide16.xml><?xml version="1.0" encoding="utf-8"?>
 <p:sld xmlns:a="http://schemas.openxmlformats.org/drawingml/2006/main" xmlns:r="http://schemas.openxmlformats.org/officeDocument/2006/relationships" xmlns:p="http://schemas.openxmlformats.org/presentationml/2006/main">
   <p:cSld>
     <p:spTree>
@@ -4151,7 +5119,7 @@
           <a:p>
             <a:r>
               <a:rPr lang="da-DK" dirty="0"/>
-              <a:t>Templafy</a:t>
+              <a:t>Advice</a:t>
             </a:r>
           </a:p>
         </p:txBody>
@@ -4174,65 +5142,33 @@
             <a:endParaRPr lang="da-DK" dirty="0"/>
           </a:p>
           <a:p>
+            <a:r>
+              <a:rPr lang="da-DK" dirty="0"/>
+              <a:t>Keep number of dependencies down</a:t>
+            </a:r>
+          </a:p>
+          <a:p>
             <a:endParaRPr lang="da-DK" dirty="0"/>
           </a:p>
           <a:p>
+            <a:r>
+              <a:rPr lang="da-DK" dirty="0"/>
+              <a:t>React</a:t>
+            </a:r>
+          </a:p>
+          <a:p>
+            <a:pPr lvl="1"/>
+            <a:r>
+              <a:rPr lang="da-DK" dirty="0"/>
+              <a:t>create-react-app from Facebook</a:t>
+            </a:r>
+          </a:p>
+          <a:p>
+            <a:pPr lvl="1"/>
             <a:endParaRPr lang="da-DK" dirty="0"/>
           </a:p>
           <a:p>
-            <a:endParaRPr lang="da-DK" dirty="0"/>
-          </a:p>
-          <a:p>
-            <a:endParaRPr lang="da-DK" dirty="0"/>
-          </a:p>
-          <a:p>
-            <a:endParaRPr lang="da-DK" dirty="0"/>
-          </a:p>
-          <a:p>
-            <a:endParaRPr lang="da-DK" dirty="0"/>
-          </a:p>
-          <a:p>
-            <a:r>
-              <a:rPr lang="da-DK" dirty="0"/>
-              <a:t>Distributed development team</a:t>
-            </a:r>
-          </a:p>
-          <a:p>
-            <a:pPr lvl="2"/>
-            <a:r>
-              <a:rPr lang="da-DK" dirty="0"/>
-              <a:t>Copenhagen: 4 developers</a:t>
-            </a:r>
-          </a:p>
-          <a:p>
-            <a:pPr lvl="2"/>
-            <a:r>
-              <a:rPr lang="da-DK" dirty="0"/>
-              <a:t>Århus: 1 developer</a:t>
-            </a:r>
-          </a:p>
-          <a:p>
-            <a:pPr lvl="2"/>
-            <a:r>
-              <a:rPr lang="da-DK" dirty="0"/>
-              <a:t>Romania: 2 developers, 1 tester</a:t>
-            </a:r>
-          </a:p>
-          <a:p>
-            <a:pPr lvl="2"/>
-            <a:r>
-              <a:rPr lang="da-DK" dirty="0"/>
-              <a:t>Poland: 1 designer</a:t>
-            </a:r>
-          </a:p>
-          <a:p>
-            <a:pPr lvl="2"/>
-            <a:endParaRPr lang="da-DK" dirty="0"/>
-          </a:p>
-          <a:p>
-            <a:endParaRPr lang="da-DK" dirty="0"/>
-          </a:p>
-          <a:p>
+            <a:pPr lvl="1"/>
             <a:endParaRPr lang="da-DK" dirty="0"/>
           </a:p>
         </p:txBody>
@@ -4255,7 +5191,7 @@
             <a:fld id="{0B0DDA44-FDCB-445C-9AC0-37FB199E677B}" type="slidenum">
               <a:rPr lang="en-US" smtClean="0"/>
               <a:pPr/>
-              <a:t>5</a:t>
+              <a:t>16</a:t>
             </a:fld>
             <a:endParaRPr lang="en-US" dirty="0"/>
           </a:p>
@@ -4264,7 +5200,7 @@
     </p:spTree>
     <p:extLst>
       <p:ext uri="{BB962C8B-B14F-4D97-AF65-F5344CB8AC3E}">
-        <p14:creationId xmlns:p14="http://schemas.microsoft.com/office/powerpoint/2010/main" val="3510273371"/>
+        <p14:creationId xmlns:p14="http://schemas.microsoft.com/office/powerpoint/2010/main" val="1592274045"/>
       </p:ext>
     </p:extLst>
   </p:cSld>
@@ -4274,210 +5210,7 @@
 </p:sld>
 </file>
 
-<file path=ppt/slides/slide6.xml><?xml version="1.0" encoding="utf-8"?>
-<p:sld xmlns:a="http://schemas.openxmlformats.org/drawingml/2006/main" xmlns:r="http://schemas.openxmlformats.org/officeDocument/2006/relationships" xmlns:p="http://schemas.openxmlformats.org/presentationml/2006/main">
-  <p:cSld>
-    <p:spTree>
-      <p:nvGrpSpPr>
-        <p:cNvPr id="1" name=""/>
-        <p:cNvGrpSpPr/>
-        <p:nvPr/>
-      </p:nvGrpSpPr>
-      <p:grpSpPr>
-        <a:xfrm>
-          <a:off x="0" y="0"/>
-          <a:ext cx="0" cy="0"/>
-          <a:chOff x="0" y="0"/>
-          <a:chExt cx="0" cy="0"/>
-        </a:xfrm>
-      </p:grpSpPr>
-      <p:sp>
-        <p:nvSpPr>
-          <p:cNvPr id="2" name="Title 1"/>
-          <p:cNvSpPr>
-            <a:spLocks noGrp="1"/>
-          </p:cNvSpPr>
-          <p:nvPr>
-            <p:ph type="title"/>
-          </p:nvPr>
-        </p:nvSpPr>
-        <p:spPr/>
-        <p:txBody>
-          <a:bodyPr/>
-          <a:lstStyle/>
-          <a:p>
-            <a:r>
-              <a:rPr lang="da-DK" dirty="0"/>
-              <a:t>Our Rewrite</a:t>
-            </a:r>
-          </a:p>
-        </p:txBody>
-      </p:sp>
-      <p:sp>
-        <p:nvSpPr>
-          <p:cNvPr id="3" name="Content Placeholder 2"/>
-          <p:cNvSpPr>
-            <a:spLocks noGrp="1"/>
-          </p:cNvSpPr>
-          <p:nvPr>
-            <p:ph idx="1"/>
-          </p:nvPr>
-        </p:nvSpPr>
-        <p:spPr/>
-        <p:txBody>
-          <a:bodyPr/>
-          <a:lstStyle/>
-          <a:p>
-            <a:endParaRPr lang="da-DK" dirty="0"/>
-          </a:p>
-          <a:p>
-            <a:endParaRPr lang="da-DK" dirty="0"/>
-          </a:p>
-          <a:p>
-            <a:r>
-              <a:rPr lang="da-DK" dirty="0"/>
-              <a:t>Migration from Knockout to React</a:t>
-            </a:r>
-          </a:p>
-          <a:p>
-            <a:endParaRPr lang="da-DK" dirty="0"/>
-          </a:p>
-          <a:p>
-            <a:r>
-              <a:rPr lang="da-DK" dirty="0"/>
-              <a:t>Started in June 2016</a:t>
-            </a:r>
-          </a:p>
-          <a:p>
-            <a:endParaRPr lang="da-DK" dirty="0"/>
-          </a:p>
-          <a:p>
-            <a:r>
-              <a:rPr lang="da-DK" dirty="0"/>
-              <a:t>Performance</a:t>
-            </a:r>
-          </a:p>
-          <a:p>
-            <a:r>
-              <a:rPr lang="da-DK" dirty="0"/>
-              <a:t>Focus on core features</a:t>
-            </a:r>
-          </a:p>
-          <a:p>
-            <a:r>
-              <a:rPr lang="da-DK" dirty="0"/>
-              <a:t>Developer productivity</a:t>
-            </a:r>
-          </a:p>
-          <a:p>
-            <a:r>
-              <a:rPr lang="da-DK" dirty="0"/>
-              <a:t>Attracting new talent</a:t>
-            </a:r>
-          </a:p>
-          <a:p>
-            <a:endParaRPr lang="da-DK" dirty="0"/>
-          </a:p>
-        </p:txBody>
-      </p:sp>
-      <p:sp>
-        <p:nvSpPr>
-          <p:cNvPr id="4" name="Slide Number Placeholder 3"/>
-          <p:cNvSpPr>
-            <a:spLocks noGrp="1"/>
-          </p:cNvSpPr>
-          <p:nvPr>
-            <p:ph type="sldNum" sz="quarter" idx="12"/>
-          </p:nvPr>
-        </p:nvSpPr>
-        <p:spPr/>
-        <p:txBody>
-          <a:bodyPr/>
-          <a:lstStyle/>
-          <a:p>
-            <a:fld id="{0B0DDA44-FDCB-445C-9AC0-37FB199E677B}" type="slidenum">
-              <a:rPr lang="en-US" smtClean="0"/>
-              <a:pPr/>
-              <a:t>6</a:t>
-            </a:fld>
-            <a:endParaRPr lang="en-US" dirty="0"/>
-          </a:p>
-        </p:txBody>
-      </p:sp>
-      <p:pic>
-        <p:nvPicPr>
-          <p:cNvPr id="5" name="Picture 4"/>
-          <p:cNvPicPr>
-            <a:picLocks noChangeAspect="1"/>
-          </p:cNvPicPr>
-          <p:nvPr/>
-        </p:nvPicPr>
-        <p:blipFill>
-          <a:blip r:embed="rId2" cstate="print">
-            <a:extLst>
-              <a:ext uri="{28A0092B-C50C-407E-A947-70E740481C1C}">
-                <a14:useLocalDpi xmlns:a14="http://schemas.microsoft.com/office/drawing/2010/main" val="0"/>
-              </a:ext>
-            </a:extLst>
-          </a:blip>
-          <a:stretch>
-            <a:fillRect/>
-          </a:stretch>
-        </p:blipFill>
-        <p:spPr>
-          <a:xfrm>
-            <a:off x="5951984" y="1107756"/>
-            <a:ext cx="5519936" cy="1330105"/>
-          </a:xfrm>
-          <a:prstGeom prst="rect">
-            <a:avLst/>
-          </a:prstGeom>
-        </p:spPr>
-      </p:pic>
-      <p:pic>
-        <p:nvPicPr>
-          <p:cNvPr id="7" name="Picture 6"/>
-          <p:cNvPicPr>
-            <a:picLocks noChangeAspect="1"/>
-          </p:cNvPicPr>
-          <p:nvPr/>
-        </p:nvPicPr>
-        <p:blipFill>
-          <a:blip r:embed="rId3">
-            <a:extLst>
-              <a:ext uri="{28A0092B-C50C-407E-A947-70E740481C1C}">
-                <a14:useLocalDpi xmlns:a14="http://schemas.microsoft.com/office/drawing/2010/main" val="0"/>
-              </a:ext>
-            </a:extLst>
-          </a:blip>
-          <a:stretch>
-            <a:fillRect/>
-          </a:stretch>
-        </p:blipFill>
-        <p:spPr>
-          <a:xfrm>
-            <a:off x="7689142" y="3501008"/>
-            <a:ext cx="2045619" cy="2410443"/>
-          </a:xfrm>
-          <a:prstGeom prst="rect">
-            <a:avLst/>
-          </a:prstGeom>
-        </p:spPr>
-      </p:pic>
-    </p:spTree>
-    <p:extLst>
-      <p:ext uri="{BB962C8B-B14F-4D97-AF65-F5344CB8AC3E}">
-        <p14:creationId xmlns:p14="http://schemas.microsoft.com/office/powerpoint/2010/main" val="397152675"/>
-      </p:ext>
-    </p:extLst>
-  </p:cSld>
-  <p:clrMapOvr>
-    <a:masterClrMapping/>
-  </p:clrMapOvr>
-</p:sld>
-</file>
-
-<file path=ppt/slides/slide7.xml><?xml version="1.0" encoding="utf-8"?>
+<file path=ppt/slides/slide17.xml><?xml version="1.0" encoding="utf-8"?>
 <p:sld xmlns:a="http://schemas.openxmlformats.org/drawingml/2006/main" xmlns:r="http://schemas.openxmlformats.org/officeDocument/2006/relationships" xmlns:p="http://schemas.openxmlformats.org/presentationml/2006/main" show="0">
   <p:cSld>
     <p:spTree>
@@ -4972,7 +5705,7 @@
             <a:fld id="{0B0DDA44-FDCB-445C-9AC0-37FB199E677B}" type="slidenum">
               <a:rPr lang="en-US" smtClean="0"/>
               <a:pPr/>
-              <a:t>7</a:t>
+              <a:t>17</a:t>
             </a:fld>
             <a:endParaRPr lang="en-US" dirty="0"/>
           </a:p>
@@ -4991,7 +5724,7 @@
 </p:sld>
 </file>
 
-<file path=ppt/slides/slide8.xml><?xml version="1.0" encoding="utf-8"?>
+<file path=ppt/slides/slide2.xml><?xml version="1.0" encoding="utf-8"?>
 <p:sld xmlns:a="http://schemas.openxmlformats.org/drawingml/2006/main" xmlns:r="http://schemas.openxmlformats.org/officeDocument/2006/relationships" xmlns:p="http://schemas.openxmlformats.org/presentationml/2006/main">
   <p:cSld>
     <p:spTree>
@@ -5025,7 +5758,7 @@
           <a:p>
             <a:r>
               <a:rPr lang="da-DK" dirty="0"/>
-              <a:t>React</a:t>
+              <a:t>Me</a:t>
             </a:r>
           </a:p>
         </p:txBody>
@@ -5045,71 +5778,55 @@
           <a:bodyPr/>
           <a:lstStyle/>
           <a:p>
-            <a:endParaRPr lang="en-US" dirty="0"/>
-          </a:p>
-          <a:p>
-            <a:endParaRPr lang="en-US" dirty="0"/>
-          </a:p>
-          <a:p>
-            <a:endParaRPr lang="en-US" dirty="0"/>
-          </a:p>
-          <a:p>
-            <a:r>
-              <a:rPr lang="en-US" dirty="0"/>
-              <a:t>Released by Facebook in 2013</a:t>
-            </a:r>
-          </a:p>
-          <a:p>
-            <a:pPr lvl="1"/>
-            <a:r>
-              <a:rPr lang="en-US" dirty="0"/>
-              <a:t>“</a:t>
-            </a:r>
-            <a:r>
-              <a:rPr lang="en-US" dirty="0"/>
-              <a:t>A JavaScript library for building user interfaces”</a:t>
-            </a:r>
-          </a:p>
-          <a:p>
-            <a:endParaRPr lang="en-US" dirty="0"/>
-          </a:p>
-          <a:p>
-            <a:r>
-              <a:rPr lang="en-US" dirty="0"/>
-              <a:t>Library vs Framework</a:t>
-            </a:r>
-          </a:p>
-          <a:p>
-            <a:pPr lvl="1"/>
-            <a:r>
-              <a:rPr lang="en-US" dirty="0"/>
-              <a:t>V in MVC</a:t>
-            </a:r>
-          </a:p>
-          <a:p>
-            <a:pPr lvl="1"/>
-            <a:endParaRPr lang="en-US" dirty="0"/>
-          </a:p>
-          <a:p>
-            <a:r>
-              <a:rPr lang="en-US" dirty="0"/>
-              <a:t>Declarative components for UI</a:t>
-            </a:r>
-          </a:p>
-          <a:p>
-            <a:endParaRPr lang="en-US" dirty="0"/>
-          </a:p>
-          <a:p>
-            <a:endParaRPr lang="en-US" dirty="0"/>
-          </a:p>
-          <a:p>
-            <a:endParaRPr lang="en-US" dirty="0"/>
-          </a:p>
-          <a:p>
-            <a:endParaRPr lang="en-US" dirty="0"/>
-          </a:p>
-          <a:p>
-            <a:endParaRPr lang="en-US" dirty="0"/>
+            <a:r>
+              <a:rPr lang="da-DK" dirty="0"/>
+              <a:t>Developer at Templafy</a:t>
+            </a:r>
+          </a:p>
+          <a:p>
+            <a:endParaRPr lang="da-DK" dirty="0"/>
+          </a:p>
+          <a:p>
+            <a:endParaRPr lang="da-DK" dirty="0"/>
+          </a:p>
+          <a:p>
+            <a:endParaRPr lang="da-DK" dirty="0"/>
+          </a:p>
+          <a:p>
+            <a:endParaRPr lang="da-DK" dirty="0"/>
+          </a:p>
+          <a:p>
+            <a:endParaRPr lang="da-DK" dirty="0"/>
+          </a:p>
+          <a:p>
+            <a:endParaRPr lang="da-DK" dirty="0"/>
+          </a:p>
+          <a:p>
+            <a:endParaRPr lang="da-DK" dirty="0"/>
+          </a:p>
+          <a:p>
+            <a:endParaRPr lang="da-DK" dirty="0"/>
+          </a:p>
+          <a:p>
+            <a:endParaRPr lang="da-DK" dirty="0"/>
+          </a:p>
+          <a:p>
+            <a:r>
+              <a:rPr lang="da-DK" dirty="0"/>
+              <a:t>Twitter: @rasmuskl</a:t>
+            </a:r>
+          </a:p>
+          <a:p>
+            <a:r>
+              <a:rPr lang="da-DK" dirty="0"/>
+              <a:t>Blog: rasmuskl.dk</a:t>
+            </a:r>
+          </a:p>
+          <a:p>
+            <a:endParaRPr lang="da-DK" dirty="0"/>
+          </a:p>
+          <a:p>
+            <a:endParaRPr lang="da-DK" dirty="0"/>
           </a:p>
         </p:txBody>
       </p:sp>
@@ -5131,7 +5848,1090 @@
             <a:fld id="{0B0DDA44-FDCB-445C-9AC0-37FB199E677B}" type="slidenum">
               <a:rPr lang="en-US" smtClean="0"/>
               <a:pPr/>
-              <a:t>8</a:t>
+              <a:t>2</a:t>
+            </a:fld>
+            <a:endParaRPr lang="en-US" dirty="0"/>
+          </a:p>
+        </p:txBody>
+      </p:sp>
+      <p:sp>
+        <p:nvSpPr>
+          <p:cNvPr id="5" name="Arrow: Down 4"/>
+          <p:cNvSpPr/>
+          <p:nvPr/>
+        </p:nvSpPr>
+        <p:spPr>
+          <a:xfrm rot="3902989">
+            <a:off x="7555342" y="1924684"/>
+            <a:ext cx="2123110" cy="3302258"/>
+          </a:xfrm>
+          <a:prstGeom prst="downArrow">
+            <a:avLst/>
+          </a:prstGeom>
+          <a:solidFill>
+            <a:schemeClr val="tx1"/>
+          </a:solidFill>
+          <a:ln w="9525">
+            <a:noFill/>
+            <a:prstDash val="dash"/>
+          </a:ln>
+        </p:spPr>
+        <p:style>
+          <a:lnRef idx="2">
+            <a:schemeClr val="accent1">
+              <a:shade val="50000"/>
+            </a:schemeClr>
+          </a:lnRef>
+          <a:fillRef idx="1">
+            <a:schemeClr val="accent1"/>
+          </a:fillRef>
+          <a:effectRef idx="0">
+            <a:schemeClr val="accent1"/>
+          </a:effectRef>
+          <a:fontRef idx="minor">
+            <a:schemeClr val="lt1"/>
+          </a:fontRef>
+        </p:style>
+        <p:txBody>
+          <a:bodyPr rtlCol="0" anchor="ctr"/>
+          <a:lstStyle/>
+          <a:p>
+            <a:pPr algn="ctr"/>
+            <a:endParaRPr lang="da-DK" sz="900" dirty="0">
+              <a:solidFill>
+                <a:schemeClr val="tx1"/>
+              </a:solidFill>
+              <a:latin typeface="Arial" panose="020B0604020202020204" pitchFamily="34" charset="0"/>
+              <a:cs typeface="Arial" panose="020B0604020202020204" pitchFamily="34" charset="0"/>
+            </a:endParaRPr>
+          </a:p>
+        </p:txBody>
+      </p:sp>
+    </p:spTree>
+    <p:extLst>
+      <p:ext uri="{BB962C8B-B14F-4D97-AF65-F5344CB8AC3E}">
+        <p14:creationId xmlns:p14="http://schemas.microsoft.com/office/powerpoint/2010/main" val="72391307"/>
+      </p:ext>
+    </p:extLst>
+  </p:cSld>
+  <p:clrMapOvr>
+    <a:masterClrMapping/>
+  </p:clrMapOvr>
+</p:sld>
+</file>
+
+<file path=ppt/slides/slide3.xml><?xml version="1.0" encoding="utf-8"?>
+<p:sld xmlns:a="http://schemas.openxmlformats.org/drawingml/2006/main" xmlns:r="http://schemas.openxmlformats.org/officeDocument/2006/relationships" xmlns:p="http://schemas.openxmlformats.org/presentationml/2006/main">
+  <p:cSld>
+    <p:spTree>
+      <p:nvGrpSpPr>
+        <p:cNvPr id="1" name=""/>
+        <p:cNvGrpSpPr/>
+        <p:nvPr/>
+      </p:nvGrpSpPr>
+      <p:grpSpPr>
+        <a:xfrm>
+          <a:off x="0" y="0"/>
+          <a:ext cx="0" cy="0"/>
+          <a:chOff x="0" y="0"/>
+          <a:chExt cx="0" cy="0"/>
+        </a:xfrm>
+      </p:grpSpPr>
+      <p:sp>
+        <p:nvSpPr>
+          <p:cNvPr id="2" name="Title 1"/>
+          <p:cNvSpPr>
+            <a:spLocks noGrp="1"/>
+          </p:cNvSpPr>
+          <p:nvPr>
+            <p:ph type="title"/>
+          </p:nvPr>
+        </p:nvSpPr>
+        <p:spPr/>
+        <p:txBody>
+          <a:bodyPr/>
+          <a:lstStyle/>
+          <a:p>
+            <a:r>
+              <a:rPr lang="en-GB" dirty="0"/>
+              <a:t>Agenda</a:t>
+            </a:r>
+          </a:p>
+        </p:txBody>
+      </p:sp>
+      <p:sp>
+        <p:nvSpPr>
+          <p:cNvPr id="3" name="Content Placeholder 2"/>
+          <p:cNvSpPr>
+            <a:spLocks noGrp="1"/>
+          </p:cNvSpPr>
+          <p:nvPr>
+            <p:ph idx="1"/>
+          </p:nvPr>
+        </p:nvSpPr>
+        <p:spPr/>
+        <p:txBody>
+          <a:bodyPr/>
+          <a:lstStyle/>
+          <a:p>
+            <a:pPr lvl="1"/>
+            <a:endParaRPr lang="en-GB" dirty="0"/>
+          </a:p>
+          <a:p>
+            <a:pPr lvl="1"/>
+            <a:endParaRPr lang="en-GB" dirty="0"/>
+          </a:p>
+          <a:p>
+            <a:pPr lvl="1"/>
+            <a:endParaRPr lang="en-GB" dirty="0"/>
+          </a:p>
+          <a:p>
+            <a:pPr lvl="1"/>
+            <a:endParaRPr lang="en-GB" dirty="0"/>
+          </a:p>
+        </p:txBody>
+      </p:sp>
+      <p:sp>
+        <p:nvSpPr>
+          <p:cNvPr id="4" name="Slide Number Placeholder 3"/>
+          <p:cNvSpPr>
+            <a:spLocks noGrp="1"/>
+          </p:cNvSpPr>
+          <p:nvPr>
+            <p:ph type="sldNum" sz="quarter" idx="12"/>
+          </p:nvPr>
+        </p:nvSpPr>
+        <p:spPr/>
+        <p:txBody>
+          <a:bodyPr/>
+          <a:lstStyle/>
+          <a:p>
+            <a:fld id="{0B0DDA44-FDCB-445C-9AC0-37FB199E677B}" type="slidenum">
+              <a:rPr lang="en-US" smtClean="0"/>
+              <a:pPr/>
+              <a:t>3</a:t>
+            </a:fld>
+            <a:endParaRPr lang="en-US" dirty="0"/>
+          </a:p>
+        </p:txBody>
+      </p:sp>
+      <p:pic>
+        <p:nvPicPr>
+          <p:cNvPr id="2057" name="Picture 9" descr="C:\dev\react-webpack-typescript\_notes\images\webpack.jpg"/>
+          <p:cNvPicPr>
+            <a:picLocks noChangeAspect="1" noChangeArrowheads="1"/>
+          </p:cNvPicPr>
+          <p:nvPr/>
+        </p:nvPicPr>
+        <p:blipFill>
+          <a:blip r:embed="rId3">
+            <a:extLst>
+              <a:ext uri="{28A0092B-C50C-407E-A947-70E740481C1C}">
+                <a14:useLocalDpi xmlns:a14="http://schemas.microsoft.com/office/drawing/2010/main" val="0"/>
+              </a:ext>
+            </a:extLst>
+          </a:blip>
+          <a:srcRect/>
+          <a:stretch>
+            <a:fillRect/>
+          </a:stretch>
+        </p:blipFill>
+        <p:spPr bwMode="auto">
+          <a:xfrm>
+            <a:off x="8229071" y="3588055"/>
+            <a:ext cx="2609060" cy="1806774"/>
+          </a:xfrm>
+          <a:prstGeom prst="rect">
+            <a:avLst/>
+          </a:prstGeom>
+          <a:noFill/>
+          <a:extLst>
+            <a:ext uri="{909E8E84-426E-40DD-AFC4-6F175D3DCCD1}">
+              <a14:hiddenFill xmlns:a14="http://schemas.microsoft.com/office/drawing/2010/main">
+                <a:solidFill>
+                  <a:srgbClr val="FFFFFF"/>
+                </a:solidFill>
+              </a14:hiddenFill>
+            </a:ext>
+          </a:extLst>
+        </p:spPr>
+      </p:pic>
+      <p:pic>
+        <p:nvPicPr>
+          <p:cNvPr id="2058" name="Picture 10" descr="C:\dev\react-webpack-typescript\_notes\images\typescript.png"/>
+          <p:cNvPicPr>
+            <a:picLocks noChangeAspect="1" noChangeArrowheads="1"/>
+          </p:cNvPicPr>
+          <p:nvPr/>
+        </p:nvPicPr>
+        <p:blipFill>
+          <a:blip r:embed="rId4" cstate="print">
+            <a:extLst>
+              <a:ext uri="{28A0092B-C50C-407E-A947-70E740481C1C}">
+                <a14:useLocalDpi xmlns:a14="http://schemas.microsoft.com/office/drawing/2010/main" val="0"/>
+              </a:ext>
+            </a:extLst>
+          </a:blip>
+          <a:srcRect/>
+          <a:stretch>
+            <a:fillRect/>
+          </a:stretch>
+        </p:blipFill>
+        <p:spPr bwMode="auto">
+          <a:xfrm>
+            <a:off x="1366316" y="3212976"/>
+            <a:ext cx="2722618" cy="1425030"/>
+          </a:xfrm>
+          <a:prstGeom prst="rect">
+            <a:avLst/>
+          </a:prstGeom>
+          <a:noFill/>
+          <a:extLst>
+            <a:ext uri="{909E8E84-426E-40DD-AFC4-6F175D3DCCD1}">
+              <a14:hiddenFill xmlns:a14="http://schemas.microsoft.com/office/drawing/2010/main">
+                <a:solidFill>
+                  <a:srgbClr val="FFFFFF"/>
+                </a:solidFill>
+              </a14:hiddenFill>
+            </a:ext>
+          </a:extLst>
+        </p:spPr>
+      </p:pic>
+      <p:pic>
+        <p:nvPicPr>
+          <p:cNvPr id="2059" name="Picture 11" descr="C:\dev\react-webpack-typescript\_notes\images\visual_studio.png"/>
+          <p:cNvPicPr>
+            <a:picLocks noChangeAspect="1" noChangeArrowheads="1"/>
+          </p:cNvPicPr>
+          <p:nvPr/>
+        </p:nvPicPr>
+        <p:blipFill>
+          <a:blip r:embed="rId5" cstate="print">
+            <a:extLst>
+              <a:ext uri="{28A0092B-C50C-407E-A947-70E740481C1C}">
+                <a14:useLocalDpi xmlns:a14="http://schemas.microsoft.com/office/drawing/2010/main" val="0"/>
+              </a:ext>
+            </a:extLst>
+          </a:blip>
+          <a:srcRect/>
+          <a:stretch>
+            <a:fillRect/>
+          </a:stretch>
+        </p:blipFill>
+        <p:spPr bwMode="auto">
+          <a:xfrm>
+            <a:off x="4223792" y="4755745"/>
+            <a:ext cx="2835275" cy="1408112"/>
+          </a:xfrm>
+          <a:prstGeom prst="rect">
+            <a:avLst/>
+          </a:prstGeom>
+          <a:noFill/>
+          <a:extLst>
+            <a:ext uri="{909E8E84-426E-40DD-AFC4-6F175D3DCCD1}">
+              <a14:hiddenFill xmlns:a14="http://schemas.microsoft.com/office/drawing/2010/main">
+                <a:solidFill>
+                  <a:srgbClr val="FFFFFF"/>
+                </a:solidFill>
+              </a14:hiddenFill>
+            </a:ext>
+          </a:extLst>
+        </p:spPr>
+      </p:pic>
+      <p:pic>
+        <p:nvPicPr>
+          <p:cNvPr id="5" name="Picture 4"/>
+          <p:cNvPicPr>
+            <a:picLocks noChangeAspect="1"/>
+          </p:cNvPicPr>
+          <p:nvPr/>
+        </p:nvPicPr>
+        <p:blipFill>
+          <a:blip r:embed="rId6">
+            <a:extLst>
+              <a:ext uri="{28A0092B-C50C-407E-A947-70E740481C1C}">
+                <a14:useLocalDpi xmlns:a14="http://schemas.microsoft.com/office/drawing/2010/main" val="0"/>
+              </a:ext>
+            </a:extLst>
+          </a:blip>
+          <a:stretch>
+            <a:fillRect/>
+          </a:stretch>
+        </p:blipFill>
+        <p:spPr>
+          <a:xfrm>
+            <a:off x="2279576" y="1465296"/>
+            <a:ext cx="2906269" cy="835552"/>
+          </a:xfrm>
+          <a:prstGeom prst="rect">
+            <a:avLst/>
+          </a:prstGeom>
+        </p:spPr>
+      </p:pic>
+      <p:pic>
+        <p:nvPicPr>
+          <p:cNvPr id="11" name="Picture 10"/>
+          <p:cNvPicPr>
+            <a:picLocks noChangeAspect="1"/>
+          </p:cNvPicPr>
+          <p:nvPr/>
+        </p:nvPicPr>
+        <p:blipFill>
+          <a:blip r:embed="rId7">
+            <a:extLst>
+              <a:ext uri="{28A0092B-C50C-407E-A947-70E740481C1C}">
+                <a14:useLocalDpi xmlns:a14="http://schemas.microsoft.com/office/drawing/2010/main" val="0"/>
+              </a:ext>
+            </a:extLst>
+          </a:blip>
+          <a:stretch>
+            <a:fillRect/>
+          </a:stretch>
+        </p:blipFill>
+        <p:spPr>
+          <a:xfrm>
+            <a:off x="6561400" y="1300679"/>
+            <a:ext cx="1685994" cy="1986681"/>
+          </a:xfrm>
+          <a:prstGeom prst="rect">
+            <a:avLst/>
+          </a:prstGeom>
+        </p:spPr>
+      </p:pic>
+    </p:spTree>
+    <p:custDataLst>
+      <p:tags r:id="rId1"/>
+    </p:custDataLst>
+    <p:extLst>
+      <p:ext uri="{BB962C8B-B14F-4D97-AF65-F5344CB8AC3E}">
+        <p14:creationId xmlns:p14="http://schemas.microsoft.com/office/powerpoint/2010/main" val="4085506166"/>
+      </p:ext>
+    </p:extLst>
+  </p:cSld>
+  <p:clrMapOvr>
+    <a:masterClrMapping/>
+  </p:clrMapOvr>
+</p:sld>
+</file>
+
+<file path=ppt/slides/slide4.xml><?xml version="1.0" encoding="utf-8"?>
+<p:sld xmlns:a="http://schemas.openxmlformats.org/drawingml/2006/main" xmlns:r="http://schemas.openxmlformats.org/officeDocument/2006/relationships" xmlns:p="http://schemas.openxmlformats.org/presentationml/2006/main">
+  <p:cSld>
+    <p:spTree>
+      <p:nvGrpSpPr>
+        <p:cNvPr id="1" name=""/>
+        <p:cNvGrpSpPr/>
+        <p:nvPr/>
+      </p:nvGrpSpPr>
+      <p:grpSpPr>
+        <a:xfrm>
+          <a:off x="0" y="0"/>
+          <a:ext cx="0" cy="0"/>
+          <a:chOff x="0" y="0"/>
+          <a:chExt cx="0" cy="0"/>
+        </a:xfrm>
+      </p:grpSpPr>
+      <p:pic>
+        <p:nvPicPr>
+          <p:cNvPr id="5" name="Picture 4"/>
+          <p:cNvPicPr>
+            <a:picLocks noChangeAspect="1"/>
+          </p:cNvPicPr>
+          <p:nvPr/>
+        </p:nvPicPr>
+        <p:blipFill>
+          <a:blip r:embed="rId2"/>
+          <a:stretch>
+            <a:fillRect/>
+          </a:stretch>
+        </p:blipFill>
+        <p:spPr>
+          <a:xfrm>
+            <a:off x="7104112" y="692696"/>
+            <a:ext cx="7249537" cy="6735115"/>
+          </a:xfrm>
+          <a:prstGeom prst="rect">
+            <a:avLst/>
+          </a:prstGeom>
+          <a:solidFill>
+            <a:srgbClr val="FFFFFF">
+              <a:shade val="85000"/>
+            </a:srgbClr>
+          </a:solidFill>
+          <a:ln w="88900" cap="sq">
+            <a:solidFill>
+              <a:srgbClr val="FFFFFF"/>
+            </a:solidFill>
+            <a:miter lim="800000"/>
+          </a:ln>
+          <a:effectLst>
+            <a:outerShdw blurRad="55000" dist="18000" dir="5400000" algn="tl" rotWithShape="0">
+              <a:srgbClr val="000000">
+                <a:alpha val="40000"/>
+              </a:srgbClr>
+            </a:outerShdw>
+          </a:effectLst>
+          <a:scene3d>
+            <a:camera prst="orthographicFront"/>
+            <a:lightRig rig="twoPt" dir="t">
+              <a:rot lat="0" lon="0" rev="7200000"/>
+            </a:lightRig>
+          </a:scene3d>
+          <a:sp3d>
+            <a:bevelT w="25400" h="19050"/>
+            <a:contourClr>
+              <a:srgbClr val="FFFFFF"/>
+            </a:contourClr>
+          </a:sp3d>
+        </p:spPr>
+      </p:pic>
+      <p:sp>
+        <p:nvSpPr>
+          <p:cNvPr id="2" name="Title 1"/>
+          <p:cNvSpPr>
+            <a:spLocks noGrp="1"/>
+          </p:cNvSpPr>
+          <p:nvPr>
+            <p:ph type="title"/>
+          </p:nvPr>
+        </p:nvSpPr>
+        <p:spPr/>
+        <p:txBody>
+          <a:bodyPr/>
+          <a:lstStyle/>
+          <a:p>
+            <a:r>
+              <a:rPr lang="da-DK" dirty="0"/>
+              <a:t>Why this talk?</a:t>
+            </a:r>
+          </a:p>
+        </p:txBody>
+      </p:sp>
+      <p:sp>
+        <p:nvSpPr>
+          <p:cNvPr id="3" name="Content Placeholder 2"/>
+          <p:cNvSpPr>
+            <a:spLocks noGrp="1"/>
+          </p:cNvSpPr>
+          <p:nvPr>
+            <p:ph idx="1"/>
+          </p:nvPr>
+        </p:nvSpPr>
+        <p:spPr/>
+        <p:txBody>
+          <a:bodyPr>
+            <a:normAutofit/>
+          </a:bodyPr>
+          <a:lstStyle/>
+          <a:p>
+            <a:endParaRPr lang="da-DK" dirty="0"/>
+          </a:p>
+          <a:p>
+            <a:endParaRPr lang="da-DK" dirty="0"/>
+          </a:p>
+          <a:p>
+            <a:r>
+              <a:rPr lang="da-DK" dirty="0"/>
+              <a:t>JavaScript ecosystem changes rapidly</a:t>
+            </a:r>
+          </a:p>
+          <a:p>
+            <a:endParaRPr lang="da-DK" dirty="0"/>
+          </a:p>
+          <a:p>
+            <a:r>
+              <a:rPr lang="da-DK" dirty="0"/>
+              <a:t>Lots of ”starter projects” online</a:t>
+            </a:r>
+          </a:p>
+          <a:p>
+            <a:pPr lvl="1"/>
+            <a:r>
+              <a:rPr lang="da-DK" dirty="0"/>
+              <a:t>Usually 20+ npm packages</a:t>
+            </a:r>
+          </a:p>
+          <a:p>
+            <a:pPr lvl="1"/>
+            <a:r>
+              <a:rPr lang="da-DK" dirty="0"/>
+              <a:t>Usually 100+ lines of configuration</a:t>
+            </a:r>
+          </a:p>
+          <a:p>
+            <a:pPr lvl="1"/>
+            <a:r>
+              <a:rPr lang="da-DK" dirty="0"/>
+              <a:t>Usually out of date</a:t>
+            </a:r>
+          </a:p>
+          <a:p>
+            <a:endParaRPr lang="da-DK" dirty="0"/>
+          </a:p>
+          <a:p>
+            <a:r>
+              <a:rPr lang="da-DK" dirty="0"/>
+              <a:t>Show how everything works from the ground up</a:t>
+            </a:r>
+          </a:p>
+          <a:p>
+            <a:endParaRPr lang="da-DK" dirty="0"/>
+          </a:p>
+          <a:p>
+            <a:r>
+              <a:rPr lang="da-DK" dirty="0"/>
+              <a:t>What we wish we had known when we started</a:t>
+            </a:r>
+          </a:p>
+          <a:p>
+            <a:endParaRPr lang="da-DK" dirty="0"/>
+          </a:p>
+          <a:p>
+            <a:endParaRPr lang="da-DK" dirty="0"/>
+          </a:p>
+          <a:p>
+            <a:endParaRPr lang="da-DK" dirty="0"/>
+          </a:p>
+        </p:txBody>
+      </p:sp>
+      <p:sp>
+        <p:nvSpPr>
+          <p:cNvPr id="4" name="Slide Number Placeholder 3"/>
+          <p:cNvSpPr>
+            <a:spLocks noGrp="1"/>
+          </p:cNvSpPr>
+          <p:nvPr>
+            <p:ph type="sldNum" sz="quarter" idx="12"/>
+          </p:nvPr>
+        </p:nvSpPr>
+        <p:spPr/>
+        <p:txBody>
+          <a:bodyPr/>
+          <a:lstStyle/>
+          <a:p>
+            <a:fld id="{0B0DDA44-FDCB-445C-9AC0-37FB199E677B}" type="slidenum">
+              <a:rPr lang="en-US" smtClean="0"/>
+              <a:pPr/>
+              <a:t>4</a:t>
+            </a:fld>
+            <a:endParaRPr lang="en-US" dirty="0"/>
+          </a:p>
+        </p:txBody>
+      </p:sp>
+    </p:spTree>
+    <p:extLst>
+      <p:ext uri="{BB962C8B-B14F-4D97-AF65-F5344CB8AC3E}">
+        <p14:creationId xmlns:p14="http://schemas.microsoft.com/office/powerpoint/2010/main" val="1861659024"/>
+      </p:ext>
+    </p:extLst>
+  </p:cSld>
+  <p:clrMapOvr>
+    <a:masterClrMapping/>
+  </p:clrMapOvr>
+</p:sld>
+</file>
+
+<file path=ppt/slides/slide5.xml><?xml version="1.0" encoding="utf-8"?>
+<p:sld xmlns:a="http://schemas.openxmlformats.org/drawingml/2006/main" xmlns:r="http://schemas.openxmlformats.org/officeDocument/2006/relationships" xmlns:p="http://schemas.openxmlformats.org/presentationml/2006/main">
+  <p:cSld>
+    <p:spTree>
+      <p:nvGrpSpPr>
+        <p:cNvPr id="1" name=""/>
+        <p:cNvGrpSpPr/>
+        <p:nvPr/>
+      </p:nvGrpSpPr>
+      <p:grpSpPr>
+        <a:xfrm>
+          <a:off x="0" y="0"/>
+          <a:ext cx="0" cy="0"/>
+          <a:chOff x="0" y="0"/>
+          <a:chExt cx="0" cy="0"/>
+        </a:xfrm>
+      </p:grpSpPr>
+      <p:sp>
+        <p:nvSpPr>
+          <p:cNvPr id="2" name="Title 1"/>
+          <p:cNvSpPr>
+            <a:spLocks noGrp="1"/>
+          </p:cNvSpPr>
+          <p:nvPr>
+            <p:ph type="title"/>
+          </p:nvPr>
+        </p:nvSpPr>
+        <p:spPr/>
+        <p:txBody>
+          <a:bodyPr/>
+          <a:lstStyle/>
+          <a:p>
+            <a:r>
+              <a:rPr lang="da-DK" dirty="0"/>
+              <a:t>Templafy</a:t>
+            </a:r>
+          </a:p>
+        </p:txBody>
+      </p:sp>
+      <p:sp>
+        <p:nvSpPr>
+          <p:cNvPr id="3" name="Content Placeholder 2"/>
+          <p:cNvSpPr>
+            <a:spLocks noGrp="1"/>
+          </p:cNvSpPr>
+          <p:nvPr>
+            <p:ph idx="1"/>
+          </p:nvPr>
+        </p:nvSpPr>
+        <p:spPr/>
+        <p:txBody>
+          <a:bodyPr/>
+          <a:lstStyle/>
+          <a:p>
+            <a:endParaRPr lang="da-DK" dirty="0"/>
+          </a:p>
+          <a:p>
+            <a:endParaRPr lang="da-DK" dirty="0"/>
+          </a:p>
+          <a:p>
+            <a:endParaRPr lang="da-DK" dirty="0"/>
+          </a:p>
+          <a:p>
+            <a:endParaRPr lang="da-DK" dirty="0"/>
+          </a:p>
+          <a:p>
+            <a:endParaRPr lang="da-DK" dirty="0"/>
+          </a:p>
+          <a:p>
+            <a:endParaRPr lang="da-DK" dirty="0"/>
+          </a:p>
+          <a:p>
+            <a:endParaRPr lang="da-DK" dirty="0"/>
+          </a:p>
+          <a:p>
+            <a:r>
+              <a:rPr lang="da-DK" dirty="0"/>
+              <a:t>Distributed development team</a:t>
+            </a:r>
+          </a:p>
+          <a:p>
+            <a:pPr lvl="2"/>
+            <a:r>
+              <a:rPr lang="da-DK" dirty="0"/>
+              <a:t>Copenhagen: 4 developers</a:t>
+            </a:r>
+          </a:p>
+          <a:p>
+            <a:pPr lvl="2"/>
+            <a:r>
+              <a:rPr lang="da-DK" dirty="0"/>
+              <a:t>Århus: 1 developer</a:t>
+            </a:r>
+          </a:p>
+          <a:p>
+            <a:pPr lvl="2"/>
+            <a:r>
+              <a:rPr lang="da-DK" dirty="0"/>
+              <a:t>Romania: 2 developers, 1 tester</a:t>
+            </a:r>
+          </a:p>
+          <a:p>
+            <a:pPr lvl="2"/>
+            <a:r>
+              <a:rPr lang="da-DK" dirty="0"/>
+              <a:t>Poland: 1 designer</a:t>
+            </a:r>
+          </a:p>
+          <a:p>
+            <a:pPr lvl="2"/>
+            <a:endParaRPr lang="da-DK" dirty="0"/>
+          </a:p>
+          <a:p>
+            <a:endParaRPr lang="da-DK" dirty="0"/>
+          </a:p>
+          <a:p>
+            <a:endParaRPr lang="da-DK" dirty="0"/>
+          </a:p>
+        </p:txBody>
+      </p:sp>
+      <p:sp>
+        <p:nvSpPr>
+          <p:cNvPr id="4" name="Slide Number Placeholder 3"/>
+          <p:cNvSpPr>
+            <a:spLocks noGrp="1"/>
+          </p:cNvSpPr>
+          <p:nvPr>
+            <p:ph type="sldNum" sz="quarter" idx="12"/>
+          </p:nvPr>
+        </p:nvSpPr>
+        <p:spPr/>
+        <p:txBody>
+          <a:bodyPr/>
+          <a:lstStyle/>
+          <a:p>
+            <a:fld id="{0B0DDA44-FDCB-445C-9AC0-37FB199E677B}" type="slidenum">
+              <a:rPr lang="en-US" smtClean="0"/>
+              <a:pPr/>
+              <a:t>5</a:t>
+            </a:fld>
+            <a:endParaRPr lang="en-US" dirty="0"/>
+          </a:p>
+        </p:txBody>
+      </p:sp>
+    </p:spTree>
+    <p:extLst>
+      <p:ext uri="{BB962C8B-B14F-4D97-AF65-F5344CB8AC3E}">
+        <p14:creationId xmlns:p14="http://schemas.microsoft.com/office/powerpoint/2010/main" val="3510273371"/>
+      </p:ext>
+    </p:extLst>
+  </p:cSld>
+  <p:clrMapOvr>
+    <a:masterClrMapping/>
+  </p:clrMapOvr>
+</p:sld>
+</file>
+
+<file path=ppt/slides/slide6.xml><?xml version="1.0" encoding="utf-8"?>
+<p:sld xmlns:a="http://schemas.openxmlformats.org/drawingml/2006/main" xmlns:r="http://schemas.openxmlformats.org/officeDocument/2006/relationships" xmlns:p="http://schemas.openxmlformats.org/presentationml/2006/main">
+  <p:cSld>
+    <p:spTree>
+      <p:nvGrpSpPr>
+        <p:cNvPr id="1" name=""/>
+        <p:cNvGrpSpPr/>
+        <p:nvPr/>
+      </p:nvGrpSpPr>
+      <p:grpSpPr>
+        <a:xfrm>
+          <a:off x="0" y="0"/>
+          <a:ext cx="0" cy="0"/>
+          <a:chOff x="0" y="0"/>
+          <a:chExt cx="0" cy="0"/>
+        </a:xfrm>
+      </p:grpSpPr>
+      <p:sp>
+        <p:nvSpPr>
+          <p:cNvPr id="2" name="Title 1"/>
+          <p:cNvSpPr>
+            <a:spLocks noGrp="1"/>
+          </p:cNvSpPr>
+          <p:nvPr>
+            <p:ph type="title"/>
+          </p:nvPr>
+        </p:nvSpPr>
+        <p:spPr/>
+        <p:txBody>
+          <a:bodyPr/>
+          <a:lstStyle/>
+          <a:p>
+            <a:r>
+              <a:rPr lang="da-DK" dirty="0"/>
+              <a:t>Our Rewrite</a:t>
+            </a:r>
+          </a:p>
+        </p:txBody>
+      </p:sp>
+      <p:sp>
+        <p:nvSpPr>
+          <p:cNvPr id="3" name="Content Placeholder 2"/>
+          <p:cNvSpPr>
+            <a:spLocks noGrp="1"/>
+          </p:cNvSpPr>
+          <p:nvPr>
+            <p:ph idx="1"/>
+          </p:nvPr>
+        </p:nvSpPr>
+        <p:spPr/>
+        <p:txBody>
+          <a:bodyPr/>
+          <a:lstStyle/>
+          <a:p>
+            <a:endParaRPr lang="da-DK" dirty="0"/>
+          </a:p>
+          <a:p>
+            <a:endParaRPr lang="da-DK" dirty="0"/>
+          </a:p>
+          <a:p>
+            <a:r>
+              <a:rPr lang="da-DK" dirty="0"/>
+              <a:t>Migration from Knockout to React</a:t>
+            </a:r>
+          </a:p>
+          <a:p>
+            <a:endParaRPr lang="da-DK" dirty="0"/>
+          </a:p>
+          <a:p>
+            <a:r>
+              <a:rPr lang="da-DK" dirty="0"/>
+              <a:t>Started in June 2016</a:t>
+            </a:r>
+          </a:p>
+          <a:p>
+            <a:endParaRPr lang="da-DK" dirty="0"/>
+          </a:p>
+          <a:p>
+            <a:r>
+              <a:rPr lang="da-DK" dirty="0"/>
+              <a:t>Performance</a:t>
+            </a:r>
+          </a:p>
+          <a:p>
+            <a:r>
+              <a:rPr lang="da-DK" dirty="0"/>
+              <a:t>Focus on core features</a:t>
+            </a:r>
+          </a:p>
+          <a:p>
+            <a:r>
+              <a:rPr lang="da-DK" dirty="0"/>
+              <a:t>Developer productivity</a:t>
+            </a:r>
+          </a:p>
+          <a:p>
+            <a:r>
+              <a:rPr lang="da-DK" dirty="0"/>
+              <a:t>Attracting new talent</a:t>
+            </a:r>
+          </a:p>
+          <a:p>
+            <a:endParaRPr lang="da-DK" dirty="0"/>
+          </a:p>
+        </p:txBody>
+      </p:sp>
+      <p:sp>
+        <p:nvSpPr>
+          <p:cNvPr id="4" name="Slide Number Placeholder 3"/>
+          <p:cNvSpPr>
+            <a:spLocks noGrp="1"/>
+          </p:cNvSpPr>
+          <p:nvPr>
+            <p:ph type="sldNum" sz="quarter" idx="12"/>
+          </p:nvPr>
+        </p:nvSpPr>
+        <p:spPr/>
+        <p:txBody>
+          <a:bodyPr/>
+          <a:lstStyle/>
+          <a:p>
+            <a:fld id="{0B0DDA44-FDCB-445C-9AC0-37FB199E677B}" type="slidenum">
+              <a:rPr lang="en-US" smtClean="0"/>
+              <a:pPr/>
+              <a:t>6</a:t>
+            </a:fld>
+            <a:endParaRPr lang="en-US" dirty="0"/>
+          </a:p>
+        </p:txBody>
+      </p:sp>
+      <p:pic>
+        <p:nvPicPr>
+          <p:cNvPr id="5" name="Picture 4"/>
+          <p:cNvPicPr>
+            <a:picLocks noChangeAspect="1"/>
+          </p:cNvPicPr>
+          <p:nvPr/>
+        </p:nvPicPr>
+        <p:blipFill>
+          <a:blip r:embed="rId2" cstate="print">
+            <a:extLst>
+              <a:ext uri="{28A0092B-C50C-407E-A947-70E740481C1C}">
+                <a14:useLocalDpi xmlns:a14="http://schemas.microsoft.com/office/drawing/2010/main" val="0"/>
+              </a:ext>
+            </a:extLst>
+          </a:blip>
+          <a:stretch>
+            <a:fillRect/>
+          </a:stretch>
+        </p:blipFill>
+        <p:spPr>
+          <a:xfrm>
+            <a:off x="5951984" y="1107756"/>
+            <a:ext cx="5519936" cy="1330105"/>
+          </a:xfrm>
+          <a:prstGeom prst="rect">
+            <a:avLst/>
+          </a:prstGeom>
+        </p:spPr>
+      </p:pic>
+      <p:pic>
+        <p:nvPicPr>
+          <p:cNvPr id="7" name="Picture 6"/>
+          <p:cNvPicPr>
+            <a:picLocks noChangeAspect="1"/>
+          </p:cNvPicPr>
+          <p:nvPr/>
+        </p:nvPicPr>
+        <p:blipFill>
+          <a:blip r:embed="rId3">
+            <a:extLst>
+              <a:ext uri="{28A0092B-C50C-407E-A947-70E740481C1C}">
+                <a14:useLocalDpi xmlns:a14="http://schemas.microsoft.com/office/drawing/2010/main" val="0"/>
+              </a:ext>
+            </a:extLst>
+          </a:blip>
+          <a:stretch>
+            <a:fillRect/>
+          </a:stretch>
+        </p:blipFill>
+        <p:spPr>
+          <a:xfrm>
+            <a:off x="7689142" y="3501008"/>
+            <a:ext cx="2045619" cy="2410443"/>
+          </a:xfrm>
+          <a:prstGeom prst="rect">
+            <a:avLst/>
+          </a:prstGeom>
+        </p:spPr>
+      </p:pic>
+    </p:spTree>
+    <p:extLst>
+      <p:ext uri="{BB962C8B-B14F-4D97-AF65-F5344CB8AC3E}">
+        <p14:creationId xmlns:p14="http://schemas.microsoft.com/office/powerpoint/2010/main" val="397152675"/>
+      </p:ext>
+    </p:extLst>
+  </p:cSld>
+  <p:clrMapOvr>
+    <a:masterClrMapping/>
+  </p:clrMapOvr>
+</p:sld>
+</file>
+
+<file path=ppt/slides/slide7.xml><?xml version="1.0" encoding="utf-8"?>
+<p:sld xmlns:a="http://schemas.openxmlformats.org/drawingml/2006/main" xmlns:r="http://schemas.openxmlformats.org/officeDocument/2006/relationships" xmlns:p="http://schemas.openxmlformats.org/presentationml/2006/main">
+  <p:cSld>
+    <p:spTree>
+      <p:nvGrpSpPr>
+        <p:cNvPr id="1" name=""/>
+        <p:cNvGrpSpPr/>
+        <p:nvPr/>
+      </p:nvGrpSpPr>
+      <p:grpSpPr>
+        <a:xfrm>
+          <a:off x="0" y="0"/>
+          <a:ext cx="0" cy="0"/>
+          <a:chOff x="0" y="0"/>
+          <a:chExt cx="0" cy="0"/>
+        </a:xfrm>
+      </p:grpSpPr>
+      <p:sp>
+        <p:nvSpPr>
+          <p:cNvPr id="2" name="Title 1"/>
+          <p:cNvSpPr>
+            <a:spLocks noGrp="1"/>
+          </p:cNvSpPr>
+          <p:nvPr>
+            <p:ph type="title"/>
+          </p:nvPr>
+        </p:nvSpPr>
+        <p:spPr/>
+        <p:txBody>
+          <a:bodyPr/>
+          <a:lstStyle/>
+          <a:p>
+            <a:r>
+              <a:rPr lang="da-DK" dirty="0"/>
+              <a:t>React</a:t>
+            </a:r>
+          </a:p>
+        </p:txBody>
+      </p:sp>
+      <p:sp>
+        <p:nvSpPr>
+          <p:cNvPr id="3" name="Content Placeholder 2"/>
+          <p:cNvSpPr>
+            <a:spLocks noGrp="1"/>
+          </p:cNvSpPr>
+          <p:nvPr>
+            <p:ph idx="1"/>
+          </p:nvPr>
+        </p:nvSpPr>
+        <p:spPr/>
+        <p:txBody>
+          <a:bodyPr/>
+          <a:lstStyle/>
+          <a:p>
+            <a:endParaRPr lang="en-US" dirty="0"/>
+          </a:p>
+          <a:p>
+            <a:endParaRPr lang="en-US" dirty="0"/>
+          </a:p>
+          <a:p>
+            <a:endParaRPr lang="en-US" dirty="0"/>
+          </a:p>
+          <a:p>
+            <a:r>
+              <a:rPr lang="en-US" dirty="0"/>
+              <a:t>Released by Facebook in 2013</a:t>
+            </a:r>
+          </a:p>
+          <a:p>
+            <a:pPr lvl="1"/>
+            <a:r>
+              <a:rPr lang="en-US" dirty="0"/>
+              <a:t>“</a:t>
+            </a:r>
+            <a:r>
+              <a:rPr lang="en-US" dirty="0"/>
+              <a:t>A JavaScript library for building user interfaces”</a:t>
+            </a:r>
+          </a:p>
+          <a:p>
+            <a:endParaRPr lang="en-US" dirty="0"/>
+          </a:p>
+          <a:p>
+            <a:r>
+              <a:rPr lang="en-US" dirty="0"/>
+              <a:t>Library vs Framework</a:t>
+            </a:r>
+          </a:p>
+          <a:p>
+            <a:pPr lvl="1"/>
+            <a:r>
+              <a:rPr lang="en-US" dirty="0"/>
+              <a:t>V in MVC</a:t>
+            </a:r>
+          </a:p>
+          <a:p>
+            <a:pPr lvl="1"/>
+            <a:endParaRPr lang="en-US" dirty="0"/>
+          </a:p>
+          <a:p>
+            <a:r>
+              <a:rPr lang="en-US" dirty="0"/>
+              <a:t>Declarative components for UI</a:t>
+            </a:r>
+          </a:p>
+          <a:p>
+            <a:endParaRPr lang="en-US" dirty="0"/>
+          </a:p>
+          <a:p>
+            <a:endParaRPr lang="en-US" dirty="0"/>
+          </a:p>
+          <a:p>
+            <a:endParaRPr lang="en-US" dirty="0"/>
+          </a:p>
+          <a:p>
+            <a:endParaRPr lang="en-US" dirty="0"/>
+          </a:p>
+          <a:p>
+            <a:endParaRPr lang="en-US" dirty="0"/>
+          </a:p>
+        </p:txBody>
+      </p:sp>
+      <p:sp>
+        <p:nvSpPr>
+          <p:cNvPr id="4" name="Slide Number Placeholder 3"/>
+          <p:cNvSpPr>
+            <a:spLocks noGrp="1"/>
+          </p:cNvSpPr>
+          <p:nvPr>
+            <p:ph type="sldNum" sz="quarter" idx="12"/>
+          </p:nvPr>
+        </p:nvSpPr>
+        <p:spPr/>
+        <p:txBody>
+          <a:bodyPr/>
+          <a:lstStyle/>
+          <a:p>
+            <a:fld id="{0B0DDA44-FDCB-445C-9AC0-37FB199E677B}" type="slidenum">
+              <a:rPr lang="en-US" smtClean="0"/>
+              <a:pPr/>
+              <a:t>7</a:t>
             </a:fld>
             <a:endParaRPr lang="en-US" dirty="0"/>
           </a:p>
@@ -5180,7 +6980,7 @@
 </p:sld>
 </file>
 
-<file path=ppt/slides/slide9.xml><?xml version="1.0" encoding="utf-8"?>
+<file path=ppt/slides/slide8.xml><?xml version="1.0" encoding="utf-8"?>
 <p:sld xmlns:a="http://schemas.openxmlformats.org/drawingml/2006/main" xmlns:r="http://schemas.openxmlformats.org/officeDocument/2006/relationships" xmlns:p="http://schemas.openxmlformats.org/presentationml/2006/main">
   <p:cSld>
     <p:spTree>
@@ -5320,7 +7120,7 @@
             <a:fld id="{0B0DDA44-FDCB-445C-9AC0-37FB199E677B}" type="slidenum">
               <a:rPr lang="en-US" smtClean="0"/>
               <a:pPr/>
-              <a:t>9</a:t>
+              <a:t>8</a:t>
             </a:fld>
             <a:endParaRPr lang="en-US" dirty="0"/>
           </a:p>
@@ -5360,6 +7160,94 @@
     <p:extLst>
       <p:ext uri="{BB962C8B-B14F-4D97-AF65-F5344CB8AC3E}">
         <p14:creationId xmlns:p14="http://schemas.microsoft.com/office/powerpoint/2010/main" val="73486684"/>
+      </p:ext>
+    </p:extLst>
+  </p:cSld>
+  <p:clrMapOvr>
+    <a:masterClrMapping/>
+  </p:clrMapOvr>
+</p:sld>
+</file>
+
+<file path=ppt/slides/slide9.xml><?xml version="1.0" encoding="utf-8"?>
+<p:sld xmlns:a="http://schemas.openxmlformats.org/drawingml/2006/main" xmlns:r="http://schemas.openxmlformats.org/officeDocument/2006/relationships" xmlns:p="http://schemas.openxmlformats.org/presentationml/2006/main">
+  <p:cSld>
+    <p:spTree>
+      <p:nvGrpSpPr>
+        <p:cNvPr id="1" name=""/>
+        <p:cNvGrpSpPr/>
+        <p:nvPr/>
+      </p:nvGrpSpPr>
+      <p:grpSpPr>
+        <a:xfrm>
+          <a:off x="0" y="0"/>
+          <a:ext cx="0" cy="0"/>
+          <a:chOff x="0" y="0"/>
+          <a:chExt cx="0" cy="0"/>
+        </a:xfrm>
+      </p:grpSpPr>
+      <p:sp>
+        <p:nvSpPr>
+          <p:cNvPr id="4" name="Slide Number Placeholder 3"/>
+          <p:cNvSpPr>
+            <a:spLocks noGrp="1"/>
+          </p:cNvSpPr>
+          <p:nvPr>
+            <p:ph type="sldNum" sz="quarter" idx="12"/>
+          </p:nvPr>
+        </p:nvSpPr>
+        <p:spPr/>
+        <p:txBody>
+          <a:bodyPr/>
+          <a:lstStyle/>
+          <a:p>
+            <a:fld id="{0B0DDA44-FDCB-445C-9AC0-37FB199E677B}" type="slidenum">
+              <a:rPr lang="en-US" smtClean="0"/>
+              <a:pPr/>
+              <a:t>9</a:t>
+            </a:fld>
+            <a:endParaRPr lang="en-US" dirty="0"/>
+          </a:p>
+        </p:txBody>
+      </p:sp>
+      <p:sp>
+        <p:nvSpPr>
+          <p:cNvPr id="5" name="TextBox 4"/>
+          <p:cNvSpPr txBox="1"/>
+          <p:nvPr/>
+        </p:nvSpPr>
+        <p:spPr>
+          <a:xfrm>
+            <a:off x="4887074" y="3059668"/>
+            <a:ext cx="2417853" cy="738664"/>
+          </a:xfrm>
+          <a:prstGeom prst="rect">
+            <a:avLst/>
+          </a:prstGeom>
+          <a:noFill/>
+        </p:spPr>
+        <p:txBody>
+          <a:bodyPr wrap="square" lIns="0" tIns="0" rIns="0" bIns="0" rtlCol="0">
+            <a:spAutoFit/>
+          </a:bodyPr>
+          <a:lstStyle/>
+          <a:p>
+            <a:pPr algn="ctr"/>
+            <a:r>
+              <a:rPr lang="da-DK" sz="4800" dirty="0">
+                <a:latin typeface="Arial" panose="020B0604020202020204" pitchFamily="34" charset="0"/>
+                <a:ea typeface="Open Sans" panose="020B0606030504020204" pitchFamily="34" charset="0"/>
+                <a:cs typeface="Arial" panose="020B0604020202020204" pitchFamily="34" charset="0"/>
+              </a:rPr>
+              <a:t>Demo</a:t>
+            </a:r>
+          </a:p>
+        </p:txBody>
+      </p:sp>
+    </p:spTree>
+    <p:extLst>
+      <p:ext uri="{BB962C8B-B14F-4D97-AF65-F5344CB8AC3E}">
+        <p14:creationId xmlns:p14="http://schemas.microsoft.com/office/powerpoint/2010/main" val="458741672"/>
       </p:ext>
     </p:extLst>
   </p:cSld>

</xml_diff>

<commit_message>
Finished Templafy slide and plain react demo.
</commit_message>
<xml_diff>
--- a/_notes/Presentation.pptx
+++ b/_notes/Presentation.pptx
@@ -5,10 +5,10 @@
     <p:sldMasterId id="2147483648" r:id="rId1"/>
   </p:sldMasterIdLst>
   <p:notesMasterIdLst>
-    <p:notesMasterId r:id="rId19"/>
+    <p:notesMasterId r:id="rId16"/>
   </p:notesMasterIdLst>
   <p:handoutMasterIdLst>
-    <p:handoutMasterId r:id="rId20"/>
+    <p:handoutMasterId r:id="rId17"/>
   </p:handoutMasterIdLst>
   <p:sldIdLst>
     <p:sldId id="256" r:id="rId2"/>
@@ -19,20 +19,17 @@
     <p:sldId id="259" r:id="rId7"/>
     <p:sldId id="268" r:id="rId8"/>
     <p:sldId id="269" r:id="rId9"/>
-    <p:sldId id="273" r:id="rId10"/>
-    <p:sldId id="275" r:id="rId11"/>
-    <p:sldId id="276" r:id="rId12"/>
-    <p:sldId id="272" r:id="rId13"/>
-    <p:sldId id="263" r:id="rId14"/>
-    <p:sldId id="274" r:id="rId15"/>
-    <p:sldId id="277" r:id="rId16"/>
-    <p:sldId id="271" r:id="rId17"/>
-    <p:sldId id="270" r:id="rId18"/>
+    <p:sldId id="275" r:id="rId10"/>
+    <p:sldId id="272" r:id="rId11"/>
+    <p:sldId id="263" r:id="rId12"/>
+    <p:sldId id="274" r:id="rId13"/>
+    <p:sldId id="271" r:id="rId14"/>
+    <p:sldId id="270" r:id="rId15"/>
   </p:sldIdLst>
   <p:sldSz cx="12192000" cy="6858000"/>
   <p:notesSz cx="6797675" cy="9926638"/>
   <p:custDataLst>
-    <p:tags r:id="rId21"/>
+    <p:tags r:id="rId18"/>
   </p:custDataLst>
   <p:defaultTextStyle>
     <a:defPPr>
@@ -2244,7 +2241,7 @@
           <a:graphicData uri="http://schemas.openxmlformats.org/presentationml/2006/ole">
             <mc:AlternateContent xmlns:mc="http://schemas.openxmlformats.org/markup-compatibility/2006">
               <mc:Choice xmlns:v="urn:schemas-microsoft-com:vml" Requires="v">
-                <p:oleObj spid="_x0000_s1311" name="think-cell Slide" r:id="rId11" imgW="473" imgH="473" progId="TCLayout.ActiveDocument.1">
+                <p:oleObj spid="_x0000_s1340" name="think-cell Slide" r:id="rId11" imgW="473" imgH="473" progId="TCLayout.ActiveDocument.1">
                   <p:embed/>
                 </p:oleObj>
               </mc:Choice>
@@ -3017,302 +3014,6 @@
       </p:grpSpPr>
       <p:sp>
         <p:nvSpPr>
-          <p:cNvPr id="2" name="Title 1"/>
-          <p:cNvSpPr>
-            <a:spLocks noGrp="1"/>
-          </p:cNvSpPr>
-          <p:nvPr>
-            <p:ph type="title"/>
-          </p:nvPr>
-        </p:nvSpPr>
-        <p:spPr/>
-        <p:txBody>
-          <a:bodyPr/>
-          <a:lstStyle/>
-          <a:p>
-            <a:r>
-              <a:rPr lang="da-DK" dirty="0"/>
-              <a:t>TypeScript</a:t>
-            </a:r>
-          </a:p>
-        </p:txBody>
-      </p:sp>
-      <p:sp>
-        <p:nvSpPr>
-          <p:cNvPr id="3" name="Content Placeholder 2"/>
-          <p:cNvSpPr>
-            <a:spLocks noGrp="1"/>
-          </p:cNvSpPr>
-          <p:nvPr>
-            <p:ph idx="1"/>
-          </p:nvPr>
-        </p:nvSpPr>
-        <p:spPr/>
-        <p:txBody>
-          <a:bodyPr/>
-          <a:lstStyle/>
-          <a:p>
-            <a:endParaRPr lang="da-DK" dirty="0"/>
-          </a:p>
-          <a:p>
-            <a:endParaRPr lang="da-DK" dirty="0"/>
-          </a:p>
-          <a:p>
-            <a:r>
-              <a:rPr lang="da-DK" dirty="0"/>
-              <a:t>Released by Microsoft in 2012</a:t>
-            </a:r>
-          </a:p>
-          <a:p>
-            <a:pPr lvl="1"/>
-            <a:r>
-              <a:rPr lang="da-DK" dirty="0"/>
-              <a:t>”</a:t>
-            </a:r>
-            <a:r>
-              <a:rPr lang="en-US" dirty="0" err="1"/>
-              <a:t>TypeScript</a:t>
-            </a:r>
-            <a:r>
-              <a:rPr lang="en-US" dirty="0"/>
-              <a:t> is a typed superset of JavaScript that compiles to plain JavaScript.”</a:t>
-            </a:r>
-          </a:p>
-          <a:p>
-            <a:pPr lvl="1"/>
-            <a:endParaRPr lang="en-US" dirty="0"/>
-          </a:p>
-          <a:p>
-            <a:pPr lvl="1"/>
-            <a:endParaRPr lang="en-US" dirty="0"/>
-          </a:p>
-          <a:p>
-            <a:r>
-              <a:rPr lang="en-US" dirty="0"/>
-              <a:t>Adds types and type inference</a:t>
-            </a:r>
-          </a:p>
-          <a:p>
-            <a:endParaRPr lang="en-US" dirty="0"/>
-          </a:p>
-          <a:p>
-            <a:endParaRPr lang="en-US" dirty="0"/>
-          </a:p>
-          <a:p>
-            <a:r>
-              <a:rPr lang="en-US" dirty="0"/>
-              <a:t>Adds support for new ECMAScript features</a:t>
-            </a:r>
-          </a:p>
-          <a:p>
-            <a:endParaRPr lang="en-US" dirty="0"/>
-          </a:p>
-          <a:p>
-            <a:endParaRPr lang="en-US" dirty="0"/>
-          </a:p>
-          <a:p>
-            <a:endParaRPr lang="en-US" dirty="0"/>
-          </a:p>
-          <a:p>
-            <a:endParaRPr lang="en-US" dirty="0"/>
-          </a:p>
-          <a:p>
-            <a:endParaRPr lang="en-US" dirty="0"/>
-          </a:p>
-          <a:p>
-            <a:pPr lvl="1"/>
-            <a:endParaRPr lang="en-US" dirty="0"/>
-          </a:p>
-          <a:p>
-            <a:endParaRPr lang="da-DK" dirty="0"/>
-          </a:p>
-        </p:txBody>
-      </p:sp>
-      <p:sp>
-        <p:nvSpPr>
-          <p:cNvPr id="4" name="Slide Number Placeholder 3"/>
-          <p:cNvSpPr>
-            <a:spLocks noGrp="1"/>
-          </p:cNvSpPr>
-          <p:nvPr>
-            <p:ph type="sldNum" sz="quarter" idx="12"/>
-          </p:nvPr>
-        </p:nvSpPr>
-        <p:spPr/>
-        <p:txBody>
-          <a:bodyPr/>
-          <a:lstStyle/>
-          <a:p>
-            <a:fld id="{0B0DDA44-FDCB-445C-9AC0-37FB199E677B}" type="slidenum">
-              <a:rPr lang="en-US" smtClean="0"/>
-              <a:pPr/>
-              <a:t>10</a:t>
-            </a:fld>
-            <a:endParaRPr lang="en-US" dirty="0"/>
-          </a:p>
-        </p:txBody>
-      </p:sp>
-      <p:pic>
-        <p:nvPicPr>
-          <p:cNvPr id="5" name="Picture 10" descr="C:\dev\react-webpack-typescript\_notes\images\typescript.png"/>
-          <p:cNvPicPr>
-            <a:picLocks noChangeAspect="1" noChangeArrowheads="1"/>
-          </p:cNvPicPr>
-          <p:nvPr/>
-        </p:nvPicPr>
-        <p:blipFill>
-          <a:blip r:embed="rId2" cstate="print">
-            <a:extLst>
-              <a:ext uri="{28A0092B-C50C-407E-A947-70E740481C1C}">
-                <a14:useLocalDpi xmlns:a14="http://schemas.microsoft.com/office/drawing/2010/main" val="0"/>
-              </a:ext>
-            </a:extLst>
-          </a:blip>
-          <a:srcRect/>
-          <a:stretch>
-            <a:fillRect/>
-          </a:stretch>
-        </p:blipFill>
-        <p:spPr bwMode="auto">
-          <a:xfrm>
-            <a:off x="8184232" y="2948943"/>
-            <a:ext cx="2722618" cy="1425030"/>
-          </a:xfrm>
-          <a:prstGeom prst="rect">
-            <a:avLst/>
-          </a:prstGeom>
-          <a:noFill/>
-          <a:extLst>
-            <a:ext uri="{909E8E84-426E-40DD-AFC4-6F175D3DCCD1}">
-              <a14:hiddenFill xmlns:a14="http://schemas.microsoft.com/office/drawing/2010/main">
-                <a:solidFill>
-                  <a:srgbClr val="FFFFFF"/>
-                </a:solidFill>
-              </a14:hiddenFill>
-            </a:ext>
-          </a:extLst>
-        </p:spPr>
-      </p:pic>
-    </p:spTree>
-    <p:extLst>
-      <p:ext uri="{BB962C8B-B14F-4D97-AF65-F5344CB8AC3E}">
-        <p14:creationId xmlns:p14="http://schemas.microsoft.com/office/powerpoint/2010/main" val="1704763269"/>
-      </p:ext>
-    </p:extLst>
-  </p:cSld>
-  <p:clrMapOvr>
-    <a:masterClrMapping/>
-  </p:clrMapOvr>
-</p:sld>
-</file>
-
-<file path=ppt/slides/slide11.xml><?xml version="1.0" encoding="utf-8"?>
-<p:sld xmlns:a="http://schemas.openxmlformats.org/drawingml/2006/main" xmlns:r="http://schemas.openxmlformats.org/officeDocument/2006/relationships" xmlns:p="http://schemas.openxmlformats.org/presentationml/2006/main">
-  <p:cSld>
-    <p:spTree>
-      <p:nvGrpSpPr>
-        <p:cNvPr id="1" name=""/>
-        <p:cNvGrpSpPr/>
-        <p:nvPr/>
-      </p:nvGrpSpPr>
-      <p:grpSpPr>
-        <a:xfrm>
-          <a:off x="0" y="0"/>
-          <a:ext cx="0" cy="0"/>
-          <a:chOff x="0" y="0"/>
-          <a:chExt cx="0" cy="0"/>
-        </a:xfrm>
-      </p:grpSpPr>
-      <p:sp>
-        <p:nvSpPr>
-          <p:cNvPr id="4" name="Slide Number Placeholder 3"/>
-          <p:cNvSpPr>
-            <a:spLocks noGrp="1"/>
-          </p:cNvSpPr>
-          <p:nvPr>
-            <p:ph type="sldNum" sz="quarter" idx="12"/>
-          </p:nvPr>
-        </p:nvSpPr>
-        <p:spPr/>
-        <p:txBody>
-          <a:bodyPr/>
-          <a:lstStyle/>
-          <a:p>
-            <a:fld id="{0B0DDA44-FDCB-445C-9AC0-37FB199E677B}" type="slidenum">
-              <a:rPr lang="en-US" smtClean="0"/>
-              <a:pPr/>
-              <a:t>11</a:t>
-            </a:fld>
-            <a:endParaRPr lang="en-US" dirty="0"/>
-          </a:p>
-        </p:txBody>
-      </p:sp>
-      <p:sp>
-        <p:nvSpPr>
-          <p:cNvPr id="5" name="TextBox 4"/>
-          <p:cNvSpPr txBox="1"/>
-          <p:nvPr/>
-        </p:nvSpPr>
-        <p:spPr>
-          <a:xfrm>
-            <a:off x="4887074" y="3059668"/>
-            <a:ext cx="2417853" cy="738664"/>
-          </a:xfrm>
-          <a:prstGeom prst="rect">
-            <a:avLst/>
-          </a:prstGeom>
-          <a:noFill/>
-        </p:spPr>
-        <p:txBody>
-          <a:bodyPr wrap="square" lIns="0" tIns="0" rIns="0" bIns="0" rtlCol="0">
-            <a:spAutoFit/>
-          </a:bodyPr>
-          <a:lstStyle/>
-          <a:p>
-            <a:pPr algn="ctr"/>
-            <a:r>
-              <a:rPr lang="da-DK" sz="4800" dirty="0">
-                <a:latin typeface="Arial" panose="020B0604020202020204" pitchFamily="34" charset="0"/>
-                <a:ea typeface="Open Sans" panose="020B0606030504020204" pitchFamily="34" charset="0"/>
-                <a:cs typeface="Arial" panose="020B0604020202020204" pitchFamily="34" charset="0"/>
-              </a:rPr>
-              <a:t>Demo</a:t>
-            </a:r>
-          </a:p>
-        </p:txBody>
-      </p:sp>
-    </p:spTree>
-    <p:extLst>
-      <p:ext uri="{BB962C8B-B14F-4D97-AF65-F5344CB8AC3E}">
-        <p14:creationId xmlns:p14="http://schemas.microsoft.com/office/powerpoint/2010/main" val="1191038346"/>
-      </p:ext>
-    </p:extLst>
-  </p:cSld>
-  <p:clrMapOvr>
-    <a:masterClrMapping/>
-  </p:clrMapOvr>
-</p:sld>
-</file>
-
-<file path=ppt/slides/slide12.xml><?xml version="1.0" encoding="utf-8"?>
-<p:sld xmlns:a="http://schemas.openxmlformats.org/drawingml/2006/main" xmlns:r="http://schemas.openxmlformats.org/officeDocument/2006/relationships" xmlns:p="http://schemas.openxmlformats.org/presentationml/2006/main">
-  <p:cSld>
-    <p:spTree>
-      <p:nvGrpSpPr>
-        <p:cNvPr id="1" name=""/>
-        <p:cNvGrpSpPr/>
-        <p:nvPr/>
-      </p:nvGrpSpPr>
-      <p:grpSpPr>
-        <a:xfrm>
-          <a:off x="0" y="0"/>
-          <a:ext cx="0" cy="0"/>
-          <a:chOff x="0" y="0"/>
-          <a:chExt cx="0" cy="0"/>
-        </a:xfrm>
-      </p:grpSpPr>
-      <p:sp>
-        <p:nvSpPr>
           <p:cNvPr id="76" name="Rectangle 75"/>
           <p:cNvSpPr/>
           <p:nvPr/>
@@ -3421,7 +3122,7 @@
             <a:fld id="{0B0DDA44-FDCB-445C-9AC0-37FB199E677B}" type="slidenum">
               <a:rPr lang="en-US" smtClean="0"/>
               <a:pPr/>
-              <a:t>12</a:t>
+              <a:t>10</a:t>
             </a:fld>
             <a:endParaRPr lang="en-US" dirty="0"/>
           </a:p>
@@ -4517,7 +4218,7 @@
 </p:sld>
 </file>
 
-<file path=ppt/slides/slide13.xml><?xml version="1.0" encoding="utf-8"?>
+<file path=ppt/slides/slide11.xml><?xml version="1.0" encoding="utf-8"?>
 <p:sld xmlns:a="http://schemas.openxmlformats.org/drawingml/2006/main" xmlns:r="http://schemas.openxmlformats.org/officeDocument/2006/relationships" xmlns:p="http://schemas.openxmlformats.org/presentationml/2006/main">
   <p:cSld>
     <p:spTree>
@@ -4669,7 +4370,7 @@
             <a:fld id="{0B0DDA44-FDCB-445C-9AC0-37FB199E677B}" type="slidenum">
               <a:rPr lang="en-US" smtClean="0"/>
               <a:pPr/>
-              <a:t>13</a:t>
+              <a:t>11</a:t>
             </a:fld>
             <a:endParaRPr lang="en-US" dirty="0"/>
           </a:p>
@@ -5002,6 +4703,59 @@
           </a:p>
         </p:txBody>
       </p:sp>
+      <p:sp>
+        <p:nvSpPr>
+          <p:cNvPr id="12" name="Rectangle 11"/>
+          <p:cNvSpPr/>
+          <p:nvPr/>
+        </p:nvSpPr>
+        <p:spPr>
+          <a:xfrm>
+            <a:off x="609600" y="6457514"/>
+            <a:ext cx="302400" cy="303814"/>
+          </a:xfrm>
+          <a:prstGeom prst="rect">
+            <a:avLst/>
+          </a:prstGeom>
+          <a:solidFill>
+            <a:schemeClr val="tx1"/>
+          </a:solidFill>
+          <a:ln w="9525">
+            <a:noFill/>
+            <a:prstDash val="dash"/>
+          </a:ln>
+        </p:spPr>
+        <p:style>
+          <a:lnRef idx="2">
+            <a:schemeClr val="accent1">
+              <a:shade val="50000"/>
+            </a:schemeClr>
+          </a:lnRef>
+          <a:fillRef idx="1">
+            <a:schemeClr val="accent1"/>
+          </a:fillRef>
+          <a:effectRef idx="0">
+            <a:schemeClr val="accent1"/>
+          </a:effectRef>
+          <a:fontRef idx="minor">
+            <a:schemeClr val="lt1"/>
+          </a:fontRef>
+        </p:style>
+        <p:txBody>
+          <a:bodyPr rtlCol="0" anchor="ctr"/>
+          <a:lstStyle/>
+          <a:p>
+            <a:pPr algn="ctr"/>
+            <a:endParaRPr lang="da-DK" sz="1000" dirty="0">
+              <a:solidFill>
+                <a:schemeClr val="bg1"/>
+              </a:solidFill>
+              <a:latin typeface="Arial" panose="020B0604020202020204" pitchFamily="34" charset="0"/>
+              <a:cs typeface="Arial" panose="020B0604020202020204" pitchFamily="34" charset="0"/>
+            </a:endParaRPr>
+          </a:p>
+        </p:txBody>
+      </p:sp>
     </p:spTree>
     <p:extLst>
       <p:ext uri="{BB962C8B-B14F-4D97-AF65-F5344CB8AC3E}">
@@ -5015,7 +4769,7 @@
 </p:sld>
 </file>
 
-<file path=ppt/slides/slide14.xml><?xml version="1.0" encoding="utf-8"?>
+<file path=ppt/slides/slide12.xml><?xml version="1.0" encoding="utf-8"?>
 <p:sld xmlns:a="http://schemas.openxmlformats.org/drawingml/2006/main" xmlns:r="http://schemas.openxmlformats.org/officeDocument/2006/relationships" xmlns:p="http://schemas.openxmlformats.org/presentationml/2006/main">
   <p:cSld>
     <p:spTree>
@@ -5185,7 +4939,7 @@
             <a:fld id="{0B0DDA44-FDCB-445C-9AC0-37FB199E677B}" type="slidenum">
               <a:rPr lang="en-US" smtClean="0"/>
               <a:pPr/>
-              <a:t>14</a:t>
+              <a:t>12</a:t>
             </a:fld>
             <a:endParaRPr lang="en-US" dirty="0"/>
           </a:p>
@@ -5232,6 +4986,59 @@
           </a:extLst>
         </p:spPr>
       </p:pic>
+      <p:sp>
+        <p:nvSpPr>
+          <p:cNvPr id="6" name="Rectangle 5"/>
+          <p:cNvSpPr/>
+          <p:nvPr/>
+        </p:nvSpPr>
+        <p:spPr>
+          <a:xfrm>
+            <a:off x="609600" y="6457514"/>
+            <a:ext cx="302400" cy="303814"/>
+          </a:xfrm>
+          <a:prstGeom prst="rect">
+            <a:avLst/>
+          </a:prstGeom>
+          <a:solidFill>
+            <a:schemeClr val="tx1"/>
+          </a:solidFill>
+          <a:ln w="9525">
+            <a:noFill/>
+            <a:prstDash val="dash"/>
+          </a:ln>
+        </p:spPr>
+        <p:style>
+          <a:lnRef idx="2">
+            <a:schemeClr val="accent1">
+              <a:shade val="50000"/>
+            </a:schemeClr>
+          </a:lnRef>
+          <a:fillRef idx="1">
+            <a:schemeClr val="accent1"/>
+          </a:fillRef>
+          <a:effectRef idx="0">
+            <a:schemeClr val="accent1"/>
+          </a:effectRef>
+          <a:fontRef idx="minor">
+            <a:schemeClr val="lt1"/>
+          </a:fontRef>
+        </p:style>
+        <p:txBody>
+          <a:bodyPr rtlCol="0" anchor="ctr"/>
+          <a:lstStyle/>
+          <a:p>
+            <a:pPr algn="ctr"/>
+            <a:endParaRPr lang="da-DK" sz="1000" dirty="0">
+              <a:solidFill>
+                <a:schemeClr val="bg1"/>
+              </a:solidFill>
+              <a:latin typeface="Arial" panose="020B0604020202020204" pitchFamily="34" charset="0"/>
+              <a:cs typeface="Arial" panose="020B0604020202020204" pitchFamily="34" charset="0"/>
+            </a:endParaRPr>
+          </a:p>
+        </p:txBody>
+      </p:sp>
     </p:spTree>
     <p:extLst>
       <p:ext uri="{BB962C8B-B14F-4D97-AF65-F5344CB8AC3E}">
@@ -5245,7 +5052,7 @@
 </p:sld>
 </file>
 
-<file path=ppt/slides/slide15.xml><?xml version="1.0" encoding="utf-8"?>
+<file path=ppt/slides/slide13.xml><?xml version="1.0" encoding="utf-8"?>
 <p:sld xmlns:a="http://schemas.openxmlformats.org/drawingml/2006/main" xmlns:r="http://schemas.openxmlformats.org/officeDocument/2006/relationships" xmlns:p="http://schemas.openxmlformats.org/presentationml/2006/main">
   <p:cSld>
     <p:spTree>
@@ -5264,6 +5071,77 @@
       </p:grpSpPr>
       <p:sp>
         <p:nvSpPr>
+          <p:cNvPr id="2" name="Title 1"/>
+          <p:cNvSpPr>
+            <a:spLocks noGrp="1"/>
+          </p:cNvSpPr>
+          <p:nvPr>
+            <p:ph type="title"/>
+          </p:nvPr>
+        </p:nvSpPr>
+        <p:spPr/>
+        <p:txBody>
+          <a:bodyPr/>
+          <a:lstStyle/>
+          <a:p>
+            <a:r>
+              <a:rPr lang="da-DK" dirty="0"/>
+              <a:t>Advice</a:t>
+            </a:r>
+          </a:p>
+        </p:txBody>
+      </p:sp>
+      <p:sp>
+        <p:nvSpPr>
+          <p:cNvPr id="3" name="Content Placeholder 2"/>
+          <p:cNvSpPr>
+            <a:spLocks noGrp="1"/>
+          </p:cNvSpPr>
+          <p:nvPr>
+            <p:ph idx="1"/>
+          </p:nvPr>
+        </p:nvSpPr>
+        <p:spPr/>
+        <p:txBody>
+          <a:bodyPr/>
+          <a:lstStyle/>
+          <a:p>
+            <a:endParaRPr lang="da-DK" dirty="0"/>
+          </a:p>
+          <a:p>
+            <a:r>
+              <a:rPr lang="da-DK" dirty="0"/>
+              <a:t>Keep number of dependencies down</a:t>
+            </a:r>
+          </a:p>
+          <a:p>
+            <a:endParaRPr lang="da-DK" dirty="0"/>
+          </a:p>
+          <a:p>
+            <a:r>
+              <a:rPr lang="da-DK" dirty="0"/>
+              <a:t>React</a:t>
+            </a:r>
+          </a:p>
+          <a:p>
+            <a:pPr lvl="1"/>
+            <a:r>
+              <a:rPr lang="da-DK" dirty="0"/>
+              <a:t>create-react-app from Facebook</a:t>
+            </a:r>
+          </a:p>
+          <a:p>
+            <a:pPr lvl="1"/>
+            <a:endParaRPr lang="da-DK" dirty="0"/>
+          </a:p>
+          <a:p>
+            <a:pPr lvl="1"/>
+            <a:endParaRPr lang="da-DK" dirty="0"/>
+          </a:p>
+        </p:txBody>
+      </p:sp>
+      <p:sp>
+        <p:nvSpPr>
           <p:cNvPr id="4" name="Slide Number Placeholder 3"/>
           <p:cNvSpPr>
             <a:spLocks noGrp="1"/>
@@ -5280,166 +5158,7 @@
             <a:fld id="{0B0DDA44-FDCB-445C-9AC0-37FB199E677B}" type="slidenum">
               <a:rPr lang="en-US" smtClean="0"/>
               <a:pPr/>
-              <a:t>15</a:t>
-            </a:fld>
-            <a:endParaRPr lang="en-US" dirty="0"/>
-          </a:p>
-        </p:txBody>
-      </p:sp>
-      <p:sp>
-        <p:nvSpPr>
-          <p:cNvPr id="5" name="TextBox 4"/>
-          <p:cNvSpPr txBox="1"/>
-          <p:nvPr/>
-        </p:nvSpPr>
-        <p:spPr>
-          <a:xfrm>
-            <a:off x="4887074" y="3059668"/>
-            <a:ext cx="2417853" cy="738664"/>
-          </a:xfrm>
-          <a:prstGeom prst="rect">
-            <a:avLst/>
-          </a:prstGeom>
-          <a:noFill/>
-        </p:spPr>
-        <p:txBody>
-          <a:bodyPr wrap="square" lIns="0" tIns="0" rIns="0" bIns="0" rtlCol="0">
-            <a:spAutoFit/>
-          </a:bodyPr>
-          <a:lstStyle/>
-          <a:p>
-            <a:pPr algn="ctr"/>
-            <a:r>
-              <a:rPr lang="da-DK" sz="4800" dirty="0">
-                <a:latin typeface="Arial" panose="020B0604020202020204" pitchFamily="34" charset="0"/>
-                <a:ea typeface="Open Sans" panose="020B0606030504020204" pitchFamily="34" charset="0"/>
-                <a:cs typeface="Arial" panose="020B0604020202020204" pitchFamily="34" charset="0"/>
-              </a:rPr>
-              <a:t>Demo</a:t>
-            </a:r>
-          </a:p>
-        </p:txBody>
-      </p:sp>
-    </p:spTree>
-    <p:extLst>
-      <p:ext uri="{BB962C8B-B14F-4D97-AF65-F5344CB8AC3E}">
-        <p14:creationId xmlns:p14="http://schemas.microsoft.com/office/powerpoint/2010/main" val="54450135"/>
-      </p:ext>
-    </p:extLst>
-  </p:cSld>
-  <p:clrMapOvr>
-    <a:masterClrMapping/>
-  </p:clrMapOvr>
-</p:sld>
-</file>
-
-<file path=ppt/slides/slide16.xml><?xml version="1.0" encoding="utf-8"?>
-<p:sld xmlns:a="http://schemas.openxmlformats.org/drawingml/2006/main" xmlns:r="http://schemas.openxmlformats.org/officeDocument/2006/relationships" xmlns:p="http://schemas.openxmlformats.org/presentationml/2006/main">
-  <p:cSld>
-    <p:spTree>
-      <p:nvGrpSpPr>
-        <p:cNvPr id="1" name=""/>
-        <p:cNvGrpSpPr/>
-        <p:nvPr/>
-      </p:nvGrpSpPr>
-      <p:grpSpPr>
-        <a:xfrm>
-          <a:off x="0" y="0"/>
-          <a:ext cx="0" cy="0"/>
-          <a:chOff x="0" y="0"/>
-          <a:chExt cx="0" cy="0"/>
-        </a:xfrm>
-      </p:grpSpPr>
-      <p:sp>
-        <p:nvSpPr>
-          <p:cNvPr id="2" name="Title 1"/>
-          <p:cNvSpPr>
-            <a:spLocks noGrp="1"/>
-          </p:cNvSpPr>
-          <p:nvPr>
-            <p:ph type="title"/>
-          </p:nvPr>
-        </p:nvSpPr>
-        <p:spPr/>
-        <p:txBody>
-          <a:bodyPr/>
-          <a:lstStyle/>
-          <a:p>
-            <a:r>
-              <a:rPr lang="da-DK" dirty="0"/>
-              <a:t>Advice</a:t>
-            </a:r>
-          </a:p>
-        </p:txBody>
-      </p:sp>
-      <p:sp>
-        <p:nvSpPr>
-          <p:cNvPr id="3" name="Content Placeholder 2"/>
-          <p:cNvSpPr>
-            <a:spLocks noGrp="1"/>
-          </p:cNvSpPr>
-          <p:nvPr>
-            <p:ph idx="1"/>
-          </p:nvPr>
-        </p:nvSpPr>
-        <p:spPr/>
-        <p:txBody>
-          <a:bodyPr/>
-          <a:lstStyle/>
-          <a:p>
-            <a:endParaRPr lang="da-DK" dirty="0"/>
-          </a:p>
-          <a:p>
-            <a:r>
-              <a:rPr lang="da-DK" dirty="0"/>
-              <a:t>Keep number of dependencies down</a:t>
-            </a:r>
-          </a:p>
-          <a:p>
-            <a:endParaRPr lang="da-DK" dirty="0"/>
-          </a:p>
-          <a:p>
-            <a:r>
-              <a:rPr lang="da-DK" dirty="0"/>
-              <a:t>React</a:t>
-            </a:r>
-          </a:p>
-          <a:p>
-            <a:pPr lvl="1"/>
-            <a:r>
-              <a:rPr lang="da-DK" dirty="0"/>
-              <a:t>create-react-app from Facebook</a:t>
-            </a:r>
-          </a:p>
-          <a:p>
-            <a:pPr lvl="1"/>
-            <a:endParaRPr lang="da-DK" dirty="0"/>
-          </a:p>
-          <a:p>
-            <a:pPr lvl="1"/>
-            <a:endParaRPr lang="da-DK" dirty="0"/>
-          </a:p>
-        </p:txBody>
-      </p:sp>
-      <p:sp>
-        <p:nvSpPr>
-          <p:cNvPr id="4" name="Slide Number Placeholder 3"/>
-          <p:cNvSpPr>
-            <a:spLocks noGrp="1"/>
-          </p:cNvSpPr>
-          <p:nvPr>
-            <p:ph type="sldNum" sz="quarter" idx="12"/>
-          </p:nvPr>
-        </p:nvSpPr>
-        <p:spPr/>
-        <p:txBody>
-          <a:bodyPr/>
-          <a:lstStyle/>
-          <a:p>
-            <a:fld id="{0B0DDA44-FDCB-445C-9AC0-37FB199E677B}" type="slidenum">
-              <a:rPr lang="en-US" smtClean="0"/>
-              <a:pPr/>
-              <a:t>16</a:t>
+              <a:t>13</a:t>
             </a:fld>
             <a:endParaRPr lang="en-US" dirty="0"/>
           </a:p>
@@ -5458,7 +5177,7 @@
 </p:sld>
 </file>
 
-<file path=ppt/slides/slide17.xml><?xml version="1.0" encoding="utf-8"?>
+<file path=ppt/slides/slide14.xml><?xml version="1.0" encoding="utf-8"?>
 <p:sld xmlns:a="http://schemas.openxmlformats.org/drawingml/2006/main" xmlns:r="http://schemas.openxmlformats.org/officeDocument/2006/relationships" xmlns:p="http://schemas.openxmlformats.org/presentationml/2006/main" show="0">
   <p:cSld>
     <p:spTree>
@@ -5953,7 +5672,7 @@
             <a:fld id="{0B0DDA44-FDCB-445C-9AC0-37FB199E677B}" type="slidenum">
               <a:rPr lang="en-US" smtClean="0"/>
               <a:pPr/>
-              <a:t>17</a:t>
+              <a:t>14</a:t>
             </a:fld>
             <a:endParaRPr lang="en-US" dirty="0"/>
           </a:p>
@@ -6762,25 +6481,50 @@
         </p:nvSpPr>
         <p:spPr/>
         <p:txBody>
-          <a:bodyPr/>
+          <a:bodyPr>
+            <a:normAutofit lnSpcReduction="10000"/>
+          </a:bodyPr>
           <a:lstStyle/>
           <a:p>
+            <a:r>
+              <a:rPr lang="da-DK" dirty="0"/>
+              <a:t>Founded in 2014 (spin-off from SkabelonDesign)</a:t>
+            </a:r>
+          </a:p>
+          <a:p>
             <a:endParaRPr lang="da-DK" dirty="0"/>
           </a:p>
           <a:p>
+            <a:r>
+              <a:rPr lang="da-DK"/>
+              <a:t>Mission: Help </a:t>
+            </a:r>
+            <a:r>
+              <a:rPr lang="da-DK" dirty="0"/>
+              <a:t>companies manage their templates</a:t>
+            </a:r>
+          </a:p>
+          <a:p>
+            <a:pPr lvl="1"/>
             <a:endParaRPr lang="da-DK" dirty="0"/>
           </a:p>
           <a:p>
-            <a:endParaRPr lang="da-DK" dirty="0"/>
-          </a:p>
-          <a:p>
-            <a:endParaRPr lang="da-DK" dirty="0"/>
-          </a:p>
-          <a:p>
-            <a:endParaRPr lang="da-DK" dirty="0"/>
-          </a:p>
-          <a:p>
-            <a:endParaRPr lang="da-DK" dirty="0"/>
+            <a:r>
+              <a:rPr lang="da-DK" dirty="0"/>
+              <a:t>Distribution</a:t>
+            </a:r>
+          </a:p>
+          <a:p>
+            <a:r>
+              <a:rPr lang="da-DK" dirty="0"/>
+              <a:t>Customization</a:t>
+            </a:r>
+          </a:p>
+          <a:p>
+            <a:r>
+              <a:rPr lang="da-DK" dirty="0"/>
+              <a:t>Integration</a:t>
+            </a:r>
           </a:p>
           <a:p>
             <a:endParaRPr lang="da-DK" dirty="0"/>
@@ -6817,6 +6561,17 @@
             <a:r>
               <a:rPr lang="da-DK" dirty="0"/>
               <a:t>Poland: 1 designer</a:t>
+            </a:r>
+          </a:p>
+          <a:p>
+            <a:pPr lvl="2"/>
+            <a:endParaRPr lang="da-DK" dirty="0"/>
+          </a:p>
+          <a:p>
+            <a:pPr lvl="1"/>
+            <a:r>
+              <a:rPr lang="da-DK" dirty="0"/>
+              <a:t>Tech: .NET, Azure, React, VSTO, git, VSTS, Azure SQL</a:t>
             </a:r>
           </a:p>
           <a:p>
@@ -6855,6 +6610,36 @@
           </a:p>
         </p:txBody>
       </p:sp>
+      <p:pic>
+        <p:nvPicPr>
+          <p:cNvPr id="5" name="Picture 4"/>
+          <p:cNvPicPr>
+            <a:picLocks noChangeAspect="1"/>
+          </p:cNvPicPr>
+          <p:nvPr/>
+        </p:nvPicPr>
+        <p:blipFill>
+          <a:blip r:embed="rId2">
+            <a:extLst>
+              <a:ext uri="{28A0092B-C50C-407E-A947-70E740481C1C}">
+                <a14:useLocalDpi xmlns:a14="http://schemas.microsoft.com/office/drawing/2010/main" val="0"/>
+              </a:ext>
+            </a:extLst>
+          </a:blip>
+          <a:stretch>
+            <a:fillRect/>
+          </a:stretch>
+        </p:blipFill>
+        <p:spPr>
+          <a:xfrm>
+            <a:off x="7320136" y="3036658"/>
+            <a:ext cx="3626349" cy="1042575"/>
+          </a:xfrm>
+          <a:prstGeom prst="rect">
+            <a:avLst/>
+          </a:prstGeom>
+        </p:spPr>
+      </p:pic>
     </p:spTree>
     <p:extLst>
       <p:ext uri="{BB962C8B-B14F-4D97-AF65-F5344CB8AC3E}">
@@ -7143,11 +6928,7 @@
             <a:pPr lvl="1"/>
             <a:r>
               <a:rPr lang="en-US" dirty="0"/>
-              <a:t>“</a:t>
-            </a:r>
-            <a:r>
-              <a:rPr lang="en-US" dirty="0"/>
-              <a:t>A JavaScript library for building user interfaces”</a:t>
+              <a:t>“A JavaScript library for building user interfaces”</a:t>
             </a:r>
           </a:p>
           <a:p>
@@ -7436,6 +7217,59 @@
           </a:prstGeom>
         </p:spPr>
       </p:pic>
+      <p:sp>
+        <p:nvSpPr>
+          <p:cNvPr id="8" name="Rectangle 7"/>
+          <p:cNvSpPr/>
+          <p:nvPr/>
+        </p:nvSpPr>
+        <p:spPr>
+          <a:xfrm>
+            <a:off x="609600" y="6457514"/>
+            <a:ext cx="302400" cy="303814"/>
+          </a:xfrm>
+          <a:prstGeom prst="rect">
+            <a:avLst/>
+          </a:prstGeom>
+          <a:solidFill>
+            <a:schemeClr val="tx1"/>
+          </a:solidFill>
+          <a:ln w="9525">
+            <a:noFill/>
+            <a:prstDash val="dash"/>
+          </a:ln>
+        </p:spPr>
+        <p:style>
+          <a:lnRef idx="2">
+            <a:schemeClr val="accent1">
+              <a:shade val="50000"/>
+            </a:schemeClr>
+          </a:lnRef>
+          <a:fillRef idx="1">
+            <a:schemeClr val="accent1"/>
+          </a:fillRef>
+          <a:effectRef idx="0">
+            <a:schemeClr val="accent1"/>
+          </a:effectRef>
+          <a:fontRef idx="minor">
+            <a:schemeClr val="lt1"/>
+          </a:fontRef>
+        </p:style>
+        <p:txBody>
+          <a:bodyPr rtlCol="0" anchor="ctr"/>
+          <a:lstStyle/>
+          <a:p>
+            <a:pPr algn="ctr"/>
+            <a:endParaRPr lang="da-DK" sz="1000" dirty="0">
+              <a:solidFill>
+                <a:schemeClr val="bg1"/>
+              </a:solidFill>
+              <a:latin typeface="Arial" panose="020B0604020202020204" pitchFamily="34" charset="0"/>
+              <a:cs typeface="Arial" panose="020B0604020202020204" pitchFamily="34" charset="0"/>
+            </a:endParaRPr>
+          </a:p>
+        </p:txBody>
+      </p:sp>
     </p:spTree>
     <p:extLst>
       <p:ext uri="{BB962C8B-B14F-4D97-AF65-F5344CB8AC3E}">
@@ -7468,6 +7302,119 @@
       </p:grpSpPr>
       <p:sp>
         <p:nvSpPr>
+          <p:cNvPr id="2" name="Title 1"/>
+          <p:cNvSpPr>
+            <a:spLocks noGrp="1"/>
+          </p:cNvSpPr>
+          <p:nvPr>
+            <p:ph type="title"/>
+          </p:nvPr>
+        </p:nvSpPr>
+        <p:spPr/>
+        <p:txBody>
+          <a:bodyPr/>
+          <a:lstStyle/>
+          <a:p>
+            <a:r>
+              <a:rPr lang="da-DK" dirty="0"/>
+              <a:t>TypeScript</a:t>
+            </a:r>
+          </a:p>
+        </p:txBody>
+      </p:sp>
+      <p:sp>
+        <p:nvSpPr>
+          <p:cNvPr id="3" name="Content Placeholder 2"/>
+          <p:cNvSpPr>
+            <a:spLocks noGrp="1"/>
+          </p:cNvSpPr>
+          <p:nvPr>
+            <p:ph idx="1"/>
+          </p:nvPr>
+        </p:nvSpPr>
+        <p:spPr/>
+        <p:txBody>
+          <a:bodyPr/>
+          <a:lstStyle/>
+          <a:p>
+            <a:endParaRPr lang="da-DK" dirty="0"/>
+          </a:p>
+          <a:p>
+            <a:endParaRPr lang="da-DK" dirty="0"/>
+          </a:p>
+          <a:p>
+            <a:r>
+              <a:rPr lang="da-DK" dirty="0"/>
+              <a:t>Released by Microsoft in 2012</a:t>
+            </a:r>
+          </a:p>
+          <a:p>
+            <a:pPr lvl="1"/>
+            <a:r>
+              <a:rPr lang="da-DK" dirty="0"/>
+              <a:t>”</a:t>
+            </a:r>
+            <a:r>
+              <a:rPr lang="en-US" dirty="0" err="1"/>
+              <a:t>TypeScript</a:t>
+            </a:r>
+            <a:r>
+              <a:rPr lang="en-US" dirty="0"/>
+              <a:t> is a typed superset of JavaScript that compiles to plain JavaScript.”</a:t>
+            </a:r>
+          </a:p>
+          <a:p>
+            <a:pPr lvl="1"/>
+            <a:endParaRPr lang="en-US" dirty="0"/>
+          </a:p>
+          <a:p>
+            <a:pPr lvl="1"/>
+            <a:endParaRPr lang="en-US" dirty="0"/>
+          </a:p>
+          <a:p>
+            <a:r>
+              <a:rPr lang="en-US" dirty="0"/>
+              <a:t>Adds types and type inference</a:t>
+            </a:r>
+          </a:p>
+          <a:p>
+            <a:endParaRPr lang="en-US" dirty="0"/>
+          </a:p>
+          <a:p>
+            <a:endParaRPr lang="en-US" dirty="0"/>
+          </a:p>
+          <a:p>
+            <a:r>
+              <a:rPr lang="en-US" dirty="0"/>
+              <a:t>Adds support for new ECMAScript features</a:t>
+            </a:r>
+          </a:p>
+          <a:p>
+            <a:endParaRPr lang="en-US" dirty="0"/>
+          </a:p>
+          <a:p>
+            <a:endParaRPr lang="en-US" dirty="0"/>
+          </a:p>
+          <a:p>
+            <a:endParaRPr lang="en-US" dirty="0"/>
+          </a:p>
+          <a:p>
+            <a:endParaRPr lang="en-US" dirty="0"/>
+          </a:p>
+          <a:p>
+            <a:endParaRPr lang="en-US" dirty="0"/>
+          </a:p>
+          <a:p>
+            <a:pPr lvl="1"/>
+            <a:endParaRPr lang="en-US" dirty="0"/>
+          </a:p>
+          <a:p>
+            <a:endParaRPr lang="da-DK" dirty="0"/>
+          </a:p>
+        </p:txBody>
+      </p:sp>
+      <p:sp>
+        <p:nvSpPr>
           <p:cNvPr id="4" name="Slide Number Placeholder 3"/>
           <p:cNvSpPr>
             <a:spLocks noGrp="1"/>
@@ -7490,44 +7437,104 @@
           </a:p>
         </p:txBody>
       </p:sp>
-      <p:sp>
-        <p:nvSpPr>
-          <p:cNvPr id="5" name="TextBox 4"/>
-          <p:cNvSpPr txBox="1"/>
+      <p:pic>
+        <p:nvPicPr>
+          <p:cNvPr id="5" name="Picture 10" descr="C:\dev\react-webpack-typescript\_notes\images\typescript.png"/>
+          <p:cNvPicPr>
+            <a:picLocks noChangeAspect="1" noChangeArrowheads="1"/>
+          </p:cNvPicPr>
           <p:nvPr/>
-        </p:nvSpPr>
-        <p:spPr>
+        </p:nvPicPr>
+        <p:blipFill>
+          <a:blip r:embed="rId2" cstate="print">
+            <a:extLst>
+              <a:ext uri="{28A0092B-C50C-407E-A947-70E740481C1C}">
+                <a14:useLocalDpi xmlns:a14="http://schemas.microsoft.com/office/drawing/2010/main" val="0"/>
+              </a:ext>
+            </a:extLst>
+          </a:blip>
+          <a:srcRect/>
+          <a:stretch>
+            <a:fillRect/>
+          </a:stretch>
+        </p:blipFill>
+        <p:spPr bwMode="auto">
           <a:xfrm>
-            <a:off x="4887074" y="3059668"/>
-            <a:ext cx="2417853" cy="738664"/>
+            <a:off x="8184232" y="2948943"/>
+            <a:ext cx="2722618" cy="1425030"/>
           </a:xfrm>
           <a:prstGeom prst="rect">
             <a:avLst/>
           </a:prstGeom>
           <a:noFill/>
-        </p:spPr>
-        <p:txBody>
-          <a:bodyPr wrap="square" lIns="0" tIns="0" rIns="0" bIns="0" rtlCol="0">
-            <a:spAutoFit/>
-          </a:bodyPr>
+          <a:extLst>
+            <a:ext uri="{909E8E84-426E-40DD-AFC4-6F175D3DCCD1}">
+              <a14:hiddenFill xmlns:a14="http://schemas.microsoft.com/office/drawing/2010/main">
+                <a:solidFill>
+                  <a:srgbClr val="FFFFFF"/>
+                </a:solidFill>
+              </a14:hiddenFill>
+            </a:ext>
+          </a:extLst>
+        </p:spPr>
+      </p:pic>
+      <p:sp>
+        <p:nvSpPr>
+          <p:cNvPr id="7" name="Rectangle 6"/>
+          <p:cNvSpPr/>
+          <p:nvPr/>
+        </p:nvSpPr>
+        <p:spPr>
+          <a:xfrm>
+            <a:off x="609600" y="6457514"/>
+            <a:ext cx="302400" cy="303814"/>
+          </a:xfrm>
+          <a:prstGeom prst="rect">
+            <a:avLst/>
+          </a:prstGeom>
+          <a:solidFill>
+            <a:schemeClr val="tx1"/>
+          </a:solidFill>
+          <a:ln w="9525">
+            <a:noFill/>
+            <a:prstDash val="dash"/>
+          </a:ln>
+        </p:spPr>
+        <p:style>
+          <a:lnRef idx="2">
+            <a:schemeClr val="accent1">
+              <a:shade val="50000"/>
+            </a:schemeClr>
+          </a:lnRef>
+          <a:fillRef idx="1">
+            <a:schemeClr val="accent1"/>
+          </a:fillRef>
+          <a:effectRef idx="0">
+            <a:schemeClr val="accent1"/>
+          </a:effectRef>
+          <a:fontRef idx="minor">
+            <a:schemeClr val="lt1"/>
+          </a:fontRef>
+        </p:style>
+        <p:txBody>
+          <a:bodyPr rtlCol="0" anchor="ctr"/>
           <a:lstStyle/>
           <a:p>
             <a:pPr algn="ctr"/>
-            <a:r>
-              <a:rPr lang="da-DK" sz="4800" dirty="0">
-                <a:latin typeface="Arial" panose="020B0604020202020204" pitchFamily="34" charset="0"/>
-                <a:ea typeface="Open Sans" panose="020B0606030504020204" pitchFamily="34" charset="0"/>
-                <a:cs typeface="Arial" panose="020B0604020202020204" pitchFamily="34" charset="0"/>
-              </a:rPr>
-              <a:t>Demo</a:t>
-            </a:r>
+            <a:endParaRPr lang="da-DK" sz="1000" dirty="0">
+              <a:solidFill>
+                <a:schemeClr val="bg1"/>
+              </a:solidFill>
+              <a:latin typeface="Arial" panose="020B0604020202020204" pitchFamily="34" charset="0"/>
+              <a:cs typeface="Arial" panose="020B0604020202020204" pitchFamily="34" charset="0"/>
+            </a:endParaRPr>
           </a:p>
         </p:txBody>
       </p:sp>
     </p:spTree>
     <p:extLst>
       <p:ext uri="{BB962C8B-B14F-4D97-AF65-F5344CB8AC3E}">
-        <p14:creationId xmlns:p14="http://schemas.microsoft.com/office/powerpoint/2010/main" val="458741672"/>
+        <p14:creationId xmlns:p14="http://schemas.microsoft.com/office/powerpoint/2010/main" val="1704763269"/>
       </p:ext>
     </p:extLst>
   </p:cSld>

</xml_diff>